<commit_message>
Updated the FHIR Representation section to describe the mapping spreadsheet
</commit_message>
<xml_diff>
--- a/input/images-source/Images.pptx
+++ b/input/images-source/Images.pptx
@@ -8,6 +8,7 @@
     <p:sldId id="256" r:id="rId2"/>
     <p:sldId id="257" r:id="rId3"/>
     <p:sldId id="258" r:id="rId4"/>
+    <p:sldId id="259" r:id="rId5"/>
   </p:sldIdLst>
   <p:sldSz cx="12192000" cy="6858000"/>
   <p:notesSz cx="6858000" cy="9144000"/>
@@ -3463,7 +3464,7 @@
           <a:p>
             <a:fld id="{8D19A3AA-5CC1-4409-A3F5-5174B3C1B3E1}" type="datetimeFigureOut">
               <a:rPr lang="en-CA" smtClean="0"/>
-              <a:t>2025-04-15</a:t>
+              <a:t>2025-07-18</a:t>
             </a:fld>
             <a:endParaRPr lang="en-CA"/>
           </a:p>
@@ -3663,7 +3664,7 @@
           <a:p>
             <a:fld id="{8D19A3AA-5CC1-4409-A3F5-5174B3C1B3E1}" type="datetimeFigureOut">
               <a:rPr lang="en-CA" smtClean="0"/>
-              <a:t>2025-04-15</a:t>
+              <a:t>2025-07-18</a:t>
             </a:fld>
             <a:endParaRPr lang="en-CA"/>
           </a:p>
@@ -3873,7 +3874,7 @@
           <a:p>
             <a:fld id="{8D19A3AA-5CC1-4409-A3F5-5174B3C1B3E1}" type="datetimeFigureOut">
               <a:rPr lang="en-CA" smtClean="0"/>
-              <a:t>2025-04-15</a:t>
+              <a:t>2025-07-18</a:t>
             </a:fld>
             <a:endParaRPr lang="en-CA"/>
           </a:p>
@@ -4073,7 +4074,7 @@
           <a:p>
             <a:fld id="{8D19A3AA-5CC1-4409-A3F5-5174B3C1B3E1}" type="datetimeFigureOut">
               <a:rPr lang="en-CA" smtClean="0"/>
-              <a:t>2025-04-15</a:t>
+              <a:t>2025-07-18</a:t>
             </a:fld>
             <a:endParaRPr lang="en-CA"/>
           </a:p>
@@ -4349,7 +4350,7 @@
           <a:p>
             <a:fld id="{8D19A3AA-5CC1-4409-A3F5-5174B3C1B3E1}" type="datetimeFigureOut">
               <a:rPr lang="en-CA" smtClean="0"/>
-              <a:t>2025-04-15</a:t>
+              <a:t>2025-07-18</a:t>
             </a:fld>
             <a:endParaRPr lang="en-CA"/>
           </a:p>
@@ -4617,7 +4618,7 @@
           <a:p>
             <a:fld id="{8D19A3AA-5CC1-4409-A3F5-5174B3C1B3E1}" type="datetimeFigureOut">
               <a:rPr lang="en-CA" smtClean="0"/>
-              <a:t>2025-04-15</a:t>
+              <a:t>2025-07-18</a:t>
             </a:fld>
             <a:endParaRPr lang="en-CA"/>
           </a:p>
@@ -5032,7 +5033,7 @@
           <a:p>
             <a:fld id="{8D19A3AA-5CC1-4409-A3F5-5174B3C1B3E1}" type="datetimeFigureOut">
               <a:rPr lang="en-CA" smtClean="0"/>
-              <a:t>2025-04-15</a:t>
+              <a:t>2025-07-18</a:t>
             </a:fld>
             <a:endParaRPr lang="en-CA"/>
           </a:p>
@@ -5174,7 +5175,7 @@
           <a:p>
             <a:fld id="{8D19A3AA-5CC1-4409-A3F5-5174B3C1B3E1}" type="datetimeFigureOut">
               <a:rPr lang="en-CA" smtClean="0"/>
-              <a:t>2025-04-15</a:t>
+              <a:t>2025-07-18</a:t>
             </a:fld>
             <a:endParaRPr lang="en-CA"/>
           </a:p>
@@ -5287,7 +5288,7 @@
           <a:p>
             <a:fld id="{8D19A3AA-5CC1-4409-A3F5-5174B3C1B3E1}" type="datetimeFigureOut">
               <a:rPr lang="en-CA" smtClean="0"/>
-              <a:t>2025-04-15</a:t>
+              <a:t>2025-07-18</a:t>
             </a:fld>
             <a:endParaRPr lang="en-CA"/>
           </a:p>
@@ -5600,7 +5601,7 @@
           <a:p>
             <a:fld id="{8D19A3AA-5CC1-4409-A3F5-5174B3C1B3E1}" type="datetimeFigureOut">
               <a:rPr lang="en-CA" smtClean="0"/>
-              <a:t>2025-04-15</a:t>
+              <a:t>2025-07-18</a:t>
             </a:fld>
             <a:endParaRPr lang="en-CA"/>
           </a:p>
@@ -5889,7 +5890,7 @@
           <a:p>
             <a:fld id="{8D19A3AA-5CC1-4409-A3F5-5174B3C1B3E1}" type="datetimeFigureOut">
               <a:rPr lang="en-CA" smtClean="0"/>
-              <a:t>2025-04-15</a:t>
+              <a:t>2025-07-18</a:t>
             </a:fld>
             <a:endParaRPr lang="en-CA"/>
           </a:p>
@@ -6132,7 +6133,7 @@
           <a:p>
             <a:fld id="{8D19A3AA-5CC1-4409-A3F5-5174B3C1B3E1}" type="datetimeFigureOut">
               <a:rPr lang="en-CA" smtClean="0"/>
-              <a:t>2025-04-15</a:t>
+              <a:t>2025-07-18</a:t>
             </a:fld>
             <a:endParaRPr lang="en-CA"/>
           </a:p>
@@ -6716,6 +6717,234 @@
 </p:sld>
 </file>
 
+<file path=ppt/slides/slide4.xml><?xml version="1.0" encoding="utf-8"?>
+<p:sld xmlns:a="http://schemas.openxmlformats.org/drawingml/2006/main" xmlns:r="http://schemas.openxmlformats.org/officeDocument/2006/relationships" xmlns:p="http://schemas.openxmlformats.org/presentationml/2006/main">
+  <p:cSld>
+    <p:spTree>
+      <p:nvGrpSpPr>
+        <p:cNvPr id="1" name=""/>
+        <p:cNvGrpSpPr/>
+        <p:nvPr/>
+      </p:nvGrpSpPr>
+      <p:grpSpPr>
+        <a:xfrm>
+          <a:off x="0" y="0"/>
+          <a:ext cx="0" cy="0"/>
+          <a:chOff x="0" y="0"/>
+          <a:chExt cx="0" cy="0"/>
+        </a:xfrm>
+      </p:grpSpPr>
+      <p:pic>
+        <p:nvPicPr>
+          <p:cNvPr id="7" name="Picture 6">
+            <a:extLst>
+              <a:ext uri="{FF2B5EF4-FFF2-40B4-BE49-F238E27FC236}">
+                <a16:creationId xmlns:a16="http://schemas.microsoft.com/office/drawing/2014/main" id="{DFF1C161-5124-CF0D-80B6-A401F680E249}"/>
+              </a:ext>
+            </a:extLst>
+          </p:cNvPr>
+          <p:cNvPicPr>
+            <a:picLocks noChangeAspect="1"/>
+          </p:cNvPicPr>
+          <p:nvPr/>
+        </p:nvPicPr>
+        <p:blipFill>
+          <a:blip r:embed="rId2"/>
+          <a:stretch>
+            <a:fillRect/>
+          </a:stretch>
+        </p:blipFill>
+        <p:spPr>
+          <a:xfrm>
+            <a:off x="0" y="1860278"/>
+            <a:ext cx="12192000" cy="3137444"/>
+          </a:xfrm>
+          <a:prstGeom prst="rect">
+            <a:avLst/>
+          </a:prstGeom>
+        </p:spPr>
+      </p:pic>
+      <p:sp>
+        <p:nvSpPr>
+          <p:cNvPr id="4" name="Cloud 3">
+            <a:extLst>
+              <a:ext uri="{FF2B5EF4-FFF2-40B4-BE49-F238E27FC236}">
+                <a16:creationId xmlns:a16="http://schemas.microsoft.com/office/drawing/2014/main" id="{05C12568-644A-F0EE-5800-5007F88DCC48}"/>
+              </a:ext>
+            </a:extLst>
+          </p:cNvPr>
+          <p:cNvSpPr/>
+          <p:nvPr/>
+        </p:nvSpPr>
+        <p:spPr>
+          <a:xfrm>
+            <a:off x="1101969" y="3240258"/>
+            <a:ext cx="1772529" cy="1125416"/>
+          </a:xfrm>
+          <a:prstGeom prst="cloud">
+            <a:avLst/>
+          </a:prstGeom>
+          <a:solidFill>
+            <a:srgbClr val="FFFF00"/>
+          </a:solidFill>
+        </p:spPr>
+        <p:style>
+          <a:lnRef idx="2">
+            <a:schemeClr val="accent1">
+              <a:shade val="15000"/>
+            </a:schemeClr>
+          </a:lnRef>
+          <a:fillRef idx="1">
+            <a:schemeClr val="accent1"/>
+          </a:fillRef>
+          <a:effectRef idx="0">
+            <a:schemeClr val="accent1"/>
+          </a:effectRef>
+          <a:fontRef idx="minor">
+            <a:schemeClr val="lt1"/>
+          </a:fontRef>
+        </p:style>
+        <p:txBody>
+          <a:bodyPr rtlCol="0" anchor="ctr"/>
+          <a:lstStyle/>
+          <a:p>
+            <a:pPr algn="ctr"/>
+            <a:r>
+              <a:rPr lang="en-GB" b="1" dirty="0">
+                <a:solidFill>
+                  <a:sysClr val="windowText" lastClr="000000"/>
+                </a:solidFill>
+              </a:rPr>
+              <a:t>M11</a:t>
+            </a:r>
+          </a:p>
+        </p:txBody>
+      </p:sp>
+      <p:sp>
+        <p:nvSpPr>
+          <p:cNvPr id="5" name="Cloud 4">
+            <a:extLst>
+              <a:ext uri="{FF2B5EF4-FFF2-40B4-BE49-F238E27FC236}">
+                <a16:creationId xmlns:a16="http://schemas.microsoft.com/office/drawing/2014/main" id="{6334ED1B-5ED5-5628-31BF-F5F7525D4A7B}"/>
+              </a:ext>
+            </a:extLst>
+          </p:cNvPr>
+          <p:cNvSpPr/>
+          <p:nvPr/>
+        </p:nvSpPr>
+        <p:spPr>
+          <a:xfrm>
+            <a:off x="6236677" y="3090203"/>
+            <a:ext cx="1772529" cy="1125416"/>
+          </a:xfrm>
+          <a:prstGeom prst="cloud">
+            <a:avLst/>
+          </a:prstGeom>
+          <a:solidFill>
+            <a:srgbClr val="B7DEE8"/>
+          </a:solidFill>
+        </p:spPr>
+        <p:style>
+          <a:lnRef idx="2">
+            <a:schemeClr val="accent1">
+              <a:shade val="15000"/>
+            </a:schemeClr>
+          </a:lnRef>
+          <a:fillRef idx="1">
+            <a:schemeClr val="accent1"/>
+          </a:fillRef>
+          <a:effectRef idx="0">
+            <a:schemeClr val="accent1"/>
+          </a:effectRef>
+          <a:fontRef idx="minor">
+            <a:schemeClr val="lt1"/>
+          </a:fontRef>
+        </p:style>
+        <p:txBody>
+          <a:bodyPr rtlCol="0" anchor="ctr"/>
+          <a:lstStyle/>
+          <a:p>
+            <a:pPr algn="ctr"/>
+            <a:r>
+              <a:rPr lang="en-GB" b="1" dirty="0">
+                <a:solidFill>
+                  <a:sysClr val="windowText" lastClr="000000"/>
+                </a:solidFill>
+              </a:rPr>
+              <a:t>USDM</a:t>
+            </a:r>
+          </a:p>
+        </p:txBody>
+      </p:sp>
+      <p:sp>
+        <p:nvSpPr>
+          <p:cNvPr id="6" name="Cloud 5">
+            <a:extLst>
+              <a:ext uri="{FF2B5EF4-FFF2-40B4-BE49-F238E27FC236}">
+                <a16:creationId xmlns:a16="http://schemas.microsoft.com/office/drawing/2014/main" id="{248B2750-B148-7418-11FA-56035A12A208}"/>
+              </a:ext>
+            </a:extLst>
+          </p:cNvPr>
+          <p:cNvSpPr/>
+          <p:nvPr/>
+        </p:nvSpPr>
+        <p:spPr>
+          <a:xfrm>
+            <a:off x="10011507" y="3090203"/>
+            <a:ext cx="1772529" cy="1125416"/>
+          </a:xfrm>
+          <a:prstGeom prst="cloud">
+            <a:avLst/>
+          </a:prstGeom>
+          <a:solidFill>
+            <a:srgbClr val="FFEB9C"/>
+          </a:solidFill>
+        </p:spPr>
+        <p:style>
+          <a:lnRef idx="2">
+            <a:schemeClr val="accent1">
+              <a:shade val="15000"/>
+            </a:schemeClr>
+          </a:lnRef>
+          <a:fillRef idx="1">
+            <a:schemeClr val="accent1"/>
+          </a:fillRef>
+          <a:effectRef idx="0">
+            <a:schemeClr val="accent1"/>
+          </a:effectRef>
+          <a:fontRef idx="minor">
+            <a:schemeClr val="lt1"/>
+          </a:fontRef>
+        </p:style>
+        <p:txBody>
+          <a:bodyPr rtlCol="0" anchor="ctr"/>
+          <a:lstStyle/>
+          <a:p>
+            <a:pPr algn="ctr"/>
+            <a:r>
+              <a:rPr lang="en-GB" b="1" dirty="0">
+                <a:solidFill>
+                  <a:sysClr val="windowText" lastClr="000000"/>
+                </a:solidFill>
+              </a:rPr>
+              <a:t>FHIR</a:t>
+            </a:r>
+          </a:p>
+        </p:txBody>
+      </p:sp>
+    </p:spTree>
+    <p:extLst>
+      <p:ext uri="{BB962C8B-B14F-4D97-AF65-F5344CB8AC3E}">
+        <p14:creationId xmlns:p14="http://schemas.microsoft.com/office/powerpoint/2010/main" val="75211092"/>
+      </p:ext>
+    </p:extLst>
+  </p:cSld>
+  <p:clrMapOvr>
+    <a:masterClrMapping/>
+  </p:clrMapOvr>
+</p:sld>
+</file>
+
 <file path=ppt/theme/theme1.xml><?xml version="1.0" encoding="utf-8"?>
 <a:theme xmlns:a="http://schemas.openxmlformats.org/drawingml/2006/main" name="Office Theme">
   <a:themeElements>

</xml_diff>

<commit_message>
Updated Intro, Best Practices and Use Cases
</commit_message>
<xml_diff>
--- a/input/images-source/Images.pptx
+++ b/input/images-source/Images.pptx
@@ -9,6 +9,8 @@
     <p:sldId id="257" r:id="rId3"/>
     <p:sldId id="258" r:id="rId4"/>
     <p:sldId id="259" r:id="rId5"/>
+    <p:sldId id="260" r:id="rId6"/>
+    <p:sldId id="261" r:id="rId7"/>
   </p:sldIdLst>
   <p:sldSz cx="12192000" cy="6858000"/>
   <p:notesSz cx="6858000" cy="9144000"/>
@@ -3464,7 +3466,7 @@
           <a:p>
             <a:fld id="{8D19A3AA-5CC1-4409-A3F5-5174B3C1B3E1}" type="datetimeFigureOut">
               <a:rPr lang="en-CA" smtClean="0"/>
-              <a:t>2025-07-18</a:t>
+              <a:t>2025-07-21</a:t>
             </a:fld>
             <a:endParaRPr lang="en-CA"/>
           </a:p>
@@ -3664,7 +3666,7 @@
           <a:p>
             <a:fld id="{8D19A3AA-5CC1-4409-A3F5-5174B3C1B3E1}" type="datetimeFigureOut">
               <a:rPr lang="en-CA" smtClean="0"/>
-              <a:t>2025-07-18</a:t>
+              <a:t>2025-07-21</a:t>
             </a:fld>
             <a:endParaRPr lang="en-CA"/>
           </a:p>
@@ -3874,7 +3876,7 @@
           <a:p>
             <a:fld id="{8D19A3AA-5CC1-4409-A3F5-5174B3C1B3E1}" type="datetimeFigureOut">
               <a:rPr lang="en-CA" smtClean="0"/>
-              <a:t>2025-07-18</a:t>
+              <a:t>2025-07-21</a:t>
             </a:fld>
             <a:endParaRPr lang="en-CA"/>
           </a:p>
@@ -4074,7 +4076,7 @@
           <a:p>
             <a:fld id="{8D19A3AA-5CC1-4409-A3F5-5174B3C1B3E1}" type="datetimeFigureOut">
               <a:rPr lang="en-CA" smtClean="0"/>
-              <a:t>2025-07-18</a:t>
+              <a:t>2025-07-21</a:t>
             </a:fld>
             <a:endParaRPr lang="en-CA"/>
           </a:p>
@@ -4350,7 +4352,7 @@
           <a:p>
             <a:fld id="{8D19A3AA-5CC1-4409-A3F5-5174B3C1B3E1}" type="datetimeFigureOut">
               <a:rPr lang="en-CA" smtClean="0"/>
-              <a:t>2025-07-18</a:t>
+              <a:t>2025-07-21</a:t>
             </a:fld>
             <a:endParaRPr lang="en-CA"/>
           </a:p>
@@ -4618,7 +4620,7 @@
           <a:p>
             <a:fld id="{8D19A3AA-5CC1-4409-A3F5-5174B3C1B3E1}" type="datetimeFigureOut">
               <a:rPr lang="en-CA" smtClean="0"/>
-              <a:t>2025-07-18</a:t>
+              <a:t>2025-07-21</a:t>
             </a:fld>
             <a:endParaRPr lang="en-CA"/>
           </a:p>
@@ -5033,7 +5035,7 @@
           <a:p>
             <a:fld id="{8D19A3AA-5CC1-4409-A3F5-5174B3C1B3E1}" type="datetimeFigureOut">
               <a:rPr lang="en-CA" smtClean="0"/>
-              <a:t>2025-07-18</a:t>
+              <a:t>2025-07-21</a:t>
             </a:fld>
             <a:endParaRPr lang="en-CA"/>
           </a:p>
@@ -5175,7 +5177,7 @@
           <a:p>
             <a:fld id="{8D19A3AA-5CC1-4409-A3F5-5174B3C1B3E1}" type="datetimeFigureOut">
               <a:rPr lang="en-CA" smtClean="0"/>
-              <a:t>2025-07-18</a:t>
+              <a:t>2025-07-21</a:t>
             </a:fld>
             <a:endParaRPr lang="en-CA"/>
           </a:p>
@@ -5288,7 +5290,7 @@
           <a:p>
             <a:fld id="{8D19A3AA-5CC1-4409-A3F5-5174B3C1B3E1}" type="datetimeFigureOut">
               <a:rPr lang="en-CA" smtClean="0"/>
-              <a:t>2025-07-18</a:t>
+              <a:t>2025-07-21</a:t>
             </a:fld>
             <a:endParaRPr lang="en-CA"/>
           </a:p>
@@ -5601,7 +5603,7 @@
           <a:p>
             <a:fld id="{8D19A3AA-5CC1-4409-A3F5-5174B3C1B3E1}" type="datetimeFigureOut">
               <a:rPr lang="en-CA" smtClean="0"/>
-              <a:t>2025-07-18</a:t>
+              <a:t>2025-07-21</a:t>
             </a:fld>
             <a:endParaRPr lang="en-CA"/>
           </a:p>
@@ -5890,7 +5892,7 @@
           <a:p>
             <a:fld id="{8D19A3AA-5CC1-4409-A3F5-5174B3C1B3E1}" type="datetimeFigureOut">
               <a:rPr lang="en-CA" smtClean="0"/>
-              <a:t>2025-07-18</a:t>
+              <a:t>2025-07-21</a:t>
             </a:fld>
             <a:endParaRPr lang="en-CA"/>
           </a:p>
@@ -6133,7 +6135,7 @@
           <a:p>
             <a:fld id="{8D19A3AA-5CC1-4409-A3F5-5174B3C1B3E1}" type="datetimeFigureOut">
               <a:rPr lang="en-CA" smtClean="0"/>
-              <a:t>2025-07-18</a:t>
+              <a:t>2025-07-21</a:t>
             </a:fld>
             <a:endParaRPr lang="en-CA"/>
           </a:p>
@@ -6945,6 +6947,2053 @@
 </p:sld>
 </file>
 
+<file path=ppt/slides/slide5.xml><?xml version="1.0" encoding="utf-8"?>
+<p:sld xmlns:a="http://schemas.openxmlformats.org/drawingml/2006/main" xmlns:r="http://schemas.openxmlformats.org/officeDocument/2006/relationships" xmlns:p="http://schemas.openxmlformats.org/presentationml/2006/main">
+  <p:cSld>
+    <p:spTree>
+      <p:nvGrpSpPr>
+        <p:cNvPr id="1" name=""/>
+        <p:cNvGrpSpPr/>
+        <p:nvPr/>
+      </p:nvGrpSpPr>
+      <p:grpSpPr>
+        <a:xfrm>
+          <a:off x="0" y="0"/>
+          <a:ext cx="0" cy="0"/>
+          <a:chOff x="0" y="0"/>
+          <a:chExt cx="0" cy="0"/>
+        </a:xfrm>
+      </p:grpSpPr>
+      <p:sp>
+        <p:nvSpPr>
+          <p:cNvPr id="3" name="TextBox 2">
+            <a:extLst>
+              <a:ext uri="{FF2B5EF4-FFF2-40B4-BE49-F238E27FC236}">
+                <a16:creationId xmlns:a16="http://schemas.microsoft.com/office/drawing/2014/main" id="{6C30A6CB-CDEC-481A-60E3-8BF9FCEA7D49}"/>
+              </a:ext>
+            </a:extLst>
+          </p:cNvPr>
+          <p:cNvSpPr txBox="1"/>
+          <p:nvPr/>
+        </p:nvSpPr>
+        <p:spPr>
+          <a:xfrm>
+            <a:off x="405751" y="-738173"/>
+            <a:ext cx="8548468" cy="2862322"/>
+          </a:xfrm>
+          <a:prstGeom prst="rect">
+            <a:avLst/>
+          </a:prstGeom>
+          <a:noFill/>
+        </p:spPr>
+        <p:txBody>
+          <a:bodyPr wrap="square">
+            <a:spAutoFit/>
+          </a:bodyPr>
+          <a:lstStyle/>
+          <a:p>
+            <a:r>
+              <a:rPr lang="en-GB" sz="1200" dirty="0"/>
+              <a:t>- </a:t>
+            </a:r>
+            <a:r>
+              <a:rPr lang="en-GB" sz="1200" dirty="0" err="1"/>
+              <a:t>ResearchStudy</a:t>
+            </a:r>
+            <a:r>
+              <a:rPr lang="en-GB" sz="1200" dirty="0"/>
+              <a:t> </a:t>
+            </a:r>
+          </a:p>
+          <a:p>
+            <a:r>
+              <a:rPr lang="en-GB" sz="1200" dirty="0"/>
+              <a:t>  - extended by M11ResearchStudy </a:t>
+            </a:r>
+          </a:p>
+          <a:p>
+            <a:endParaRPr lang="en-GB" sz="1200" dirty="0"/>
+          </a:p>
+          <a:p>
+            <a:r>
+              <a:rPr lang="en-GB" sz="1200" dirty="0"/>
+              <a:t>- </a:t>
+            </a:r>
+            <a:r>
+              <a:rPr lang="en-GB" sz="1200" dirty="0" err="1"/>
+              <a:t>ResearchStudy</a:t>
+            </a:r>
+            <a:r>
+              <a:rPr lang="en-GB" sz="1200" dirty="0"/>
+              <a:t> </a:t>
+            </a:r>
+          </a:p>
+          <a:p>
+            <a:r>
+              <a:rPr lang="en-GB" sz="1200" dirty="0"/>
+              <a:t>  - extended by </a:t>
+            </a:r>
+            <a:r>
+              <a:rPr lang="en-GB" sz="1200" dirty="0" err="1"/>
+              <a:t>NarrativeElements</a:t>
+            </a:r>
+            <a:r>
+              <a:rPr lang="en-GB" sz="1200" dirty="0"/>
+              <a:t> </a:t>
+            </a:r>
+          </a:p>
+          <a:p>
+            <a:r>
+              <a:rPr lang="en-GB" sz="1200" dirty="0"/>
+              <a:t>  - which provides a pointer to M11ResearchStudyNarratives</a:t>
+            </a:r>
+          </a:p>
+          <a:p>
+            <a:r>
+              <a:rPr lang="en-GB" sz="1200" dirty="0"/>
+              <a:t>- </a:t>
+            </a:r>
+            <a:r>
+              <a:rPr lang="en-GB" sz="1200" dirty="0" err="1"/>
+              <a:t>ResearchStudy</a:t>
+            </a:r>
+            <a:r>
+              <a:rPr lang="en-GB" sz="1200" dirty="0"/>
+              <a:t> </a:t>
+            </a:r>
+          </a:p>
+          <a:p>
+            <a:r>
+              <a:rPr lang="en-GB" sz="1200" dirty="0"/>
+              <a:t>  - extended by </a:t>
+            </a:r>
+            <a:r>
+              <a:rPr lang="en-GB" sz="1200" dirty="0" err="1"/>
+              <a:t>ResearchStudyStudyAmendment</a:t>
+            </a:r>
+            <a:r>
+              <a:rPr lang="en-GB" sz="1200" dirty="0"/>
+              <a:t> </a:t>
+            </a:r>
+          </a:p>
+          <a:p>
+            <a:r>
+              <a:rPr lang="en-GB" sz="1200" dirty="0"/>
+              <a:t>    - which contains  </a:t>
+            </a:r>
+            <a:r>
+              <a:rPr lang="en-GB" sz="1200" dirty="0" err="1"/>
+              <a:t>ResearchStudyStudyAmendmentDetails</a:t>
+            </a:r>
+            <a:r>
+              <a:rPr lang="en-GB" sz="1200" dirty="0"/>
+              <a:t> </a:t>
+            </a:r>
+          </a:p>
+          <a:p>
+            <a:r>
+              <a:rPr lang="en-GB" sz="1200" dirty="0"/>
+              <a:t>    - and </a:t>
+            </a:r>
+            <a:r>
+              <a:rPr lang="en-GB" sz="1200" dirty="0" err="1"/>
+              <a:t>ResearchStudyStudyAmendmentScopeImpact</a:t>
+            </a:r>
+            <a:endParaRPr lang="en-GB" sz="1200" dirty="0"/>
+          </a:p>
+          <a:p>
+            <a:r>
+              <a:rPr lang="en-GB" sz="1200" dirty="0"/>
+              <a:t>- Composition </a:t>
+            </a:r>
+          </a:p>
+          <a:p>
+            <a:r>
+              <a:rPr lang="en-GB" sz="1200" dirty="0"/>
+              <a:t>  - profiled by </a:t>
+            </a:r>
+            <a:r>
+              <a:rPr lang="en-GB" sz="1200" dirty="0" err="1"/>
+              <a:t>ResearchStudyNarratives</a:t>
+            </a:r>
+            <a:r>
+              <a:rPr lang="en-GB" sz="1200" dirty="0"/>
+              <a:t> </a:t>
+            </a:r>
+          </a:p>
+          <a:p>
+            <a:r>
+              <a:rPr lang="en-GB" sz="1200" dirty="0"/>
+              <a:t>    - profiled by M11ResearchStudyNarratives</a:t>
+            </a:r>
+          </a:p>
+          <a:p>
+            <a:r>
+              <a:rPr lang="en-GB" sz="1200" dirty="0"/>
+              <a:t>- </a:t>
+            </a:r>
+            <a:r>
+              <a:rPr lang="en-GB" sz="1200" dirty="0" err="1"/>
+              <a:t>ResearchStudy</a:t>
+            </a:r>
+            <a:r>
+              <a:rPr lang="en-GB" sz="1200" dirty="0"/>
+              <a:t> </a:t>
+            </a:r>
+          </a:p>
+          <a:p>
+            <a:r>
+              <a:rPr lang="en-GB" sz="1200" dirty="0"/>
+              <a:t>  - profiled by M11_ResearchStudyProfile which tightens cardinality of some attributes and binds appropriate terminology</a:t>
+            </a:r>
+          </a:p>
+        </p:txBody>
+      </p:sp>
+      <p:sp>
+        <p:nvSpPr>
+          <p:cNvPr id="4" name="Rectangle 3">
+            <a:extLst>
+              <a:ext uri="{FF2B5EF4-FFF2-40B4-BE49-F238E27FC236}">
+                <a16:creationId xmlns:a16="http://schemas.microsoft.com/office/drawing/2014/main" id="{0C150CF1-8016-9427-1B1D-E9009810807B}"/>
+              </a:ext>
+            </a:extLst>
+          </p:cNvPr>
+          <p:cNvSpPr/>
+          <p:nvPr/>
+        </p:nvSpPr>
+        <p:spPr>
+          <a:xfrm>
+            <a:off x="340722" y="2431943"/>
+            <a:ext cx="5290418" cy="966866"/>
+          </a:xfrm>
+          <a:prstGeom prst="rect">
+            <a:avLst/>
+          </a:prstGeom>
+          <a:ln>
+            <a:solidFill>
+              <a:schemeClr val="bg1"/>
+            </a:solidFill>
+          </a:ln>
+        </p:spPr>
+        <p:style>
+          <a:lnRef idx="2">
+            <a:schemeClr val="accent1">
+              <a:shade val="15000"/>
+            </a:schemeClr>
+          </a:lnRef>
+          <a:fillRef idx="1">
+            <a:schemeClr val="accent1"/>
+          </a:fillRef>
+          <a:effectRef idx="0">
+            <a:schemeClr val="accent1"/>
+          </a:effectRef>
+          <a:fontRef idx="minor">
+            <a:schemeClr val="lt1"/>
+          </a:fontRef>
+        </p:style>
+        <p:txBody>
+          <a:bodyPr wrap="none" rtlCol="0" anchor="t" anchorCtr="0"/>
+          <a:lstStyle/>
+          <a:p>
+            <a:r>
+              <a:rPr lang="en-GB" dirty="0" err="1"/>
+              <a:t>ResearchStudy</a:t>
+            </a:r>
+            <a:endParaRPr lang="en-GB" dirty="0"/>
+          </a:p>
+        </p:txBody>
+      </p:sp>
+      <p:sp>
+        <p:nvSpPr>
+          <p:cNvPr id="6" name="Rectangle 5">
+            <a:extLst>
+              <a:ext uri="{FF2B5EF4-FFF2-40B4-BE49-F238E27FC236}">
+                <a16:creationId xmlns:a16="http://schemas.microsoft.com/office/drawing/2014/main" id="{EB6577A7-35C0-FC94-2501-5D6FCE320E89}"/>
+              </a:ext>
+            </a:extLst>
+          </p:cNvPr>
+          <p:cNvSpPr/>
+          <p:nvPr/>
+        </p:nvSpPr>
+        <p:spPr>
+          <a:xfrm>
+            <a:off x="661041" y="3418140"/>
+            <a:ext cx="4970098" cy="1241507"/>
+          </a:xfrm>
+          <a:prstGeom prst="rect">
+            <a:avLst/>
+          </a:prstGeom>
+          <a:ln>
+            <a:solidFill>
+              <a:schemeClr val="bg1"/>
+            </a:solidFill>
+          </a:ln>
+        </p:spPr>
+        <p:style>
+          <a:lnRef idx="2">
+            <a:schemeClr val="accent1">
+              <a:shade val="15000"/>
+            </a:schemeClr>
+          </a:lnRef>
+          <a:fillRef idx="1">
+            <a:schemeClr val="accent1"/>
+          </a:fillRef>
+          <a:effectRef idx="0">
+            <a:schemeClr val="accent1"/>
+          </a:effectRef>
+          <a:fontRef idx="minor">
+            <a:schemeClr val="lt1"/>
+          </a:fontRef>
+        </p:style>
+        <p:txBody>
+          <a:bodyPr wrap="none" rtlCol="0" anchor="t" anchorCtr="0"/>
+          <a:lstStyle/>
+          <a:p>
+            <a:r>
+              <a:rPr lang="en-GB" dirty="0"/>
+              <a:t>M11ResearchStudy</a:t>
+            </a:r>
+          </a:p>
+        </p:txBody>
+      </p:sp>
+      <p:sp>
+        <p:nvSpPr>
+          <p:cNvPr id="7" name="Rectangle 6">
+            <a:extLst>
+              <a:ext uri="{FF2B5EF4-FFF2-40B4-BE49-F238E27FC236}">
+                <a16:creationId xmlns:a16="http://schemas.microsoft.com/office/drawing/2014/main" id="{5884379C-76F1-A7B8-D17A-9B72EBABCA02}"/>
+              </a:ext>
+            </a:extLst>
+          </p:cNvPr>
+          <p:cNvSpPr/>
+          <p:nvPr/>
+        </p:nvSpPr>
+        <p:spPr>
+          <a:xfrm>
+            <a:off x="661041" y="4660638"/>
+            <a:ext cx="4970098" cy="426561"/>
+          </a:xfrm>
+          <a:prstGeom prst="rect">
+            <a:avLst/>
+          </a:prstGeom>
+          <a:ln>
+            <a:solidFill>
+              <a:schemeClr val="bg1"/>
+            </a:solidFill>
+          </a:ln>
+        </p:spPr>
+        <p:style>
+          <a:lnRef idx="2">
+            <a:schemeClr val="accent1">
+              <a:shade val="15000"/>
+            </a:schemeClr>
+          </a:lnRef>
+          <a:fillRef idx="1">
+            <a:schemeClr val="accent1"/>
+          </a:fillRef>
+          <a:effectRef idx="0">
+            <a:schemeClr val="accent1"/>
+          </a:effectRef>
+          <a:fontRef idx="minor">
+            <a:schemeClr val="lt1"/>
+          </a:fontRef>
+        </p:style>
+        <p:txBody>
+          <a:bodyPr wrap="none" rtlCol="0" anchor="t" anchorCtr="0"/>
+          <a:lstStyle/>
+          <a:p>
+            <a:r>
+              <a:rPr lang="en-GB" dirty="0" err="1"/>
+              <a:t>NarrativeElements</a:t>
+            </a:r>
+            <a:endParaRPr lang="en-GB" dirty="0"/>
+          </a:p>
+        </p:txBody>
+      </p:sp>
+      <p:sp>
+        <p:nvSpPr>
+          <p:cNvPr id="9" name="Rectangle 8">
+            <a:extLst>
+              <a:ext uri="{FF2B5EF4-FFF2-40B4-BE49-F238E27FC236}">
+                <a16:creationId xmlns:a16="http://schemas.microsoft.com/office/drawing/2014/main" id="{4BA810A5-FA2E-4209-E1E2-18611CC25076}"/>
+              </a:ext>
+            </a:extLst>
+          </p:cNvPr>
+          <p:cNvSpPr/>
+          <p:nvPr/>
+        </p:nvSpPr>
+        <p:spPr>
+          <a:xfrm>
+            <a:off x="661041" y="5087199"/>
+            <a:ext cx="4970099" cy="1574767"/>
+          </a:xfrm>
+          <a:prstGeom prst="rect">
+            <a:avLst/>
+          </a:prstGeom>
+          <a:ln>
+            <a:solidFill>
+              <a:schemeClr val="bg1"/>
+            </a:solidFill>
+          </a:ln>
+        </p:spPr>
+        <p:style>
+          <a:lnRef idx="2">
+            <a:schemeClr val="accent1">
+              <a:shade val="15000"/>
+            </a:schemeClr>
+          </a:lnRef>
+          <a:fillRef idx="1">
+            <a:schemeClr val="accent1"/>
+          </a:fillRef>
+          <a:effectRef idx="0">
+            <a:schemeClr val="accent1"/>
+          </a:effectRef>
+          <a:fontRef idx="minor">
+            <a:schemeClr val="lt1"/>
+          </a:fontRef>
+        </p:style>
+        <p:txBody>
+          <a:bodyPr wrap="none" rtlCol="0" anchor="t" anchorCtr="0"/>
+          <a:lstStyle/>
+          <a:p>
+            <a:r>
+              <a:rPr lang="en-GB" dirty="0" err="1"/>
+              <a:t>ResearchStudyStudyAmendment</a:t>
+            </a:r>
+            <a:r>
+              <a:rPr lang="en-GB" dirty="0"/>
+              <a:t> </a:t>
+            </a:r>
+          </a:p>
+          <a:p>
+            <a:endParaRPr lang="en-GB" dirty="0"/>
+          </a:p>
+        </p:txBody>
+      </p:sp>
+      <p:sp>
+        <p:nvSpPr>
+          <p:cNvPr id="10" name="Rectangle 9">
+            <a:extLst>
+              <a:ext uri="{FF2B5EF4-FFF2-40B4-BE49-F238E27FC236}">
+                <a16:creationId xmlns:a16="http://schemas.microsoft.com/office/drawing/2014/main" id="{CBD8487E-6F6A-8823-A386-1285AE356E87}"/>
+              </a:ext>
+            </a:extLst>
+          </p:cNvPr>
+          <p:cNvSpPr/>
+          <p:nvPr/>
+        </p:nvSpPr>
+        <p:spPr>
+          <a:xfrm>
+            <a:off x="1034056" y="5451313"/>
+            <a:ext cx="4424553" cy="417024"/>
+          </a:xfrm>
+          <a:prstGeom prst="rect">
+            <a:avLst/>
+          </a:prstGeom>
+          <a:ln>
+            <a:solidFill>
+              <a:schemeClr val="bg1"/>
+            </a:solidFill>
+          </a:ln>
+        </p:spPr>
+        <p:style>
+          <a:lnRef idx="2">
+            <a:schemeClr val="accent1">
+              <a:shade val="15000"/>
+            </a:schemeClr>
+          </a:lnRef>
+          <a:fillRef idx="1">
+            <a:schemeClr val="accent1"/>
+          </a:fillRef>
+          <a:effectRef idx="0">
+            <a:schemeClr val="accent1"/>
+          </a:effectRef>
+          <a:fontRef idx="minor">
+            <a:schemeClr val="lt1"/>
+          </a:fontRef>
+        </p:style>
+        <p:txBody>
+          <a:bodyPr wrap="none" rtlCol="0" anchor="t" anchorCtr="0"/>
+          <a:lstStyle/>
+          <a:p>
+            <a:r>
+              <a:rPr lang="en-GB" dirty="0" err="1"/>
+              <a:t>ResearchStudyStudyAmendmentDetails</a:t>
+            </a:r>
+            <a:r>
+              <a:rPr lang="en-GB" dirty="0"/>
+              <a:t> </a:t>
+            </a:r>
+          </a:p>
+          <a:p>
+            <a:endParaRPr lang="en-GB" dirty="0"/>
+          </a:p>
+        </p:txBody>
+      </p:sp>
+      <p:sp>
+        <p:nvSpPr>
+          <p:cNvPr id="11" name="Rectangle 10">
+            <a:extLst>
+              <a:ext uri="{FF2B5EF4-FFF2-40B4-BE49-F238E27FC236}">
+                <a16:creationId xmlns:a16="http://schemas.microsoft.com/office/drawing/2014/main" id="{AC8112E2-9DAB-5DB1-073B-C77821FBC360}"/>
+              </a:ext>
+            </a:extLst>
+          </p:cNvPr>
+          <p:cNvSpPr/>
+          <p:nvPr/>
+        </p:nvSpPr>
+        <p:spPr>
+          <a:xfrm>
+            <a:off x="1034056" y="5916326"/>
+            <a:ext cx="4424553" cy="481193"/>
+          </a:xfrm>
+          <a:prstGeom prst="rect">
+            <a:avLst/>
+          </a:prstGeom>
+          <a:ln>
+            <a:solidFill>
+              <a:schemeClr val="bg1"/>
+            </a:solidFill>
+          </a:ln>
+        </p:spPr>
+        <p:style>
+          <a:lnRef idx="2">
+            <a:schemeClr val="accent1">
+              <a:shade val="15000"/>
+            </a:schemeClr>
+          </a:lnRef>
+          <a:fillRef idx="1">
+            <a:schemeClr val="accent1"/>
+          </a:fillRef>
+          <a:effectRef idx="0">
+            <a:schemeClr val="accent1"/>
+          </a:effectRef>
+          <a:fontRef idx="minor">
+            <a:schemeClr val="lt1"/>
+          </a:fontRef>
+        </p:style>
+        <p:txBody>
+          <a:bodyPr wrap="none" rtlCol="0" anchor="t" anchorCtr="0"/>
+          <a:lstStyle/>
+          <a:p>
+            <a:r>
+              <a:rPr lang="en-GB" dirty="0" err="1"/>
+              <a:t>ResearchStudyStudyAmendmentScopeImpact</a:t>
+            </a:r>
+            <a:endParaRPr lang="en-GB" dirty="0"/>
+          </a:p>
+          <a:p>
+            <a:r>
+              <a:rPr lang="en-GB" dirty="0"/>
+              <a:t> </a:t>
+            </a:r>
+          </a:p>
+          <a:p>
+            <a:endParaRPr lang="en-GB" dirty="0"/>
+          </a:p>
+        </p:txBody>
+      </p:sp>
+      <p:sp>
+        <p:nvSpPr>
+          <p:cNvPr id="12" name="Rectangle 11">
+            <a:extLst>
+              <a:ext uri="{FF2B5EF4-FFF2-40B4-BE49-F238E27FC236}">
+                <a16:creationId xmlns:a16="http://schemas.microsoft.com/office/drawing/2014/main" id="{A9278683-41F7-1920-536C-E5C57E027B31}"/>
+              </a:ext>
+            </a:extLst>
+          </p:cNvPr>
+          <p:cNvSpPr/>
+          <p:nvPr/>
+        </p:nvSpPr>
+        <p:spPr>
+          <a:xfrm>
+            <a:off x="6469811" y="3808718"/>
+            <a:ext cx="3651849" cy="1576538"/>
+          </a:xfrm>
+          <a:prstGeom prst="rect">
+            <a:avLst/>
+          </a:prstGeom>
+        </p:spPr>
+        <p:style>
+          <a:lnRef idx="2">
+            <a:schemeClr val="accent1">
+              <a:shade val="15000"/>
+            </a:schemeClr>
+          </a:lnRef>
+          <a:fillRef idx="1">
+            <a:schemeClr val="accent1"/>
+          </a:fillRef>
+          <a:effectRef idx="0">
+            <a:schemeClr val="accent1"/>
+          </a:effectRef>
+          <a:fontRef idx="minor">
+            <a:schemeClr val="lt1"/>
+          </a:fontRef>
+        </p:style>
+        <p:txBody>
+          <a:bodyPr wrap="none" rtlCol="0" anchor="t" anchorCtr="0"/>
+          <a:lstStyle/>
+          <a:p>
+            <a:r>
+              <a:rPr lang="en-GB" dirty="0"/>
+              <a:t>Composition</a:t>
+            </a:r>
+          </a:p>
+        </p:txBody>
+      </p:sp>
+      <p:sp>
+        <p:nvSpPr>
+          <p:cNvPr id="13" name="Rectangle 12">
+            <a:extLst>
+              <a:ext uri="{FF2B5EF4-FFF2-40B4-BE49-F238E27FC236}">
+                <a16:creationId xmlns:a16="http://schemas.microsoft.com/office/drawing/2014/main" id="{8638B1A7-2AAE-0C8D-33C5-C36A35B62B50}"/>
+              </a:ext>
+            </a:extLst>
+          </p:cNvPr>
+          <p:cNvSpPr/>
+          <p:nvPr/>
+        </p:nvSpPr>
+        <p:spPr>
+          <a:xfrm>
+            <a:off x="6633491" y="4221442"/>
+            <a:ext cx="3384653" cy="1002787"/>
+          </a:xfrm>
+          <a:prstGeom prst="rect">
+            <a:avLst/>
+          </a:prstGeom>
+          <a:solidFill>
+            <a:schemeClr val="accent2"/>
+          </a:solidFill>
+          <a:ln>
+            <a:solidFill>
+              <a:schemeClr val="bg1"/>
+            </a:solidFill>
+          </a:ln>
+        </p:spPr>
+        <p:style>
+          <a:lnRef idx="2">
+            <a:schemeClr val="accent1">
+              <a:shade val="15000"/>
+            </a:schemeClr>
+          </a:lnRef>
+          <a:fillRef idx="1">
+            <a:schemeClr val="accent1"/>
+          </a:fillRef>
+          <a:effectRef idx="0">
+            <a:schemeClr val="accent1"/>
+          </a:effectRef>
+          <a:fontRef idx="minor">
+            <a:schemeClr val="lt1"/>
+          </a:fontRef>
+        </p:style>
+        <p:txBody>
+          <a:bodyPr wrap="none" rtlCol="0" anchor="t" anchorCtr="0"/>
+          <a:lstStyle/>
+          <a:p>
+            <a:r>
+              <a:rPr lang="en-GB" dirty="0" err="1"/>
+              <a:t>ResearchStudyNarratives</a:t>
+            </a:r>
+            <a:endParaRPr lang="en-GB" dirty="0"/>
+          </a:p>
+        </p:txBody>
+      </p:sp>
+      <p:sp>
+        <p:nvSpPr>
+          <p:cNvPr id="8" name="Rectangle 7">
+            <a:extLst>
+              <a:ext uri="{FF2B5EF4-FFF2-40B4-BE49-F238E27FC236}">
+                <a16:creationId xmlns:a16="http://schemas.microsoft.com/office/drawing/2014/main" id="{628CCE88-88B0-F158-B91C-26C50F4646BD}"/>
+              </a:ext>
+            </a:extLst>
+          </p:cNvPr>
+          <p:cNvSpPr/>
+          <p:nvPr/>
+        </p:nvSpPr>
+        <p:spPr>
+          <a:xfrm>
+            <a:off x="6745458" y="4629052"/>
+            <a:ext cx="3115994" cy="422676"/>
+          </a:xfrm>
+          <a:prstGeom prst="rect">
+            <a:avLst/>
+          </a:prstGeom>
+          <a:solidFill>
+            <a:schemeClr val="accent2"/>
+          </a:solidFill>
+          <a:ln>
+            <a:solidFill>
+              <a:schemeClr val="bg1"/>
+            </a:solidFill>
+          </a:ln>
+        </p:spPr>
+        <p:style>
+          <a:lnRef idx="2">
+            <a:schemeClr val="accent1">
+              <a:shade val="15000"/>
+            </a:schemeClr>
+          </a:lnRef>
+          <a:fillRef idx="1">
+            <a:schemeClr val="accent1"/>
+          </a:fillRef>
+          <a:effectRef idx="0">
+            <a:schemeClr val="accent1"/>
+          </a:effectRef>
+          <a:fontRef idx="minor">
+            <a:schemeClr val="lt1"/>
+          </a:fontRef>
+        </p:style>
+        <p:txBody>
+          <a:bodyPr wrap="none" rtlCol="0" anchor="t" anchorCtr="0"/>
+          <a:lstStyle/>
+          <a:p>
+            <a:r>
+              <a:rPr lang="en-GB" dirty="0"/>
+              <a:t>M11ResearchStudyNarratives</a:t>
+            </a:r>
+          </a:p>
+        </p:txBody>
+      </p:sp>
+      <p:sp>
+        <p:nvSpPr>
+          <p:cNvPr id="14" name="Rectangle 13">
+            <a:extLst>
+              <a:ext uri="{FF2B5EF4-FFF2-40B4-BE49-F238E27FC236}">
+                <a16:creationId xmlns:a16="http://schemas.microsoft.com/office/drawing/2014/main" id="{372C3B8F-7F8E-1987-F728-8E6CB91C53AC}"/>
+              </a:ext>
+            </a:extLst>
+          </p:cNvPr>
+          <p:cNvSpPr/>
+          <p:nvPr/>
+        </p:nvSpPr>
+        <p:spPr>
+          <a:xfrm>
+            <a:off x="455190" y="2807518"/>
+            <a:ext cx="2723492" cy="422676"/>
+          </a:xfrm>
+          <a:prstGeom prst="rect">
+            <a:avLst/>
+          </a:prstGeom>
+          <a:solidFill>
+            <a:schemeClr val="accent2"/>
+          </a:solidFill>
+          <a:ln>
+            <a:solidFill>
+              <a:schemeClr val="bg1"/>
+            </a:solidFill>
+          </a:ln>
+        </p:spPr>
+        <p:style>
+          <a:lnRef idx="2">
+            <a:schemeClr val="accent1">
+              <a:shade val="15000"/>
+            </a:schemeClr>
+          </a:lnRef>
+          <a:fillRef idx="1">
+            <a:schemeClr val="accent1"/>
+          </a:fillRef>
+          <a:effectRef idx="0">
+            <a:schemeClr val="accent1"/>
+          </a:effectRef>
+          <a:fontRef idx="minor">
+            <a:schemeClr val="lt1"/>
+          </a:fontRef>
+        </p:style>
+        <p:txBody>
+          <a:bodyPr wrap="none" rtlCol="0" anchor="t" anchorCtr="0"/>
+          <a:lstStyle/>
+          <a:p>
+            <a:r>
+              <a:rPr lang="en-GB" dirty="0"/>
+              <a:t>M11_ResearchStudyProfile</a:t>
+            </a:r>
+          </a:p>
+        </p:txBody>
+      </p:sp>
+      <p:sp>
+        <p:nvSpPr>
+          <p:cNvPr id="15" name="Arrow: Right 14">
+            <a:extLst>
+              <a:ext uri="{FF2B5EF4-FFF2-40B4-BE49-F238E27FC236}">
+                <a16:creationId xmlns:a16="http://schemas.microsoft.com/office/drawing/2014/main" id="{871DA789-4B60-A761-0BA3-785B7D5932CF}"/>
+              </a:ext>
+            </a:extLst>
+          </p:cNvPr>
+          <p:cNvSpPr/>
+          <p:nvPr/>
+        </p:nvSpPr>
+        <p:spPr>
+          <a:xfrm>
+            <a:off x="5003321" y="4615621"/>
+            <a:ext cx="1817298" cy="471578"/>
+          </a:xfrm>
+          <a:prstGeom prst="rightArrow">
+            <a:avLst/>
+          </a:prstGeom>
+          <a:ln w="38100">
+            <a:solidFill>
+              <a:schemeClr val="bg1"/>
+            </a:solidFill>
+          </a:ln>
+        </p:spPr>
+        <p:style>
+          <a:lnRef idx="2">
+            <a:schemeClr val="accent1">
+              <a:shade val="15000"/>
+            </a:schemeClr>
+          </a:lnRef>
+          <a:fillRef idx="1">
+            <a:schemeClr val="accent1"/>
+          </a:fillRef>
+          <a:effectRef idx="0">
+            <a:schemeClr val="accent1"/>
+          </a:effectRef>
+          <a:fontRef idx="minor">
+            <a:schemeClr val="lt1"/>
+          </a:fontRef>
+        </p:style>
+        <p:txBody>
+          <a:bodyPr rtlCol="0" anchor="ctr"/>
+          <a:lstStyle/>
+          <a:p>
+            <a:pPr algn="ctr"/>
+            <a:endParaRPr lang="en-GB"/>
+          </a:p>
+        </p:txBody>
+      </p:sp>
+      <p:sp>
+        <p:nvSpPr>
+          <p:cNvPr id="16" name="Rectangle 15">
+            <a:extLst>
+              <a:ext uri="{FF2B5EF4-FFF2-40B4-BE49-F238E27FC236}">
+                <a16:creationId xmlns:a16="http://schemas.microsoft.com/office/drawing/2014/main" id="{FEE24864-29A5-4494-38B1-2B914F45BFA7}"/>
+              </a:ext>
+            </a:extLst>
+          </p:cNvPr>
+          <p:cNvSpPr/>
+          <p:nvPr/>
+        </p:nvSpPr>
+        <p:spPr>
+          <a:xfrm>
+            <a:off x="1034055" y="3792351"/>
+            <a:ext cx="4424553" cy="371333"/>
+          </a:xfrm>
+          <a:prstGeom prst="rect">
+            <a:avLst/>
+          </a:prstGeom>
+          <a:solidFill>
+            <a:schemeClr val="accent4"/>
+          </a:solidFill>
+          <a:ln>
+            <a:solidFill>
+              <a:schemeClr val="bg1"/>
+            </a:solidFill>
+          </a:ln>
+        </p:spPr>
+        <p:style>
+          <a:lnRef idx="2">
+            <a:schemeClr val="accent1">
+              <a:shade val="15000"/>
+            </a:schemeClr>
+          </a:lnRef>
+          <a:fillRef idx="1">
+            <a:schemeClr val="accent1"/>
+          </a:fillRef>
+          <a:effectRef idx="0">
+            <a:schemeClr val="accent1"/>
+          </a:effectRef>
+          <a:fontRef idx="minor">
+            <a:schemeClr val="lt1"/>
+          </a:fontRef>
+        </p:style>
+        <p:txBody>
+          <a:bodyPr wrap="none" rtlCol="0" anchor="t" anchorCtr="0"/>
+          <a:lstStyle/>
+          <a:p>
+            <a:r>
+              <a:rPr lang="en-GB" dirty="0" err="1"/>
+              <a:t>SAEReporting</a:t>
+            </a:r>
+            <a:endParaRPr lang="en-GB" dirty="0"/>
+          </a:p>
+        </p:txBody>
+      </p:sp>
+      <p:sp>
+        <p:nvSpPr>
+          <p:cNvPr id="17" name="Rectangle 16">
+            <a:extLst>
+              <a:ext uri="{FF2B5EF4-FFF2-40B4-BE49-F238E27FC236}">
+                <a16:creationId xmlns:a16="http://schemas.microsoft.com/office/drawing/2014/main" id="{E3AC17C0-4FBF-96E5-A625-B36E09080856}"/>
+              </a:ext>
+            </a:extLst>
+          </p:cNvPr>
+          <p:cNvSpPr/>
+          <p:nvPr/>
+        </p:nvSpPr>
+        <p:spPr>
+          <a:xfrm>
+            <a:off x="1034055" y="4223913"/>
+            <a:ext cx="4424553" cy="371333"/>
+          </a:xfrm>
+          <a:prstGeom prst="rect">
+            <a:avLst/>
+          </a:prstGeom>
+          <a:solidFill>
+            <a:schemeClr val="accent4"/>
+          </a:solidFill>
+          <a:ln>
+            <a:solidFill>
+              <a:schemeClr val="bg1"/>
+            </a:solidFill>
+          </a:ln>
+        </p:spPr>
+        <p:style>
+          <a:lnRef idx="2">
+            <a:schemeClr val="accent1">
+              <a:shade val="15000"/>
+            </a:schemeClr>
+          </a:lnRef>
+          <a:fillRef idx="1">
+            <a:schemeClr val="accent1"/>
+          </a:fillRef>
+          <a:effectRef idx="0">
+            <a:schemeClr val="accent1"/>
+          </a:effectRef>
+          <a:fontRef idx="minor">
+            <a:schemeClr val="lt1"/>
+          </a:fontRef>
+        </p:style>
+        <p:txBody>
+          <a:bodyPr wrap="none" rtlCol="0" anchor="t" anchorCtr="0"/>
+          <a:lstStyle/>
+          <a:p>
+            <a:r>
+              <a:rPr lang="en-GB" dirty="0" err="1"/>
+              <a:t>ConfidentialityStatement</a:t>
+            </a:r>
+            <a:endParaRPr lang="en-GB" dirty="0"/>
+          </a:p>
+        </p:txBody>
+      </p:sp>
+    </p:spTree>
+    <p:extLst>
+      <p:ext uri="{BB962C8B-B14F-4D97-AF65-F5344CB8AC3E}">
+        <p14:creationId xmlns:p14="http://schemas.microsoft.com/office/powerpoint/2010/main" val="184038803"/>
+      </p:ext>
+    </p:extLst>
+  </p:cSld>
+  <p:clrMapOvr>
+    <a:masterClrMapping/>
+  </p:clrMapOvr>
+</p:sld>
+</file>
+
+<file path=ppt/slides/slide6.xml><?xml version="1.0" encoding="utf-8"?>
+<p:sld xmlns:a="http://schemas.openxmlformats.org/drawingml/2006/main" xmlns:r="http://schemas.openxmlformats.org/officeDocument/2006/relationships" xmlns:p="http://schemas.openxmlformats.org/presentationml/2006/main">
+  <p:cSld>
+    <p:spTree>
+      <p:nvGrpSpPr>
+        <p:cNvPr id="1" name=""/>
+        <p:cNvGrpSpPr/>
+        <p:nvPr/>
+      </p:nvGrpSpPr>
+      <p:grpSpPr>
+        <a:xfrm>
+          <a:off x="0" y="0"/>
+          <a:ext cx="0" cy="0"/>
+          <a:chOff x="0" y="0"/>
+          <a:chExt cx="0" cy="0"/>
+        </a:xfrm>
+      </p:grpSpPr>
+      <p:sp>
+        <p:nvSpPr>
+          <p:cNvPr id="2" name="Rectangle 1">
+            <a:extLst>
+              <a:ext uri="{FF2B5EF4-FFF2-40B4-BE49-F238E27FC236}">
+                <a16:creationId xmlns:a16="http://schemas.microsoft.com/office/drawing/2014/main" id="{A428D5B9-DFF1-3C84-B3E4-3F581C93F88C}"/>
+              </a:ext>
+            </a:extLst>
+          </p:cNvPr>
+          <p:cNvSpPr/>
+          <p:nvPr/>
+        </p:nvSpPr>
+        <p:spPr>
+          <a:xfrm>
+            <a:off x="156691" y="206326"/>
+            <a:ext cx="3219113" cy="4273660"/>
+          </a:xfrm>
+          <a:prstGeom prst="rect">
+            <a:avLst/>
+          </a:prstGeom>
+          <a:solidFill>
+            <a:schemeClr val="accent3"/>
+          </a:solidFill>
+          <a:ln>
+            <a:solidFill>
+              <a:schemeClr val="bg1"/>
+            </a:solidFill>
+          </a:ln>
+        </p:spPr>
+        <p:style>
+          <a:lnRef idx="2">
+            <a:schemeClr val="accent1">
+              <a:shade val="15000"/>
+            </a:schemeClr>
+          </a:lnRef>
+          <a:fillRef idx="1">
+            <a:schemeClr val="accent1"/>
+          </a:fillRef>
+          <a:effectRef idx="0">
+            <a:schemeClr val="accent1"/>
+          </a:effectRef>
+          <a:fontRef idx="minor">
+            <a:schemeClr val="lt1"/>
+          </a:fontRef>
+        </p:style>
+        <p:txBody>
+          <a:bodyPr wrap="none" rtlCol="0" anchor="t" anchorCtr="0"/>
+          <a:lstStyle/>
+          <a:p>
+            <a:r>
+              <a:rPr lang="en-GB" dirty="0" err="1"/>
+              <a:t>ResearchStudy</a:t>
+            </a:r>
+            <a:endParaRPr lang="en-GB" dirty="0"/>
+          </a:p>
+        </p:txBody>
+      </p:sp>
+      <p:sp>
+        <p:nvSpPr>
+          <p:cNvPr id="19" name="Rectangle 18">
+            <a:extLst>
+              <a:ext uri="{FF2B5EF4-FFF2-40B4-BE49-F238E27FC236}">
+                <a16:creationId xmlns:a16="http://schemas.microsoft.com/office/drawing/2014/main" id="{B7926905-7703-0C5E-9D04-9004D7806E73}"/>
+              </a:ext>
+            </a:extLst>
+          </p:cNvPr>
+          <p:cNvSpPr/>
+          <p:nvPr/>
+        </p:nvSpPr>
+        <p:spPr>
+          <a:xfrm>
+            <a:off x="288111" y="641116"/>
+            <a:ext cx="2961172" cy="3585827"/>
+          </a:xfrm>
+          <a:prstGeom prst="rect">
+            <a:avLst/>
+          </a:prstGeom>
+          <a:solidFill>
+            <a:schemeClr val="accent6"/>
+          </a:solidFill>
+          <a:ln w="38100">
+            <a:solidFill>
+              <a:schemeClr val="bg1"/>
+            </a:solidFill>
+          </a:ln>
+        </p:spPr>
+        <p:style>
+          <a:lnRef idx="2">
+            <a:schemeClr val="accent1">
+              <a:shade val="15000"/>
+            </a:schemeClr>
+          </a:lnRef>
+          <a:fillRef idx="1">
+            <a:schemeClr val="accent1"/>
+          </a:fillRef>
+          <a:effectRef idx="0">
+            <a:schemeClr val="accent1"/>
+          </a:effectRef>
+          <a:fontRef idx="minor">
+            <a:schemeClr val="lt1"/>
+          </a:fontRef>
+        </p:style>
+        <p:txBody>
+          <a:bodyPr wrap="none" rtlCol="0" anchor="t" anchorCtr="0"/>
+          <a:lstStyle/>
+          <a:p>
+            <a:r>
+              <a:rPr lang="en-GB" dirty="0" err="1"/>
+              <a:t>StudyDesign</a:t>
+            </a:r>
+            <a:endParaRPr lang="en-GB" dirty="0"/>
+          </a:p>
+        </p:txBody>
+      </p:sp>
+      <p:sp>
+        <p:nvSpPr>
+          <p:cNvPr id="4" name="Rectangle 3">
+            <a:extLst>
+              <a:ext uri="{FF2B5EF4-FFF2-40B4-BE49-F238E27FC236}">
+                <a16:creationId xmlns:a16="http://schemas.microsoft.com/office/drawing/2014/main" id="{9C9A7485-1BDC-2014-DE43-CD8CBA6152E1}"/>
+              </a:ext>
+            </a:extLst>
+          </p:cNvPr>
+          <p:cNvSpPr/>
+          <p:nvPr/>
+        </p:nvSpPr>
+        <p:spPr>
+          <a:xfrm>
+            <a:off x="3853378" y="2587951"/>
+            <a:ext cx="2537130" cy="426561"/>
+          </a:xfrm>
+          <a:prstGeom prst="rect">
+            <a:avLst/>
+          </a:prstGeom>
+          <a:ln>
+            <a:solidFill>
+              <a:schemeClr val="bg1"/>
+            </a:solidFill>
+          </a:ln>
+        </p:spPr>
+        <p:style>
+          <a:lnRef idx="2">
+            <a:schemeClr val="accent1">
+              <a:shade val="15000"/>
+            </a:schemeClr>
+          </a:lnRef>
+          <a:fillRef idx="1">
+            <a:schemeClr val="accent1"/>
+          </a:fillRef>
+          <a:effectRef idx="0">
+            <a:schemeClr val="accent1"/>
+          </a:effectRef>
+          <a:fontRef idx="minor">
+            <a:schemeClr val="lt1"/>
+          </a:fontRef>
+        </p:style>
+        <p:txBody>
+          <a:bodyPr wrap="none" rtlCol="0" anchor="t" anchorCtr="0"/>
+          <a:lstStyle/>
+          <a:p>
+            <a:r>
+              <a:rPr lang="en-GB" dirty="0" err="1"/>
+              <a:t>NarrativeElements</a:t>
+            </a:r>
+            <a:endParaRPr lang="en-GB" dirty="0"/>
+          </a:p>
+        </p:txBody>
+      </p:sp>
+      <p:sp>
+        <p:nvSpPr>
+          <p:cNvPr id="8" name="Rectangle 7">
+            <a:extLst>
+              <a:ext uri="{FF2B5EF4-FFF2-40B4-BE49-F238E27FC236}">
+                <a16:creationId xmlns:a16="http://schemas.microsoft.com/office/drawing/2014/main" id="{77F97369-C434-94ED-4CC3-AB8B48EEB014}"/>
+              </a:ext>
+            </a:extLst>
+          </p:cNvPr>
+          <p:cNvSpPr/>
+          <p:nvPr/>
+        </p:nvSpPr>
+        <p:spPr>
+          <a:xfrm>
+            <a:off x="7229180" y="2190853"/>
+            <a:ext cx="3651849" cy="903306"/>
+          </a:xfrm>
+          <a:prstGeom prst="rect">
+            <a:avLst/>
+          </a:prstGeom>
+        </p:spPr>
+        <p:style>
+          <a:lnRef idx="2">
+            <a:schemeClr val="accent1">
+              <a:shade val="15000"/>
+            </a:schemeClr>
+          </a:lnRef>
+          <a:fillRef idx="1">
+            <a:schemeClr val="accent1"/>
+          </a:fillRef>
+          <a:effectRef idx="0">
+            <a:schemeClr val="accent1"/>
+          </a:effectRef>
+          <a:fontRef idx="minor">
+            <a:schemeClr val="lt1"/>
+          </a:fontRef>
+        </p:style>
+        <p:txBody>
+          <a:bodyPr wrap="none" rtlCol="0" anchor="t" anchorCtr="0"/>
+          <a:lstStyle/>
+          <a:p>
+            <a:r>
+              <a:rPr lang="en-GB" dirty="0"/>
+              <a:t>Composition</a:t>
+            </a:r>
+          </a:p>
+        </p:txBody>
+      </p:sp>
+      <p:sp>
+        <p:nvSpPr>
+          <p:cNvPr id="10" name="Rectangle 9">
+            <a:extLst>
+              <a:ext uri="{FF2B5EF4-FFF2-40B4-BE49-F238E27FC236}">
+                <a16:creationId xmlns:a16="http://schemas.microsoft.com/office/drawing/2014/main" id="{EF2A7B39-A5E1-3CBB-0881-01B24B25A54A}"/>
+              </a:ext>
+            </a:extLst>
+          </p:cNvPr>
+          <p:cNvSpPr/>
+          <p:nvPr/>
+        </p:nvSpPr>
+        <p:spPr>
+          <a:xfrm>
+            <a:off x="7504827" y="2556365"/>
+            <a:ext cx="3115994" cy="422676"/>
+          </a:xfrm>
+          <a:prstGeom prst="rect">
+            <a:avLst/>
+          </a:prstGeom>
+          <a:solidFill>
+            <a:schemeClr val="accent2"/>
+          </a:solidFill>
+          <a:ln>
+            <a:solidFill>
+              <a:schemeClr val="bg1"/>
+            </a:solidFill>
+          </a:ln>
+        </p:spPr>
+        <p:style>
+          <a:lnRef idx="2">
+            <a:schemeClr val="accent1">
+              <a:shade val="15000"/>
+            </a:schemeClr>
+          </a:lnRef>
+          <a:fillRef idx="1">
+            <a:schemeClr val="accent1"/>
+          </a:fillRef>
+          <a:effectRef idx="0">
+            <a:schemeClr val="accent1"/>
+          </a:effectRef>
+          <a:fontRef idx="minor">
+            <a:schemeClr val="lt1"/>
+          </a:fontRef>
+        </p:style>
+        <p:txBody>
+          <a:bodyPr wrap="none" rtlCol="0" anchor="t" anchorCtr="0"/>
+          <a:lstStyle/>
+          <a:p>
+            <a:r>
+              <a:rPr lang="en-GB" dirty="0"/>
+              <a:t>M11ResearchStudyNarratives</a:t>
+            </a:r>
+          </a:p>
+        </p:txBody>
+      </p:sp>
+      <p:sp>
+        <p:nvSpPr>
+          <p:cNvPr id="11" name="Rectangle 10">
+            <a:extLst>
+              <a:ext uri="{FF2B5EF4-FFF2-40B4-BE49-F238E27FC236}">
+                <a16:creationId xmlns:a16="http://schemas.microsoft.com/office/drawing/2014/main" id="{9022BB3E-490F-6A15-2F03-F2316EFEA2F9}"/>
+              </a:ext>
+            </a:extLst>
+          </p:cNvPr>
+          <p:cNvSpPr/>
+          <p:nvPr/>
+        </p:nvSpPr>
+        <p:spPr>
+          <a:xfrm>
+            <a:off x="491423" y="2265872"/>
+            <a:ext cx="2628032" cy="1871408"/>
+          </a:xfrm>
+          <a:prstGeom prst="rect">
+            <a:avLst/>
+          </a:prstGeom>
+          <a:solidFill>
+            <a:schemeClr val="accent2"/>
+          </a:solidFill>
+          <a:ln>
+            <a:solidFill>
+              <a:schemeClr val="bg1"/>
+            </a:solidFill>
+          </a:ln>
+        </p:spPr>
+        <p:style>
+          <a:lnRef idx="2">
+            <a:schemeClr val="accent1">
+              <a:shade val="15000"/>
+            </a:schemeClr>
+          </a:lnRef>
+          <a:fillRef idx="1">
+            <a:schemeClr val="accent1"/>
+          </a:fillRef>
+          <a:effectRef idx="0">
+            <a:schemeClr val="accent1"/>
+          </a:effectRef>
+          <a:fontRef idx="minor">
+            <a:schemeClr val="lt1"/>
+          </a:fontRef>
+        </p:style>
+        <p:txBody>
+          <a:bodyPr wrap="none" rtlCol="0" anchor="t" anchorCtr="0"/>
+          <a:lstStyle/>
+          <a:p>
+            <a:r>
+              <a:rPr lang="en-GB" dirty="0"/>
+              <a:t>M11_ResearchStudyProfile</a:t>
+            </a:r>
+          </a:p>
+        </p:txBody>
+      </p:sp>
+      <p:sp>
+        <p:nvSpPr>
+          <p:cNvPr id="12" name="Arrow: Right 11">
+            <a:extLst>
+              <a:ext uri="{FF2B5EF4-FFF2-40B4-BE49-F238E27FC236}">
+                <a16:creationId xmlns:a16="http://schemas.microsoft.com/office/drawing/2014/main" id="{A967A5DE-4FAD-EC35-648A-C432FBBB0ADB}"/>
+              </a:ext>
+            </a:extLst>
+          </p:cNvPr>
+          <p:cNvSpPr/>
+          <p:nvPr/>
+        </p:nvSpPr>
+        <p:spPr>
+          <a:xfrm>
+            <a:off x="5762690" y="2542934"/>
+            <a:ext cx="1817298" cy="471578"/>
+          </a:xfrm>
+          <a:prstGeom prst="rightArrow">
+            <a:avLst/>
+          </a:prstGeom>
+          <a:ln w="38100">
+            <a:solidFill>
+              <a:schemeClr val="bg1"/>
+            </a:solidFill>
+          </a:ln>
+        </p:spPr>
+        <p:style>
+          <a:lnRef idx="2">
+            <a:schemeClr val="accent1">
+              <a:shade val="15000"/>
+            </a:schemeClr>
+          </a:lnRef>
+          <a:fillRef idx="1">
+            <a:schemeClr val="accent1"/>
+          </a:fillRef>
+          <a:effectRef idx="0">
+            <a:schemeClr val="accent1"/>
+          </a:effectRef>
+          <a:fontRef idx="minor">
+            <a:schemeClr val="lt1"/>
+          </a:fontRef>
+        </p:style>
+        <p:txBody>
+          <a:bodyPr rtlCol="0" anchor="ctr"/>
+          <a:lstStyle/>
+          <a:p>
+            <a:pPr algn="ctr"/>
+            <a:endParaRPr lang="en-GB"/>
+          </a:p>
+        </p:txBody>
+      </p:sp>
+      <p:sp>
+        <p:nvSpPr>
+          <p:cNvPr id="13" name="Rectangle 12">
+            <a:extLst>
+              <a:ext uri="{FF2B5EF4-FFF2-40B4-BE49-F238E27FC236}">
+                <a16:creationId xmlns:a16="http://schemas.microsoft.com/office/drawing/2014/main" id="{1EE56262-80C5-C2A4-E012-DF54B533FA7B}"/>
+              </a:ext>
+            </a:extLst>
+          </p:cNvPr>
+          <p:cNvSpPr/>
+          <p:nvPr/>
+        </p:nvSpPr>
+        <p:spPr>
+          <a:xfrm>
+            <a:off x="3870800" y="992354"/>
+            <a:ext cx="1817298" cy="371333"/>
+          </a:xfrm>
+          <a:prstGeom prst="rect">
+            <a:avLst/>
+          </a:prstGeom>
+          <a:solidFill>
+            <a:schemeClr val="accent6"/>
+          </a:solidFill>
+          <a:ln>
+            <a:solidFill>
+              <a:schemeClr val="bg1"/>
+            </a:solidFill>
+          </a:ln>
+        </p:spPr>
+        <p:style>
+          <a:lnRef idx="2">
+            <a:schemeClr val="accent1">
+              <a:shade val="15000"/>
+            </a:schemeClr>
+          </a:lnRef>
+          <a:fillRef idx="1">
+            <a:schemeClr val="accent1"/>
+          </a:fillRef>
+          <a:effectRef idx="0">
+            <a:schemeClr val="accent1"/>
+          </a:effectRef>
+          <a:fontRef idx="minor">
+            <a:schemeClr val="lt1"/>
+          </a:fontRef>
+        </p:style>
+        <p:txBody>
+          <a:bodyPr wrap="none" rtlCol="0" anchor="t" anchorCtr="0"/>
+          <a:lstStyle/>
+          <a:p>
+            <a:r>
+              <a:rPr lang="en-GB" dirty="0" err="1"/>
+              <a:t>SAEReporting</a:t>
+            </a:r>
+            <a:endParaRPr lang="en-GB" dirty="0"/>
+          </a:p>
+        </p:txBody>
+      </p:sp>
+      <p:sp>
+        <p:nvSpPr>
+          <p:cNvPr id="14" name="Rectangle 13">
+            <a:extLst>
+              <a:ext uri="{FF2B5EF4-FFF2-40B4-BE49-F238E27FC236}">
+                <a16:creationId xmlns:a16="http://schemas.microsoft.com/office/drawing/2014/main" id="{0CEFD97E-F84D-8C6C-CE22-D1E84A99736E}"/>
+              </a:ext>
+            </a:extLst>
+          </p:cNvPr>
+          <p:cNvSpPr/>
+          <p:nvPr/>
+        </p:nvSpPr>
+        <p:spPr>
+          <a:xfrm>
+            <a:off x="3870799" y="1748034"/>
+            <a:ext cx="4424553" cy="371333"/>
+          </a:xfrm>
+          <a:prstGeom prst="rect">
+            <a:avLst/>
+          </a:prstGeom>
+          <a:solidFill>
+            <a:schemeClr val="accent6"/>
+          </a:solidFill>
+          <a:ln>
+            <a:solidFill>
+              <a:schemeClr val="bg1"/>
+            </a:solidFill>
+          </a:ln>
+        </p:spPr>
+        <p:style>
+          <a:lnRef idx="2">
+            <a:schemeClr val="accent1">
+              <a:shade val="15000"/>
+            </a:schemeClr>
+          </a:lnRef>
+          <a:fillRef idx="1">
+            <a:schemeClr val="accent1"/>
+          </a:fillRef>
+          <a:effectRef idx="0">
+            <a:schemeClr val="accent1"/>
+          </a:effectRef>
+          <a:fontRef idx="minor">
+            <a:schemeClr val="lt1"/>
+          </a:fontRef>
+        </p:style>
+        <p:txBody>
+          <a:bodyPr wrap="none" rtlCol="0" anchor="t" anchorCtr="0"/>
+          <a:lstStyle/>
+          <a:p>
+            <a:r>
+              <a:rPr lang="en-GB" dirty="0" err="1"/>
+              <a:t>ConfidentialityStatement</a:t>
+            </a:r>
+            <a:endParaRPr lang="en-GB" dirty="0"/>
+          </a:p>
+        </p:txBody>
+      </p:sp>
+      <p:sp>
+        <p:nvSpPr>
+          <p:cNvPr id="5" name="Rectangle 4">
+            <a:extLst>
+              <a:ext uri="{FF2B5EF4-FFF2-40B4-BE49-F238E27FC236}">
+                <a16:creationId xmlns:a16="http://schemas.microsoft.com/office/drawing/2014/main" id="{9DCA96B9-4082-71BF-98E0-378930518641}"/>
+              </a:ext>
+            </a:extLst>
+          </p:cNvPr>
+          <p:cNvSpPr/>
+          <p:nvPr/>
+        </p:nvSpPr>
+        <p:spPr>
+          <a:xfrm>
+            <a:off x="3797248" y="3308153"/>
+            <a:ext cx="4970099" cy="1574767"/>
+          </a:xfrm>
+          <a:prstGeom prst="rect">
+            <a:avLst/>
+          </a:prstGeom>
+          <a:ln>
+            <a:solidFill>
+              <a:schemeClr val="bg1"/>
+            </a:solidFill>
+          </a:ln>
+        </p:spPr>
+        <p:style>
+          <a:lnRef idx="2">
+            <a:schemeClr val="accent1">
+              <a:shade val="15000"/>
+            </a:schemeClr>
+          </a:lnRef>
+          <a:fillRef idx="1">
+            <a:schemeClr val="accent1"/>
+          </a:fillRef>
+          <a:effectRef idx="0">
+            <a:schemeClr val="accent1"/>
+          </a:effectRef>
+          <a:fontRef idx="minor">
+            <a:schemeClr val="lt1"/>
+          </a:fontRef>
+        </p:style>
+        <p:txBody>
+          <a:bodyPr wrap="none" rtlCol="0" anchor="t" anchorCtr="0"/>
+          <a:lstStyle/>
+          <a:p>
+            <a:r>
+              <a:rPr lang="en-GB" dirty="0"/>
+              <a:t>M11_ProtocolAmendment </a:t>
+            </a:r>
+          </a:p>
+          <a:p>
+            <a:endParaRPr lang="en-GB" dirty="0"/>
+          </a:p>
+        </p:txBody>
+      </p:sp>
+      <p:sp>
+        <p:nvSpPr>
+          <p:cNvPr id="6" name="Rectangle 5">
+            <a:extLst>
+              <a:ext uri="{FF2B5EF4-FFF2-40B4-BE49-F238E27FC236}">
+                <a16:creationId xmlns:a16="http://schemas.microsoft.com/office/drawing/2014/main" id="{DAE8DE3D-306A-A739-ABA1-26B8DD6012B1}"/>
+              </a:ext>
+            </a:extLst>
+          </p:cNvPr>
+          <p:cNvSpPr/>
+          <p:nvPr/>
+        </p:nvSpPr>
+        <p:spPr>
+          <a:xfrm>
+            <a:off x="4170263" y="3672267"/>
+            <a:ext cx="4424553" cy="417024"/>
+          </a:xfrm>
+          <a:prstGeom prst="rect">
+            <a:avLst/>
+          </a:prstGeom>
+          <a:ln>
+            <a:solidFill>
+              <a:schemeClr val="bg1"/>
+            </a:solidFill>
+          </a:ln>
+        </p:spPr>
+        <p:style>
+          <a:lnRef idx="2">
+            <a:schemeClr val="accent1">
+              <a:shade val="15000"/>
+            </a:schemeClr>
+          </a:lnRef>
+          <a:fillRef idx="1">
+            <a:schemeClr val="accent1"/>
+          </a:fillRef>
+          <a:effectRef idx="0">
+            <a:schemeClr val="accent1"/>
+          </a:effectRef>
+          <a:fontRef idx="minor">
+            <a:schemeClr val="lt1"/>
+          </a:fontRef>
+        </p:style>
+        <p:txBody>
+          <a:bodyPr wrap="none" rtlCol="0" anchor="t" anchorCtr="0"/>
+          <a:lstStyle/>
+          <a:p>
+            <a:r>
+              <a:rPr lang="en-GB" dirty="0" err="1"/>
+              <a:t>ResearchStudyStudyAmendmentDetails</a:t>
+            </a:r>
+            <a:r>
+              <a:rPr lang="en-GB" dirty="0"/>
+              <a:t> </a:t>
+            </a:r>
+          </a:p>
+          <a:p>
+            <a:endParaRPr lang="en-GB" dirty="0"/>
+          </a:p>
+        </p:txBody>
+      </p:sp>
+      <p:sp>
+        <p:nvSpPr>
+          <p:cNvPr id="7" name="Rectangle 6">
+            <a:extLst>
+              <a:ext uri="{FF2B5EF4-FFF2-40B4-BE49-F238E27FC236}">
+                <a16:creationId xmlns:a16="http://schemas.microsoft.com/office/drawing/2014/main" id="{B0A967C7-B667-BBC7-DCEF-14B5C47C58E6}"/>
+              </a:ext>
+            </a:extLst>
+          </p:cNvPr>
+          <p:cNvSpPr/>
+          <p:nvPr/>
+        </p:nvSpPr>
+        <p:spPr>
+          <a:xfrm>
+            <a:off x="4170263" y="4137280"/>
+            <a:ext cx="4424553" cy="481193"/>
+          </a:xfrm>
+          <a:prstGeom prst="rect">
+            <a:avLst/>
+          </a:prstGeom>
+          <a:ln>
+            <a:solidFill>
+              <a:schemeClr val="bg1"/>
+            </a:solidFill>
+          </a:ln>
+        </p:spPr>
+        <p:style>
+          <a:lnRef idx="2">
+            <a:schemeClr val="accent1">
+              <a:shade val="15000"/>
+            </a:schemeClr>
+          </a:lnRef>
+          <a:fillRef idx="1">
+            <a:schemeClr val="accent1"/>
+          </a:fillRef>
+          <a:effectRef idx="0">
+            <a:schemeClr val="accent1"/>
+          </a:effectRef>
+          <a:fontRef idx="minor">
+            <a:schemeClr val="lt1"/>
+          </a:fontRef>
+        </p:style>
+        <p:txBody>
+          <a:bodyPr wrap="none" rtlCol="0" anchor="t" anchorCtr="0"/>
+          <a:lstStyle/>
+          <a:p>
+            <a:r>
+              <a:rPr lang="en-GB" dirty="0" err="1"/>
+              <a:t>ResearchStudyStudyAmendmentScopeImpact</a:t>
+            </a:r>
+            <a:endParaRPr lang="en-GB" dirty="0"/>
+          </a:p>
+          <a:p>
+            <a:r>
+              <a:rPr lang="en-GB" dirty="0"/>
+              <a:t> </a:t>
+            </a:r>
+          </a:p>
+          <a:p>
+            <a:endParaRPr lang="en-GB" dirty="0"/>
+          </a:p>
+        </p:txBody>
+      </p:sp>
+      <p:sp>
+        <p:nvSpPr>
+          <p:cNvPr id="15" name="Arrow: Right 14">
+            <a:extLst>
+              <a:ext uri="{FF2B5EF4-FFF2-40B4-BE49-F238E27FC236}">
+                <a16:creationId xmlns:a16="http://schemas.microsoft.com/office/drawing/2014/main" id="{65263392-286B-6026-A5FD-036B9CE9C10F}"/>
+              </a:ext>
+            </a:extLst>
+          </p:cNvPr>
+          <p:cNvSpPr/>
+          <p:nvPr/>
+        </p:nvSpPr>
+        <p:spPr>
+          <a:xfrm>
+            <a:off x="2122098" y="952338"/>
+            <a:ext cx="1817298" cy="471578"/>
+          </a:xfrm>
+          <a:prstGeom prst="rightArrow">
+            <a:avLst/>
+          </a:prstGeom>
+          <a:ln w="38100">
+            <a:solidFill>
+              <a:schemeClr val="bg1"/>
+            </a:solidFill>
+          </a:ln>
+        </p:spPr>
+        <p:style>
+          <a:lnRef idx="2">
+            <a:schemeClr val="accent1">
+              <a:shade val="15000"/>
+            </a:schemeClr>
+          </a:lnRef>
+          <a:fillRef idx="1">
+            <a:schemeClr val="accent1"/>
+          </a:fillRef>
+          <a:effectRef idx="0">
+            <a:schemeClr val="accent1"/>
+          </a:effectRef>
+          <a:fontRef idx="minor">
+            <a:schemeClr val="lt1"/>
+          </a:fontRef>
+        </p:style>
+        <p:txBody>
+          <a:bodyPr rtlCol="0" anchor="ctr"/>
+          <a:lstStyle/>
+          <a:p>
+            <a:pPr algn="ctr"/>
+            <a:endParaRPr lang="en-GB"/>
+          </a:p>
+        </p:txBody>
+      </p:sp>
+      <p:sp>
+        <p:nvSpPr>
+          <p:cNvPr id="16" name="Arrow: Right 15">
+            <a:extLst>
+              <a:ext uri="{FF2B5EF4-FFF2-40B4-BE49-F238E27FC236}">
+                <a16:creationId xmlns:a16="http://schemas.microsoft.com/office/drawing/2014/main" id="{6B908D84-1C15-3D9F-5161-A002DC1B58C3}"/>
+              </a:ext>
+            </a:extLst>
+          </p:cNvPr>
+          <p:cNvSpPr/>
+          <p:nvPr/>
+        </p:nvSpPr>
+        <p:spPr>
+          <a:xfrm>
+            <a:off x="2122098" y="1647789"/>
+            <a:ext cx="1817298" cy="471578"/>
+          </a:xfrm>
+          <a:prstGeom prst="rightArrow">
+            <a:avLst/>
+          </a:prstGeom>
+          <a:ln w="38100">
+            <a:solidFill>
+              <a:schemeClr val="bg1"/>
+            </a:solidFill>
+          </a:ln>
+        </p:spPr>
+        <p:style>
+          <a:lnRef idx="2">
+            <a:schemeClr val="accent1">
+              <a:shade val="15000"/>
+            </a:schemeClr>
+          </a:lnRef>
+          <a:fillRef idx="1">
+            <a:schemeClr val="accent1"/>
+          </a:fillRef>
+          <a:effectRef idx="0">
+            <a:schemeClr val="accent1"/>
+          </a:effectRef>
+          <a:fontRef idx="minor">
+            <a:schemeClr val="lt1"/>
+          </a:fontRef>
+        </p:style>
+        <p:txBody>
+          <a:bodyPr rtlCol="0" anchor="ctr"/>
+          <a:lstStyle/>
+          <a:p>
+            <a:pPr algn="ctr"/>
+            <a:endParaRPr lang="en-GB"/>
+          </a:p>
+        </p:txBody>
+      </p:sp>
+      <p:sp>
+        <p:nvSpPr>
+          <p:cNvPr id="17" name="Arrow: Right 16">
+            <a:extLst>
+              <a:ext uri="{FF2B5EF4-FFF2-40B4-BE49-F238E27FC236}">
+                <a16:creationId xmlns:a16="http://schemas.microsoft.com/office/drawing/2014/main" id="{76042DCC-6349-C1AB-84E6-3BA2B4A03061}"/>
+              </a:ext>
+            </a:extLst>
+          </p:cNvPr>
+          <p:cNvSpPr/>
+          <p:nvPr/>
+        </p:nvSpPr>
+        <p:spPr>
+          <a:xfrm>
+            <a:off x="2053501" y="3247307"/>
+            <a:ext cx="1817298" cy="471578"/>
+          </a:xfrm>
+          <a:prstGeom prst="rightArrow">
+            <a:avLst/>
+          </a:prstGeom>
+          <a:ln w="38100">
+            <a:solidFill>
+              <a:schemeClr val="bg1"/>
+            </a:solidFill>
+          </a:ln>
+        </p:spPr>
+        <p:style>
+          <a:lnRef idx="2">
+            <a:schemeClr val="accent1">
+              <a:shade val="15000"/>
+            </a:schemeClr>
+          </a:lnRef>
+          <a:fillRef idx="1">
+            <a:schemeClr val="accent1"/>
+          </a:fillRef>
+          <a:effectRef idx="0">
+            <a:schemeClr val="accent1"/>
+          </a:effectRef>
+          <a:fontRef idx="minor">
+            <a:schemeClr val="lt1"/>
+          </a:fontRef>
+        </p:style>
+        <p:txBody>
+          <a:bodyPr rtlCol="0" anchor="ctr"/>
+          <a:lstStyle/>
+          <a:p>
+            <a:pPr algn="ctr"/>
+            <a:endParaRPr lang="en-GB"/>
+          </a:p>
+        </p:txBody>
+      </p:sp>
+      <p:sp>
+        <p:nvSpPr>
+          <p:cNvPr id="18" name="Arrow: Right 17">
+            <a:extLst>
+              <a:ext uri="{FF2B5EF4-FFF2-40B4-BE49-F238E27FC236}">
+                <a16:creationId xmlns:a16="http://schemas.microsoft.com/office/drawing/2014/main" id="{CBB4949F-F982-8388-66B8-8E7A7BB67380}"/>
+              </a:ext>
+            </a:extLst>
+          </p:cNvPr>
+          <p:cNvSpPr/>
+          <p:nvPr/>
+        </p:nvSpPr>
+        <p:spPr>
+          <a:xfrm>
+            <a:off x="2106057" y="2531914"/>
+            <a:ext cx="1817298" cy="471578"/>
+          </a:xfrm>
+          <a:prstGeom prst="rightArrow">
+            <a:avLst/>
+          </a:prstGeom>
+          <a:ln w="38100">
+            <a:solidFill>
+              <a:schemeClr val="bg1"/>
+            </a:solidFill>
+          </a:ln>
+        </p:spPr>
+        <p:style>
+          <a:lnRef idx="2">
+            <a:schemeClr val="accent1">
+              <a:shade val="15000"/>
+            </a:schemeClr>
+          </a:lnRef>
+          <a:fillRef idx="1">
+            <a:schemeClr val="accent1"/>
+          </a:fillRef>
+          <a:effectRef idx="0">
+            <a:schemeClr val="accent1"/>
+          </a:effectRef>
+          <a:fontRef idx="minor">
+            <a:schemeClr val="lt1"/>
+          </a:fontRef>
+        </p:style>
+        <p:txBody>
+          <a:bodyPr rtlCol="0" anchor="ctr"/>
+          <a:lstStyle/>
+          <a:p>
+            <a:pPr algn="ctr"/>
+            <a:endParaRPr lang="en-GB"/>
+          </a:p>
+        </p:txBody>
+      </p:sp>
+      <p:sp>
+        <p:nvSpPr>
+          <p:cNvPr id="20" name="Rectangle 19">
+            <a:extLst>
+              <a:ext uri="{FF2B5EF4-FFF2-40B4-BE49-F238E27FC236}">
+                <a16:creationId xmlns:a16="http://schemas.microsoft.com/office/drawing/2014/main" id="{3D90CE56-A83D-C715-634A-98C585A86FA5}"/>
+              </a:ext>
+            </a:extLst>
+          </p:cNvPr>
+          <p:cNvSpPr/>
+          <p:nvPr/>
+        </p:nvSpPr>
+        <p:spPr>
+          <a:xfrm>
+            <a:off x="6815944" y="758072"/>
+            <a:ext cx="896901" cy="307777"/>
+          </a:xfrm>
+          <a:prstGeom prst="rect">
+            <a:avLst/>
+          </a:prstGeom>
+          <a:ln>
+            <a:solidFill>
+              <a:schemeClr val="bg1"/>
+            </a:solidFill>
+          </a:ln>
+        </p:spPr>
+        <p:style>
+          <a:lnRef idx="2">
+            <a:schemeClr val="accent1">
+              <a:shade val="15000"/>
+            </a:schemeClr>
+          </a:lnRef>
+          <a:fillRef idx="1">
+            <a:schemeClr val="accent1"/>
+          </a:fillRef>
+          <a:effectRef idx="0">
+            <a:schemeClr val="accent1"/>
+          </a:effectRef>
+          <a:fontRef idx="minor">
+            <a:schemeClr val="lt1"/>
+          </a:fontRef>
+        </p:style>
+        <p:txBody>
+          <a:bodyPr wrap="none" rtlCol="0" anchor="t" anchorCtr="0"/>
+          <a:lstStyle/>
+          <a:p>
+            <a:r>
+              <a:rPr lang="en-GB" sz="1400" dirty="0"/>
+              <a:t>Extension</a:t>
+            </a:r>
+          </a:p>
+        </p:txBody>
+      </p:sp>
+      <p:sp>
+        <p:nvSpPr>
+          <p:cNvPr id="21" name="Rectangle 20">
+            <a:extLst>
+              <a:ext uri="{FF2B5EF4-FFF2-40B4-BE49-F238E27FC236}">
+                <a16:creationId xmlns:a16="http://schemas.microsoft.com/office/drawing/2014/main" id="{B51F98FA-EDC2-F982-8DEF-277DB5DDE978}"/>
+              </a:ext>
+            </a:extLst>
+          </p:cNvPr>
+          <p:cNvSpPr/>
+          <p:nvPr/>
+        </p:nvSpPr>
+        <p:spPr>
+          <a:xfrm>
+            <a:off x="7869627" y="758072"/>
+            <a:ext cx="1384467" cy="304974"/>
+          </a:xfrm>
+          <a:prstGeom prst="rect">
+            <a:avLst/>
+          </a:prstGeom>
+          <a:solidFill>
+            <a:schemeClr val="accent2"/>
+          </a:solidFill>
+          <a:ln>
+            <a:solidFill>
+              <a:schemeClr val="bg1"/>
+            </a:solidFill>
+          </a:ln>
+        </p:spPr>
+        <p:style>
+          <a:lnRef idx="2">
+            <a:schemeClr val="accent1">
+              <a:shade val="15000"/>
+            </a:schemeClr>
+          </a:lnRef>
+          <a:fillRef idx="1">
+            <a:schemeClr val="accent1"/>
+          </a:fillRef>
+          <a:effectRef idx="0">
+            <a:schemeClr val="accent1"/>
+          </a:effectRef>
+          <a:fontRef idx="minor">
+            <a:schemeClr val="lt1"/>
+          </a:fontRef>
+        </p:style>
+        <p:txBody>
+          <a:bodyPr wrap="none" rtlCol="0" anchor="t" anchorCtr="0"/>
+          <a:lstStyle/>
+          <a:p>
+            <a:r>
+              <a:rPr lang="en-GB" sz="1400" dirty="0"/>
+              <a:t>Profile from UDP</a:t>
+            </a:r>
+          </a:p>
+        </p:txBody>
+      </p:sp>
+      <p:sp>
+        <p:nvSpPr>
+          <p:cNvPr id="22" name="Rectangle 21">
+            <a:extLst>
+              <a:ext uri="{FF2B5EF4-FFF2-40B4-BE49-F238E27FC236}">
+                <a16:creationId xmlns:a16="http://schemas.microsoft.com/office/drawing/2014/main" id="{53CEC505-B7D1-39BF-08F1-6F4FD6875FC2}"/>
+              </a:ext>
+            </a:extLst>
+          </p:cNvPr>
+          <p:cNvSpPr/>
+          <p:nvPr/>
+        </p:nvSpPr>
+        <p:spPr>
+          <a:xfrm>
+            <a:off x="9331123" y="758072"/>
+            <a:ext cx="1384467" cy="304973"/>
+          </a:xfrm>
+          <a:prstGeom prst="rect">
+            <a:avLst/>
+          </a:prstGeom>
+          <a:solidFill>
+            <a:schemeClr val="accent6"/>
+          </a:solidFill>
+          <a:ln>
+            <a:solidFill>
+              <a:schemeClr val="bg1"/>
+            </a:solidFill>
+          </a:ln>
+        </p:spPr>
+        <p:style>
+          <a:lnRef idx="2">
+            <a:schemeClr val="accent1">
+              <a:shade val="15000"/>
+            </a:schemeClr>
+          </a:lnRef>
+          <a:fillRef idx="1">
+            <a:schemeClr val="accent1"/>
+          </a:fillRef>
+          <a:effectRef idx="0">
+            <a:schemeClr val="accent1"/>
+          </a:effectRef>
+          <a:fontRef idx="minor">
+            <a:schemeClr val="lt1"/>
+          </a:fontRef>
+        </p:style>
+        <p:txBody>
+          <a:bodyPr wrap="none" rtlCol="0" anchor="t" anchorCtr="0"/>
+          <a:lstStyle/>
+          <a:p>
+            <a:r>
+              <a:rPr lang="en-GB" sz="1400" dirty="0"/>
+              <a:t>Profile from EBM</a:t>
+            </a:r>
+          </a:p>
+        </p:txBody>
+      </p:sp>
+      <p:sp>
+        <p:nvSpPr>
+          <p:cNvPr id="23" name="TextBox 22">
+            <a:extLst>
+              <a:ext uri="{FF2B5EF4-FFF2-40B4-BE49-F238E27FC236}">
+                <a16:creationId xmlns:a16="http://schemas.microsoft.com/office/drawing/2014/main" id="{CED629DB-E2C1-1914-C7D3-831719B294B0}"/>
+              </a:ext>
+            </a:extLst>
+          </p:cNvPr>
+          <p:cNvSpPr txBox="1"/>
+          <p:nvPr/>
+        </p:nvSpPr>
+        <p:spPr>
+          <a:xfrm>
+            <a:off x="6183094" y="732724"/>
+            <a:ext cx="492827" cy="307777"/>
+          </a:xfrm>
+          <a:prstGeom prst="rect">
+            <a:avLst/>
+          </a:prstGeom>
+          <a:noFill/>
+        </p:spPr>
+        <p:txBody>
+          <a:bodyPr wrap="none" rtlCol="0">
+            <a:spAutoFit/>
+          </a:bodyPr>
+          <a:lstStyle/>
+          <a:p>
+            <a:r>
+              <a:rPr lang="en-GB" sz="1400" dirty="0"/>
+              <a:t>Key:</a:t>
+            </a:r>
+          </a:p>
+        </p:txBody>
+      </p:sp>
+    </p:spTree>
+    <p:extLst>
+      <p:ext uri="{BB962C8B-B14F-4D97-AF65-F5344CB8AC3E}">
+        <p14:creationId xmlns:p14="http://schemas.microsoft.com/office/powerpoint/2010/main" val="160287417"/>
+      </p:ext>
+    </p:extLst>
+  </p:cSld>
+  <p:clrMapOvr>
+    <a:masterClrMapping/>
+  </p:clrMapOvr>
+</p:sld>
+</file>
+
 <file path=ppt/theme/theme1.xml><?xml version="1.0" encoding="utf-8"?>
 <a:theme xmlns:a="http://schemas.openxmlformats.org/drawingml/2006/main" name="Office Theme">
   <a:themeElements>

</xml_diff>

<commit_message>
More editorial changes - especially to FHIR representation section
</commit_message>
<xml_diff>
--- a/input/images-source/Images.pptx
+++ b/input/images-source/Images.pptx
@@ -6,20 +6,22 @@
     <p:sldMasterId id="2147483660" r:id="rId2"/>
   </p:sldMasterIdLst>
   <p:notesMasterIdLst>
-    <p:notesMasterId r:id="rId14"/>
+    <p:notesMasterId r:id="rId16"/>
   </p:notesMasterIdLst>
   <p:sldIdLst>
     <p:sldId id="256" r:id="rId3"/>
     <p:sldId id="257" r:id="rId4"/>
     <p:sldId id="258" r:id="rId5"/>
     <p:sldId id="259" r:id="rId6"/>
-    <p:sldId id="2147483237" r:id="rId7"/>
-    <p:sldId id="2147483238" r:id="rId8"/>
-    <p:sldId id="2147483239" r:id="rId9"/>
-    <p:sldId id="260" r:id="rId10"/>
-    <p:sldId id="261" r:id="rId11"/>
-    <p:sldId id="2147483637" r:id="rId12"/>
-    <p:sldId id="2147483639" r:id="rId13"/>
+    <p:sldId id="2147483640" r:id="rId7"/>
+    <p:sldId id="2147483237" r:id="rId8"/>
+    <p:sldId id="2147483238" r:id="rId9"/>
+    <p:sldId id="2147483239" r:id="rId10"/>
+    <p:sldId id="260" r:id="rId11"/>
+    <p:sldId id="2147483641" r:id="rId12"/>
+    <p:sldId id="261" r:id="rId13"/>
+    <p:sldId id="2147483637" r:id="rId14"/>
+    <p:sldId id="2147483639" r:id="rId15"/>
   </p:sldIdLst>
   <p:sldSz cx="12192000" cy="6858000"/>
   <p:notesSz cx="6858000" cy="9144000"/>
@@ -3408,7 +3410,7 @@
           <a:p>
             <a:fld id="{721C5D9B-510E-445E-AF2D-731917B2632C}" type="datetimeFigureOut">
               <a:rPr lang="en-GB" smtClean="0"/>
-              <a:t>03/02/2026</a:t>
+              <a:t>05/02/2026</a:t>
             </a:fld>
             <a:endParaRPr lang="en-GB"/>
           </a:p>
@@ -3744,7 +3746,7 @@
           <a:p>
             <a:fld id="{4398B954-2888-4EEA-BC75-22288D66EB13}" type="slidenum">
               <a:rPr lang="en-GB" smtClean="0"/>
-              <a:t>5</a:t>
+              <a:t>6</a:t>
             </a:fld>
             <a:endParaRPr lang="en-GB"/>
           </a:p>
@@ -3896,7 +3898,7 @@
                 <a:tabLst/>
                 <a:defRPr/>
               </a:pPr>
-              <a:t>10</a:t>
+              <a:t>12</a:t>
             </a:fld>
             <a:endParaRPr kumimoji="0" lang="en-GB" sz="1300" b="0" i="0" u="none" strike="noStrike" kern="1200" cap="none" spc="0" normalizeH="0" baseline="0" noProof="0">
               <a:ln>
@@ -4077,7 +4079,7 @@
           <a:p>
             <a:fld id="{8D19A3AA-5CC1-4409-A3F5-5174B3C1B3E1}" type="datetimeFigureOut">
               <a:rPr lang="en-CA" smtClean="0"/>
-              <a:t>2026-02-03</a:t>
+              <a:t>2026-02-05</a:t>
             </a:fld>
             <a:endParaRPr lang="en-CA"/>
           </a:p>
@@ -4277,7 +4279,7 @@
           <a:p>
             <a:fld id="{8D19A3AA-5CC1-4409-A3F5-5174B3C1B3E1}" type="datetimeFigureOut">
               <a:rPr lang="en-CA" smtClean="0"/>
-              <a:t>2026-02-03</a:t>
+              <a:t>2026-02-05</a:t>
             </a:fld>
             <a:endParaRPr lang="en-CA"/>
           </a:p>
@@ -4487,7 +4489,7 @@
           <a:p>
             <a:fld id="{8D19A3AA-5CC1-4409-A3F5-5174B3C1B3E1}" type="datetimeFigureOut">
               <a:rPr lang="en-CA" smtClean="0"/>
-              <a:t>2026-02-03</a:t>
+              <a:t>2026-02-05</a:t>
             </a:fld>
             <a:endParaRPr lang="en-CA"/>
           </a:p>
@@ -9540,7 +9542,7 @@
           <a:p>
             <a:fld id="{8D19A3AA-5CC1-4409-A3F5-5174B3C1B3E1}" type="datetimeFigureOut">
               <a:rPr lang="en-CA" smtClean="0"/>
-              <a:t>2026-02-03</a:t>
+              <a:t>2026-02-05</a:t>
             </a:fld>
             <a:endParaRPr lang="en-CA"/>
           </a:p>
@@ -10701,7 +10703,7 @@
           <a:p>
             <a:fld id="{47B90D53-9087-43D8-A0E6-B303F1F516E5}" type="datetimeFigureOut">
               <a:rPr lang="en-US" smtClean="0"/>
-              <a:t>2/3/2026</a:t>
+              <a:t>2/5/2026</a:t>
             </a:fld>
             <a:endParaRPr lang="en-US"/>
           </a:p>
@@ -13083,7 +13085,7 @@
           <a:p>
             <a:fld id="{8D19A3AA-5CC1-4409-A3F5-5174B3C1B3E1}" type="datetimeFigureOut">
               <a:rPr lang="en-CA" smtClean="0"/>
-              <a:t>2026-02-03</a:t>
+              <a:t>2026-02-05</a:t>
             </a:fld>
             <a:endParaRPr lang="en-CA"/>
           </a:p>
@@ -16443,7 +16445,7 @@
           <a:p>
             <a:fld id="{47B90D53-9087-43D8-A0E6-B303F1F516E5}" type="datetimeFigureOut">
               <a:rPr lang="en-US" smtClean="0"/>
-              <a:t>2/3/2026</a:t>
+              <a:t>2/5/2026</a:t>
             </a:fld>
             <a:endParaRPr lang="en-US"/>
           </a:p>
@@ -16711,7 +16713,7 @@
           <a:p>
             <a:fld id="{8D19A3AA-5CC1-4409-A3F5-5174B3C1B3E1}" type="datetimeFigureOut">
               <a:rPr lang="en-CA" smtClean="0"/>
-              <a:t>2026-02-03</a:t>
+              <a:t>2026-02-05</a:t>
             </a:fld>
             <a:endParaRPr lang="en-CA"/>
           </a:p>
@@ -17126,7 +17128,7 @@
           <a:p>
             <a:fld id="{8D19A3AA-5CC1-4409-A3F5-5174B3C1B3E1}" type="datetimeFigureOut">
               <a:rPr lang="en-CA" smtClean="0"/>
-              <a:t>2026-02-03</a:t>
+              <a:t>2026-02-05</a:t>
             </a:fld>
             <a:endParaRPr lang="en-CA"/>
           </a:p>
@@ -17268,7 +17270,7 @@
           <a:p>
             <a:fld id="{8D19A3AA-5CC1-4409-A3F5-5174B3C1B3E1}" type="datetimeFigureOut">
               <a:rPr lang="en-CA" smtClean="0"/>
-              <a:t>2026-02-03</a:t>
+              <a:t>2026-02-05</a:t>
             </a:fld>
             <a:endParaRPr lang="en-CA"/>
           </a:p>
@@ -17381,7 +17383,7 @@
           <a:p>
             <a:fld id="{8D19A3AA-5CC1-4409-A3F5-5174B3C1B3E1}" type="datetimeFigureOut">
               <a:rPr lang="en-CA" smtClean="0"/>
-              <a:t>2026-02-03</a:t>
+              <a:t>2026-02-05</a:t>
             </a:fld>
             <a:endParaRPr lang="en-CA"/>
           </a:p>
@@ -17694,7 +17696,7 @@
           <a:p>
             <a:fld id="{8D19A3AA-5CC1-4409-A3F5-5174B3C1B3E1}" type="datetimeFigureOut">
               <a:rPr lang="en-CA" smtClean="0"/>
-              <a:t>2026-02-03</a:t>
+              <a:t>2026-02-05</a:t>
             </a:fld>
             <a:endParaRPr lang="en-CA"/>
           </a:p>
@@ -17983,7 +17985,7 @@
           <a:p>
             <a:fld id="{8D19A3AA-5CC1-4409-A3F5-5174B3C1B3E1}" type="datetimeFigureOut">
               <a:rPr lang="en-CA" smtClean="0"/>
-              <a:t>2026-02-03</a:t>
+              <a:t>2026-02-05</a:t>
             </a:fld>
             <a:endParaRPr lang="en-CA"/>
           </a:p>
@@ -18226,7 +18228,7 @@
           <a:p>
             <a:fld id="{8D19A3AA-5CC1-4409-A3F5-5174B3C1B3E1}" type="datetimeFigureOut">
               <a:rPr lang="en-CA" smtClean="0"/>
-              <a:t>2026-02-03</a:t>
+              <a:t>2026-02-05</a:t>
             </a:fld>
             <a:endParaRPr lang="en-CA"/>
           </a:p>
@@ -19460,6 +19462,1739 @@
         <p:cNvPr id="1" name="">
           <a:extLst>
             <a:ext uri="{FF2B5EF4-FFF2-40B4-BE49-F238E27FC236}">
+              <a16:creationId xmlns:a16="http://schemas.microsoft.com/office/drawing/2014/main" id="{9182B0F4-9C15-FB0A-C552-A20E85F4B910}"/>
+            </a:ext>
+          </a:extLst>
+        </p:cNvPr>
+        <p:cNvGrpSpPr/>
+        <p:nvPr/>
+      </p:nvGrpSpPr>
+      <p:grpSpPr>
+        <a:xfrm>
+          <a:off x="0" y="0"/>
+          <a:ext cx="0" cy="0"/>
+          <a:chOff x="0" y="0"/>
+          <a:chExt cx="0" cy="0"/>
+        </a:xfrm>
+      </p:grpSpPr>
+      <p:sp>
+        <p:nvSpPr>
+          <p:cNvPr id="14" name="Rectangle 13">
+            <a:extLst>
+              <a:ext uri="{FF2B5EF4-FFF2-40B4-BE49-F238E27FC236}">
+                <a16:creationId xmlns:a16="http://schemas.microsoft.com/office/drawing/2014/main" id="{211DAB97-55AA-F06F-65CF-78239B1FC567}"/>
+              </a:ext>
+            </a:extLst>
+          </p:cNvPr>
+          <p:cNvSpPr/>
+          <p:nvPr/>
+        </p:nvSpPr>
+        <p:spPr>
+          <a:xfrm>
+            <a:off x="366438" y="320876"/>
+            <a:ext cx="5546682" cy="4246435"/>
+          </a:xfrm>
+          <a:prstGeom prst="rect">
+            <a:avLst/>
+          </a:prstGeom>
+          <a:solidFill>
+            <a:schemeClr val="accent2"/>
+          </a:solidFill>
+          <a:ln>
+            <a:solidFill>
+              <a:schemeClr val="bg1"/>
+            </a:solidFill>
+          </a:ln>
+        </p:spPr>
+        <p:style>
+          <a:lnRef idx="2">
+            <a:schemeClr val="accent1">
+              <a:shade val="15000"/>
+            </a:schemeClr>
+          </a:lnRef>
+          <a:fillRef idx="1">
+            <a:schemeClr val="accent1"/>
+          </a:fillRef>
+          <a:effectRef idx="0">
+            <a:schemeClr val="accent1"/>
+          </a:effectRef>
+          <a:fontRef idx="minor">
+            <a:schemeClr val="lt1"/>
+          </a:fontRef>
+        </p:style>
+        <p:txBody>
+          <a:bodyPr wrap="none" rtlCol="0" anchor="t" anchorCtr="0"/>
+          <a:lstStyle/>
+          <a:p>
+            <a:r>
+              <a:rPr lang="en-GB" dirty="0"/>
+              <a:t>M11_ResearchStudyProfile (</a:t>
+            </a:r>
+            <a:r>
+              <a:rPr lang="en-GB" dirty="0" err="1">
+                <a:solidFill>
+                  <a:schemeClr val="tx1"/>
+                </a:solidFill>
+                <a:highlight>
+                  <a:srgbClr val="C0C0C0"/>
+                </a:highlight>
+              </a:rPr>
+              <a:t>ResearchStudy</a:t>
+            </a:r>
+            <a:r>
+              <a:rPr lang="en-GB" dirty="0"/>
+              <a:t>)</a:t>
+            </a:r>
+          </a:p>
+        </p:txBody>
+      </p:sp>
+      <p:sp>
+        <p:nvSpPr>
+          <p:cNvPr id="7" name="Rectangle 6">
+            <a:extLst>
+              <a:ext uri="{FF2B5EF4-FFF2-40B4-BE49-F238E27FC236}">
+                <a16:creationId xmlns:a16="http://schemas.microsoft.com/office/drawing/2014/main" id="{B908D295-BD1B-CC6A-C8FB-062391DCA8D6}"/>
+              </a:ext>
+            </a:extLst>
+          </p:cNvPr>
+          <p:cNvSpPr/>
+          <p:nvPr/>
+        </p:nvSpPr>
+        <p:spPr>
+          <a:xfrm>
+            <a:off x="661041" y="820934"/>
+            <a:ext cx="4970098" cy="1134655"/>
+          </a:xfrm>
+          <a:prstGeom prst="rect">
+            <a:avLst/>
+          </a:prstGeom>
+          <a:ln>
+            <a:solidFill>
+              <a:schemeClr val="bg1"/>
+            </a:solidFill>
+          </a:ln>
+        </p:spPr>
+        <p:style>
+          <a:lnRef idx="2">
+            <a:schemeClr val="accent1">
+              <a:shade val="15000"/>
+            </a:schemeClr>
+          </a:lnRef>
+          <a:fillRef idx="1">
+            <a:schemeClr val="accent1"/>
+          </a:fillRef>
+          <a:effectRef idx="0">
+            <a:schemeClr val="accent1"/>
+          </a:effectRef>
+          <a:fontRef idx="minor">
+            <a:schemeClr val="lt1"/>
+          </a:fontRef>
+        </p:style>
+        <p:txBody>
+          <a:bodyPr wrap="none" rtlCol="0" anchor="t" anchorCtr="0"/>
+          <a:lstStyle/>
+          <a:p>
+            <a:r>
+              <a:rPr lang="en-GB" dirty="0" err="1"/>
+              <a:t>NarrativeElements</a:t>
+            </a:r>
+            <a:endParaRPr lang="en-GB" dirty="0"/>
+          </a:p>
+        </p:txBody>
+      </p:sp>
+      <p:sp>
+        <p:nvSpPr>
+          <p:cNvPr id="9" name="Rectangle 8">
+            <a:extLst>
+              <a:ext uri="{FF2B5EF4-FFF2-40B4-BE49-F238E27FC236}">
+                <a16:creationId xmlns:a16="http://schemas.microsoft.com/office/drawing/2014/main" id="{9F9BA8FF-CDD3-3610-EF45-76F221732C5E}"/>
+              </a:ext>
+            </a:extLst>
+          </p:cNvPr>
+          <p:cNvSpPr/>
+          <p:nvPr/>
+        </p:nvSpPr>
+        <p:spPr>
+          <a:xfrm>
+            <a:off x="661041" y="2050406"/>
+            <a:ext cx="4970099" cy="1785385"/>
+          </a:xfrm>
+          <a:prstGeom prst="rect">
+            <a:avLst/>
+          </a:prstGeom>
+          <a:ln>
+            <a:solidFill>
+              <a:schemeClr val="bg1"/>
+            </a:solidFill>
+          </a:ln>
+        </p:spPr>
+        <p:style>
+          <a:lnRef idx="2">
+            <a:schemeClr val="accent1">
+              <a:shade val="15000"/>
+            </a:schemeClr>
+          </a:lnRef>
+          <a:fillRef idx="1">
+            <a:schemeClr val="accent1"/>
+          </a:fillRef>
+          <a:effectRef idx="0">
+            <a:schemeClr val="accent1"/>
+          </a:effectRef>
+          <a:fontRef idx="minor">
+            <a:schemeClr val="lt1"/>
+          </a:fontRef>
+        </p:style>
+        <p:txBody>
+          <a:bodyPr wrap="none" rtlCol="0" anchor="t" anchorCtr="0"/>
+          <a:lstStyle/>
+          <a:p>
+            <a:r>
+              <a:rPr lang="en-GB" dirty="0"/>
+              <a:t>M11_ProtocolAmendment </a:t>
+            </a:r>
+          </a:p>
+          <a:p>
+            <a:endParaRPr lang="en-GB" dirty="0"/>
+          </a:p>
+        </p:txBody>
+      </p:sp>
+      <p:sp>
+        <p:nvSpPr>
+          <p:cNvPr id="10" name="Rectangle 9">
+            <a:extLst>
+              <a:ext uri="{FF2B5EF4-FFF2-40B4-BE49-F238E27FC236}">
+                <a16:creationId xmlns:a16="http://schemas.microsoft.com/office/drawing/2014/main" id="{0E5684ED-BA3F-9545-A3DC-B86F04E101B9}"/>
+              </a:ext>
+            </a:extLst>
+          </p:cNvPr>
+          <p:cNvSpPr/>
+          <p:nvPr/>
+        </p:nvSpPr>
+        <p:spPr>
+          <a:xfrm>
+            <a:off x="1090975" y="3212914"/>
+            <a:ext cx="4424553" cy="417024"/>
+          </a:xfrm>
+          <a:prstGeom prst="rect">
+            <a:avLst/>
+          </a:prstGeom>
+          <a:ln>
+            <a:solidFill>
+              <a:schemeClr val="bg1"/>
+            </a:solidFill>
+          </a:ln>
+        </p:spPr>
+        <p:style>
+          <a:lnRef idx="2">
+            <a:schemeClr val="accent1">
+              <a:shade val="15000"/>
+            </a:schemeClr>
+          </a:lnRef>
+          <a:fillRef idx="1">
+            <a:schemeClr val="accent1"/>
+          </a:fillRef>
+          <a:effectRef idx="0">
+            <a:schemeClr val="accent1"/>
+          </a:effectRef>
+          <a:fontRef idx="minor">
+            <a:schemeClr val="lt1"/>
+          </a:fontRef>
+        </p:style>
+        <p:txBody>
+          <a:bodyPr wrap="none" rtlCol="0" anchor="t" anchorCtr="0"/>
+          <a:lstStyle/>
+          <a:p>
+            <a:r>
+              <a:rPr lang="en-GB" dirty="0" err="1"/>
+              <a:t>ResearchStudyStudyAmendmentDetails</a:t>
+            </a:r>
+            <a:r>
+              <a:rPr lang="en-GB" dirty="0"/>
+              <a:t> </a:t>
+            </a:r>
+          </a:p>
+          <a:p>
+            <a:endParaRPr lang="en-GB" dirty="0"/>
+          </a:p>
+        </p:txBody>
+      </p:sp>
+      <p:sp>
+        <p:nvSpPr>
+          <p:cNvPr id="11" name="Rectangle 10">
+            <a:extLst>
+              <a:ext uri="{FF2B5EF4-FFF2-40B4-BE49-F238E27FC236}">
+                <a16:creationId xmlns:a16="http://schemas.microsoft.com/office/drawing/2014/main" id="{2CAFB03E-72CD-EEAB-97E3-5046786A088D}"/>
+              </a:ext>
+            </a:extLst>
+          </p:cNvPr>
+          <p:cNvSpPr/>
+          <p:nvPr/>
+        </p:nvSpPr>
+        <p:spPr>
+          <a:xfrm>
+            <a:off x="1095953" y="2553940"/>
+            <a:ext cx="4424553" cy="481193"/>
+          </a:xfrm>
+          <a:prstGeom prst="rect">
+            <a:avLst/>
+          </a:prstGeom>
+          <a:ln>
+            <a:solidFill>
+              <a:schemeClr val="bg1"/>
+            </a:solidFill>
+          </a:ln>
+        </p:spPr>
+        <p:style>
+          <a:lnRef idx="2">
+            <a:schemeClr val="accent1">
+              <a:shade val="15000"/>
+            </a:schemeClr>
+          </a:lnRef>
+          <a:fillRef idx="1">
+            <a:schemeClr val="accent1"/>
+          </a:fillRef>
+          <a:effectRef idx="0">
+            <a:schemeClr val="accent1"/>
+          </a:effectRef>
+          <a:fontRef idx="minor">
+            <a:schemeClr val="lt1"/>
+          </a:fontRef>
+        </p:style>
+        <p:txBody>
+          <a:bodyPr wrap="none" rtlCol="0" anchor="t" anchorCtr="0"/>
+          <a:lstStyle/>
+          <a:p>
+            <a:r>
+              <a:rPr lang="en-GB" dirty="0" err="1"/>
+              <a:t>ResearchStudyStudyAmendmentScopeImpact</a:t>
+            </a:r>
+            <a:endParaRPr lang="en-GB" dirty="0"/>
+          </a:p>
+          <a:p>
+            <a:r>
+              <a:rPr lang="en-GB" dirty="0"/>
+              <a:t> </a:t>
+            </a:r>
+          </a:p>
+          <a:p>
+            <a:endParaRPr lang="en-GB" dirty="0"/>
+          </a:p>
+        </p:txBody>
+      </p:sp>
+      <p:sp>
+        <p:nvSpPr>
+          <p:cNvPr id="8" name="Rectangle 7">
+            <a:extLst>
+              <a:ext uri="{FF2B5EF4-FFF2-40B4-BE49-F238E27FC236}">
+                <a16:creationId xmlns:a16="http://schemas.microsoft.com/office/drawing/2014/main" id="{B2C18148-8C4F-1720-023C-3AB0B047EDCE}"/>
+              </a:ext>
+            </a:extLst>
+          </p:cNvPr>
+          <p:cNvSpPr/>
+          <p:nvPr/>
+        </p:nvSpPr>
+        <p:spPr>
+          <a:xfrm>
+            <a:off x="1090975" y="1318886"/>
+            <a:ext cx="4424553" cy="422676"/>
+          </a:xfrm>
+          <a:prstGeom prst="rect">
+            <a:avLst/>
+          </a:prstGeom>
+          <a:solidFill>
+            <a:schemeClr val="accent2"/>
+          </a:solidFill>
+          <a:ln>
+            <a:solidFill>
+              <a:schemeClr val="bg1"/>
+            </a:solidFill>
+          </a:ln>
+        </p:spPr>
+        <p:style>
+          <a:lnRef idx="2">
+            <a:schemeClr val="accent1">
+              <a:shade val="15000"/>
+            </a:schemeClr>
+          </a:lnRef>
+          <a:fillRef idx="1">
+            <a:schemeClr val="accent1"/>
+          </a:fillRef>
+          <a:effectRef idx="0">
+            <a:schemeClr val="accent1"/>
+          </a:effectRef>
+          <a:fontRef idx="minor">
+            <a:schemeClr val="lt1"/>
+          </a:fontRef>
+        </p:style>
+        <p:txBody>
+          <a:bodyPr wrap="none" rtlCol="0" anchor="t" anchorCtr="0"/>
+          <a:lstStyle/>
+          <a:p>
+            <a:r>
+              <a:rPr lang="en-GB" dirty="0"/>
+              <a:t>M11ResearchStudyNarratives (</a:t>
+            </a:r>
+            <a:r>
+              <a:rPr lang="en-GB" dirty="0">
+                <a:solidFill>
+                  <a:schemeClr val="tx1"/>
+                </a:solidFill>
+                <a:highlight>
+                  <a:srgbClr val="C0C0C0"/>
+                </a:highlight>
+              </a:rPr>
+              <a:t>Composition</a:t>
+            </a:r>
+            <a:r>
+              <a:rPr lang="en-GB" dirty="0"/>
+              <a:t>)</a:t>
+            </a:r>
+          </a:p>
+        </p:txBody>
+      </p:sp>
+      <p:sp>
+        <p:nvSpPr>
+          <p:cNvPr id="17" name="Rectangle 16">
+            <a:extLst>
+              <a:ext uri="{FF2B5EF4-FFF2-40B4-BE49-F238E27FC236}">
+                <a16:creationId xmlns:a16="http://schemas.microsoft.com/office/drawing/2014/main" id="{DA660AAD-15D4-AF40-B3C3-5B784245E88E}"/>
+              </a:ext>
+            </a:extLst>
+          </p:cNvPr>
+          <p:cNvSpPr/>
+          <p:nvPr/>
+        </p:nvSpPr>
+        <p:spPr>
+          <a:xfrm>
+            <a:off x="661040" y="3967992"/>
+            <a:ext cx="4970097" cy="371333"/>
+          </a:xfrm>
+          <a:prstGeom prst="rect">
+            <a:avLst/>
+          </a:prstGeom>
+          <a:solidFill>
+            <a:srgbClr val="4472C4"/>
+          </a:solidFill>
+          <a:ln>
+            <a:solidFill>
+              <a:schemeClr val="bg1"/>
+            </a:solidFill>
+          </a:ln>
+        </p:spPr>
+        <p:style>
+          <a:lnRef idx="2">
+            <a:schemeClr val="accent1">
+              <a:shade val="15000"/>
+            </a:schemeClr>
+          </a:lnRef>
+          <a:fillRef idx="1">
+            <a:schemeClr val="accent1"/>
+          </a:fillRef>
+          <a:effectRef idx="0">
+            <a:schemeClr val="accent1"/>
+          </a:effectRef>
+          <a:fontRef idx="minor">
+            <a:schemeClr val="lt1"/>
+          </a:fontRef>
+        </p:style>
+        <p:txBody>
+          <a:bodyPr wrap="none" rtlCol="0" anchor="t" anchorCtr="0"/>
+          <a:lstStyle/>
+          <a:p>
+            <a:r>
+              <a:rPr lang="en-GB" dirty="0" err="1"/>
+              <a:t>ResearchStudySponsorConfidentialityStatement</a:t>
+            </a:r>
+            <a:endParaRPr lang="en-GB" dirty="0"/>
+          </a:p>
+        </p:txBody>
+      </p:sp>
+      <p:sp>
+        <p:nvSpPr>
+          <p:cNvPr id="3" name="Rectangle 2">
+            <a:extLst>
+              <a:ext uri="{FF2B5EF4-FFF2-40B4-BE49-F238E27FC236}">
+                <a16:creationId xmlns:a16="http://schemas.microsoft.com/office/drawing/2014/main" id="{0DFC55D2-24C2-C0EC-441E-4A326DF9A8B8}"/>
+              </a:ext>
+            </a:extLst>
+          </p:cNvPr>
+          <p:cNvSpPr/>
+          <p:nvPr/>
+        </p:nvSpPr>
+        <p:spPr>
+          <a:xfrm>
+            <a:off x="823760" y="4679269"/>
+            <a:ext cx="1835033" cy="304974"/>
+          </a:xfrm>
+          <a:prstGeom prst="rect">
+            <a:avLst/>
+          </a:prstGeom>
+          <a:solidFill>
+            <a:schemeClr val="accent2"/>
+          </a:solidFill>
+          <a:ln>
+            <a:solidFill>
+              <a:schemeClr val="bg1"/>
+            </a:solidFill>
+          </a:ln>
+        </p:spPr>
+        <p:style>
+          <a:lnRef idx="2">
+            <a:schemeClr val="accent1">
+              <a:shade val="15000"/>
+            </a:schemeClr>
+          </a:lnRef>
+          <a:fillRef idx="1">
+            <a:schemeClr val="accent1"/>
+          </a:fillRef>
+          <a:effectRef idx="0">
+            <a:schemeClr val="accent1"/>
+          </a:effectRef>
+          <a:fontRef idx="minor">
+            <a:schemeClr val="lt1"/>
+          </a:fontRef>
+        </p:style>
+        <p:txBody>
+          <a:bodyPr wrap="none" rtlCol="0" anchor="t" anchorCtr="0"/>
+          <a:lstStyle/>
+          <a:p>
+            <a:r>
+              <a:rPr lang="en-GB" sz="1400" dirty="0"/>
+              <a:t>Profile (</a:t>
+            </a:r>
+            <a:r>
+              <a:rPr lang="en-GB" sz="1400" dirty="0">
+                <a:solidFill>
+                  <a:schemeClr val="tx1"/>
+                </a:solidFill>
+                <a:highlight>
+                  <a:srgbClr val="C0C0C0"/>
+                </a:highlight>
+              </a:rPr>
+              <a:t>Base Resource</a:t>
+            </a:r>
+            <a:r>
+              <a:rPr lang="en-GB" sz="1400" dirty="0"/>
+              <a:t>)</a:t>
+            </a:r>
+          </a:p>
+        </p:txBody>
+      </p:sp>
+      <p:sp>
+        <p:nvSpPr>
+          <p:cNvPr id="5" name="TextBox 4">
+            <a:extLst>
+              <a:ext uri="{FF2B5EF4-FFF2-40B4-BE49-F238E27FC236}">
+                <a16:creationId xmlns:a16="http://schemas.microsoft.com/office/drawing/2014/main" id="{8E70C799-3AD0-F500-A89D-A1602F427344}"/>
+              </a:ext>
+            </a:extLst>
+          </p:cNvPr>
+          <p:cNvSpPr txBox="1"/>
+          <p:nvPr/>
+        </p:nvSpPr>
+        <p:spPr>
+          <a:xfrm>
+            <a:off x="330934" y="4688939"/>
+            <a:ext cx="492827" cy="307777"/>
+          </a:xfrm>
+          <a:prstGeom prst="rect">
+            <a:avLst/>
+          </a:prstGeom>
+          <a:noFill/>
+        </p:spPr>
+        <p:txBody>
+          <a:bodyPr wrap="none" rtlCol="0">
+            <a:spAutoFit/>
+          </a:bodyPr>
+          <a:lstStyle/>
+          <a:p>
+            <a:r>
+              <a:rPr lang="en-GB" sz="1400" dirty="0"/>
+              <a:t>Key:</a:t>
+            </a:r>
+          </a:p>
+        </p:txBody>
+      </p:sp>
+      <p:sp>
+        <p:nvSpPr>
+          <p:cNvPr id="18" name="Rectangle 17">
+            <a:extLst>
+              <a:ext uri="{FF2B5EF4-FFF2-40B4-BE49-F238E27FC236}">
+                <a16:creationId xmlns:a16="http://schemas.microsoft.com/office/drawing/2014/main" id="{989D97B6-66EC-9AEE-3F62-696E5E4DB9FA}"/>
+              </a:ext>
+            </a:extLst>
+          </p:cNvPr>
+          <p:cNvSpPr/>
+          <p:nvPr/>
+        </p:nvSpPr>
+        <p:spPr>
+          <a:xfrm>
+            <a:off x="2734142" y="4679269"/>
+            <a:ext cx="896901" cy="307777"/>
+          </a:xfrm>
+          <a:prstGeom prst="rect">
+            <a:avLst/>
+          </a:prstGeom>
+          <a:ln>
+            <a:solidFill>
+              <a:schemeClr val="bg1"/>
+            </a:solidFill>
+          </a:ln>
+        </p:spPr>
+        <p:style>
+          <a:lnRef idx="2">
+            <a:schemeClr val="accent1">
+              <a:shade val="15000"/>
+            </a:schemeClr>
+          </a:lnRef>
+          <a:fillRef idx="1">
+            <a:schemeClr val="accent1"/>
+          </a:fillRef>
+          <a:effectRef idx="0">
+            <a:schemeClr val="accent1"/>
+          </a:effectRef>
+          <a:fontRef idx="minor">
+            <a:schemeClr val="lt1"/>
+          </a:fontRef>
+        </p:style>
+        <p:txBody>
+          <a:bodyPr wrap="none" rtlCol="0" anchor="t" anchorCtr="0"/>
+          <a:lstStyle/>
+          <a:p>
+            <a:r>
+              <a:rPr lang="en-GB" sz="1400" dirty="0"/>
+              <a:t>Extension</a:t>
+            </a:r>
+          </a:p>
+        </p:txBody>
+      </p:sp>
+    </p:spTree>
+    <p:extLst>
+      <p:ext uri="{BB962C8B-B14F-4D97-AF65-F5344CB8AC3E}">
+        <p14:creationId xmlns:p14="http://schemas.microsoft.com/office/powerpoint/2010/main" val="374457431"/>
+      </p:ext>
+    </p:extLst>
+  </p:cSld>
+  <p:clrMapOvr>
+    <a:masterClrMapping/>
+  </p:clrMapOvr>
+</p:sld>
+</file>
+
+<file path=ppt/slides/slide11.xml><?xml version="1.0" encoding="utf-8"?>
+<p:sld xmlns:a="http://schemas.openxmlformats.org/drawingml/2006/main" xmlns:r="http://schemas.openxmlformats.org/officeDocument/2006/relationships" xmlns:p="http://schemas.openxmlformats.org/presentationml/2006/main">
+  <p:cSld>
+    <p:spTree>
+      <p:nvGrpSpPr>
+        <p:cNvPr id="1" name=""/>
+        <p:cNvGrpSpPr/>
+        <p:nvPr/>
+      </p:nvGrpSpPr>
+      <p:grpSpPr>
+        <a:xfrm>
+          <a:off x="0" y="0"/>
+          <a:ext cx="0" cy="0"/>
+          <a:chOff x="0" y="0"/>
+          <a:chExt cx="0" cy="0"/>
+        </a:xfrm>
+      </p:grpSpPr>
+      <p:sp>
+        <p:nvSpPr>
+          <p:cNvPr id="2" name="Rectangle 1">
+            <a:extLst>
+              <a:ext uri="{FF2B5EF4-FFF2-40B4-BE49-F238E27FC236}">
+                <a16:creationId xmlns:a16="http://schemas.microsoft.com/office/drawing/2014/main" id="{A428D5B9-DFF1-3C84-B3E4-3F581C93F88C}"/>
+              </a:ext>
+            </a:extLst>
+          </p:cNvPr>
+          <p:cNvSpPr/>
+          <p:nvPr/>
+        </p:nvSpPr>
+        <p:spPr>
+          <a:xfrm>
+            <a:off x="156691" y="206326"/>
+            <a:ext cx="3219113" cy="4273660"/>
+          </a:xfrm>
+          <a:prstGeom prst="rect">
+            <a:avLst/>
+          </a:prstGeom>
+          <a:solidFill>
+            <a:schemeClr val="accent3"/>
+          </a:solidFill>
+          <a:ln>
+            <a:solidFill>
+              <a:schemeClr val="bg1"/>
+            </a:solidFill>
+          </a:ln>
+        </p:spPr>
+        <p:style>
+          <a:lnRef idx="2">
+            <a:schemeClr val="accent1">
+              <a:shade val="15000"/>
+            </a:schemeClr>
+          </a:lnRef>
+          <a:fillRef idx="1">
+            <a:schemeClr val="accent1"/>
+          </a:fillRef>
+          <a:effectRef idx="0">
+            <a:schemeClr val="accent1"/>
+          </a:effectRef>
+          <a:fontRef idx="minor">
+            <a:schemeClr val="lt1"/>
+          </a:fontRef>
+        </p:style>
+        <p:txBody>
+          <a:bodyPr wrap="none" rtlCol="0" anchor="t" anchorCtr="0"/>
+          <a:lstStyle/>
+          <a:p>
+            <a:r>
+              <a:rPr lang="en-GB" dirty="0" err="1"/>
+              <a:t>ResearchStudy</a:t>
+            </a:r>
+            <a:endParaRPr lang="en-GB" dirty="0"/>
+          </a:p>
+        </p:txBody>
+      </p:sp>
+      <p:sp>
+        <p:nvSpPr>
+          <p:cNvPr id="19" name="Rectangle 18">
+            <a:extLst>
+              <a:ext uri="{FF2B5EF4-FFF2-40B4-BE49-F238E27FC236}">
+                <a16:creationId xmlns:a16="http://schemas.microsoft.com/office/drawing/2014/main" id="{B7926905-7703-0C5E-9D04-9004D7806E73}"/>
+              </a:ext>
+            </a:extLst>
+          </p:cNvPr>
+          <p:cNvSpPr/>
+          <p:nvPr/>
+        </p:nvSpPr>
+        <p:spPr>
+          <a:xfrm>
+            <a:off x="288111" y="641116"/>
+            <a:ext cx="2961172" cy="3585827"/>
+          </a:xfrm>
+          <a:prstGeom prst="rect">
+            <a:avLst/>
+          </a:prstGeom>
+          <a:solidFill>
+            <a:schemeClr val="accent6"/>
+          </a:solidFill>
+          <a:ln w="38100">
+            <a:solidFill>
+              <a:schemeClr val="bg1"/>
+            </a:solidFill>
+          </a:ln>
+        </p:spPr>
+        <p:style>
+          <a:lnRef idx="2">
+            <a:schemeClr val="accent1">
+              <a:shade val="15000"/>
+            </a:schemeClr>
+          </a:lnRef>
+          <a:fillRef idx="1">
+            <a:schemeClr val="accent1"/>
+          </a:fillRef>
+          <a:effectRef idx="0">
+            <a:schemeClr val="accent1"/>
+          </a:effectRef>
+          <a:fontRef idx="minor">
+            <a:schemeClr val="lt1"/>
+          </a:fontRef>
+        </p:style>
+        <p:txBody>
+          <a:bodyPr wrap="none" rtlCol="0" anchor="t" anchorCtr="0"/>
+          <a:lstStyle/>
+          <a:p>
+            <a:r>
+              <a:rPr lang="en-GB" dirty="0" err="1"/>
+              <a:t>StudyDesign</a:t>
+            </a:r>
+            <a:endParaRPr lang="en-GB" dirty="0"/>
+          </a:p>
+        </p:txBody>
+      </p:sp>
+      <p:sp>
+        <p:nvSpPr>
+          <p:cNvPr id="4" name="Rectangle 3">
+            <a:extLst>
+              <a:ext uri="{FF2B5EF4-FFF2-40B4-BE49-F238E27FC236}">
+                <a16:creationId xmlns:a16="http://schemas.microsoft.com/office/drawing/2014/main" id="{9C9A7485-1BDC-2014-DE43-CD8CBA6152E1}"/>
+              </a:ext>
+            </a:extLst>
+          </p:cNvPr>
+          <p:cNvSpPr/>
+          <p:nvPr/>
+        </p:nvSpPr>
+        <p:spPr>
+          <a:xfrm>
+            <a:off x="3853378" y="2587951"/>
+            <a:ext cx="2537130" cy="426561"/>
+          </a:xfrm>
+          <a:prstGeom prst="rect">
+            <a:avLst/>
+          </a:prstGeom>
+          <a:ln>
+            <a:solidFill>
+              <a:schemeClr val="bg1"/>
+            </a:solidFill>
+          </a:ln>
+        </p:spPr>
+        <p:style>
+          <a:lnRef idx="2">
+            <a:schemeClr val="accent1">
+              <a:shade val="15000"/>
+            </a:schemeClr>
+          </a:lnRef>
+          <a:fillRef idx="1">
+            <a:schemeClr val="accent1"/>
+          </a:fillRef>
+          <a:effectRef idx="0">
+            <a:schemeClr val="accent1"/>
+          </a:effectRef>
+          <a:fontRef idx="minor">
+            <a:schemeClr val="lt1"/>
+          </a:fontRef>
+        </p:style>
+        <p:txBody>
+          <a:bodyPr wrap="none" rtlCol="0" anchor="t" anchorCtr="0"/>
+          <a:lstStyle/>
+          <a:p>
+            <a:r>
+              <a:rPr lang="en-GB" dirty="0" err="1"/>
+              <a:t>NarrativeElements</a:t>
+            </a:r>
+            <a:endParaRPr lang="en-GB" dirty="0"/>
+          </a:p>
+        </p:txBody>
+      </p:sp>
+      <p:sp>
+        <p:nvSpPr>
+          <p:cNvPr id="8" name="Rectangle 7">
+            <a:extLst>
+              <a:ext uri="{FF2B5EF4-FFF2-40B4-BE49-F238E27FC236}">
+                <a16:creationId xmlns:a16="http://schemas.microsoft.com/office/drawing/2014/main" id="{77F97369-C434-94ED-4CC3-AB8B48EEB014}"/>
+              </a:ext>
+            </a:extLst>
+          </p:cNvPr>
+          <p:cNvSpPr/>
+          <p:nvPr/>
+        </p:nvSpPr>
+        <p:spPr>
+          <a:xfrm>
+            <a:off x="7229180" y="2190853"/>
+            <a:ext cx="3651849" cy="903306"/>
+          </a:xfrm>
+          <a:prstGeom prst="rect">
+            <a:avLst/>
+          </a:prstGeom>
+        </p:spPr>
+        <p:style>
+          <a:lnRef idx="2">
+            <a:schemeClr val="accent1">
+              <a:shade val="15000"/>
+            </a:schemeClr>
+          </a:lnRef>
+          <a:fillRef idx="1">
+            <a:schemeClr val="accent1"/>
+          </a:fillRef>
+          <a:effectRef idx="0">
+            <a:schemeClr val="accent1"/>
+          </a:effectRef>
+          <a:fontRef idx="minor">
+            <a:schemeClr val="lt1"/>
+          </a:fontRef>
+        </p:style>
+        <p:txBody>
+          <a:bodyPr wrap="none" rtlCol="0" anchor="t" anchorCtr="0"/>
+          <a:lstStyle/>
+          <a:p>
+            <a:r>
+              <a:rPr lang="en-GB" dirty="0"/>
+              <a:t>Composition</a:t>
+            </a:r>
+          </a:p>
+        </p:txBody>
+      </p:sp>
+      <p:sp>
+        <p:nvSpPr>
+          <p:cNvPr id="10" name="Rectangle 9">
+            <a:extLst>
+              <a:ext uri="{FF2B5EF4-FFF2-40B4-BE49-F238E27FC236}">
+                <a16:creationId xmlns:a16="http://schemas.microsoft.com/office/drawing/2014/main" id="{EF2A7B39-A5E1-3CBB-0881-01B24B25A54A}"/>
+              </a:ext>
+            </a:extLst>
+          </p:cNvPr>
+          <p:cNvSpPr/>
+          <p:nvPr/>
+        </p:nvSpPr>
+        <p:spPr>
+          <a:xfrm>
+            <a:off x="7504827" y="2556365"/>
+            <a:ext cx="3115994" cy="422676"/>
+          </a:xfrm>
+          <a:prstGeom prst="rect">
+            <a:avLst/>
+          </a:prstGeom>
+          <a:solidFill>
+            <a:schemeClr val="accent2"/>
+          </a:solidFill>
+          <a:ln>
+            <a:solidFill>
+              <a:schemeClr val="bg1"/>
+            </a:solidFill>
+          </a:ln>
+        </p:spPr>
+        <p:style>
+          <a:lnRef idx="2">
+            <a:schemeClr val="accent1">
+              <a:shade val="15000"/>
+            </a:schemeClr>
+          </a:lnRef>
+          <a:fillRef idx="1">
+            <a:schemeClr val="accent1"/>
+          </a:fillRef>
+          <a:effectRef idx="0">
+            <a:schemeClr val="accent1"/>
+          </a:effectRef>
+          <a:fontRef idx="minor">
+            <a:schemeClr val="lt1"/>
+          </a:fontRef>
+        </p:style>
+        <p:txBody>
+          <a:bodyPr wrap="none" rtlCol="0" anchor="t" anchorCtr="0"/>
+          <a:lstStyle/>
+          <a:p>
+            <a:r>
+              <a:rPr lang="en-GB" dirty="0"/>
+              <a:t>M11ResearchStudyNarratives</a:t>
+            </a:r>
+          </a:p>
+        </p:txBody>
+      </p:sp>
+      <p:sp>
+        <p:nvSpPr>
+          <p:cNvPr id="11" name="Rectangle 10">
+            <a:extLst>
+              <a:ext uri="{FF2B5EF4-FFF2-40B4-BE49-F238E27FC236}">
+                <a16:creationId xmlns:a16="http://schemas.microsoft.com/office/drawing/2014/main" id="{9022BB3E-490F-6A15-2F03-F2316EFEA2F9}"/>
+              </a:ext>
+            </a:extLst>
+          </p:cNvPr>
+          <p:cNvSpPr/>
+          <p:nvPr/>
+        </p:nvSpPr>
+        <p:spPr>
+          <a:xfrm>
+            <a:off x="491423" y="2265872"/>
+            <a:ext cx="2628032" cy="1871408"/>
+          </a:xfrm>
+          <a:prstGeom prst="rect">
+            <a:avLst/>
+          </a:prstGeom>
+          <a:solidFill>
+            <a:schemeClr val="accent2"/>
+          </a:solidFill>
+          <a:ln>
+            <a:solidFill>
+              <a:schemeClr val="bg1"/>
+            </a:solidFill>
+          </a:ln>
+        </p:spPr>
+        <p:style>
+          <a:lnRef idx="2">
+            <a:schemeClr val="accent1">
+              <a:shade val="15000"/>
+            </a:schemeClr>
+          </a:lnRef>
+          <a:fillRef idx="1">
+            <a:schemeClr val="accent1"/>
+          </a:fillRef>
+          <a:effectRef idx="0">
+            <a:schemeClr val="accent1"/>
+          </a:effectRef>
+          <a:fontRef idx="minor">
+            <a:schemeClr val="lt1"/>
+          </a:fontRef>
+        </p:style>
+        <p:txBody>
+          <a:bodyPr wrap="none" rtlCol="0" anchor="t" anchorCtr="0"/>
+          <a:lstStyle/>
+          <a:p>
+            <a:r>
+              <a:rPr lang="en-GB" dirty="0"/>
+              <a:t>M11_ResearchStudyProfile</a:t>
+            </a:r>
+          </a:p>
+        </p:txBody>
+      </p:sp>
+      <p:sp>
+        <p:nvSpPr>
+          <p:cNvPr id="12" name="Arrow: Right 11">
+            <a:extLst>
+              <a:ext uri="{FF2B5EF4-FFF2-40B4-BE49-F238E27FC236}">
+                <a16:creationId xmlns:a16="http://schemas.microsoft.com/office/drawing/2014/main" id="{A967A5DE-4FAD-EC35-648A-C432FBBB0ADB}"/>
+              </a:ext>
+            </a:extLst>
+          </p:cNvPr>
+          <p:cNvSpPr/>
+          <p:nvPr/>
+        </p:nvSpPr>
+        <p:spPr>
+          <a:xfrm>
+            <a:off x="5762690" y="2542934"/>
+            <a:ext cx="1817298" cy="471578"/>
+          </a:xfrm>
+          <a:prstGeom prst="rightArrow">
+            <a:avLst/>
+          </a:prstGeom>
+          <a:ln w="38100">
+            <a:solidFill>
+              <a:schemeClr val="bg1"/>
+            </a:solidFill>
+          </a:ln>
+        </p:spPr>
+        <p:style>
+          <a:lnRef idx="2">
+            <a:schemeClr val="accent1">
+              <a:shade val="15000"/>
+            </a:schemeClr>
+          </a:lnRef>
+          <a:fillRef idx="1">
+            <a:schemeClr val="accent1"/>
+          </a:fillRef>
+          <a:effectRef idx="0">
+            <a:schemeClr val="accent1"/>
+          </a:effectRef>
+          <a:fontRef idx="minor">
+            <a:schemeClr val="lt1"/>
+          </a:fontRef>
+        </p:style>
+        <p:txBody>
+          <a:bodyPr rtlCol="0" anchor="ctr"/>
+          <a:lstStyle/>
+          <a:p>
+            <a:pPr algn="ctr"/>
+            <a:endParaRPr lang="en-GB"/>
+          </a:p>
+        </p:txBody>
+      </p:sp>
+      <p:sp>
+        <p:nvSpPr>
+          <p:cNvPr id="13" name="Rectangle 12">
+            <a:extLst>
+              <a:ext uri="{FF2B5EF4-FFF2-40B4-BE49-F238E27FC236}">
+                <a16:creationId xmlns:a16="http://schemas.microsoft.com/office/drawing/2014/main" id="{1EE56262-80C5-C2A4-E012-DF54B533FA7B}"/>
+              </a:ext>
+            </a:extLst>
+          </p:cNvPr>
+          <p:cNvSpPr/>
+          <p:nvPr/>
+        </p:nvSpPr>
+        <p:spPr>
+          <a:xfrm>
+            <a:off x="3870800" y="992354"/>
+            <a:ext cx="1817298" cy="371333"/>
+          </a:xfrm>
+          <a:prstGeom prst="rect">
+            <a:avLst/>
+          </a:prstGeom>
+          <a:solidFill>
+            <a:schemeClr val="accent6"/>
+          </a:solidFill>
+          <a:ln>
+            <a:solidFill>
+              <a:schemeClr val="bg1"/>
+            </a:solidFill>
+          </a:ln>
+        </p:spPr>
+        <p:style>
+          <a:lnRef idx="2">
+            <a:schemeClr val="accent1">
+              <a:shade val="15000"/>
+            </a:schemeClr>
+          </a:lnRef>
+          <a:fillRef idx="1">
+            <a:schemeClr val="accent1"/>
+          </a:fillRef>
+          <a:effectRef idx="0">
+            <a:schemeClr val="accent1"/>
+          </a:effectRef>
+          <a:fontRef idx="minor">
+            <a:schemeClr val="lt1"/>
+          </a:fontRef>
+        </p:style>
+        <p:txBody>
+          <a:bodyPr wrap="none" rtlCol="0" anchor="t" anchorCtr="0"/>
+          <a:lstStyle/>
+          <a:p>
+            <a:r>
+              <a:rPr lang="en-GB" dirty="0" err="1"/>
+              <a:t>SAEReporting</a:t>
+            </a:r>
+            <a:endParaRPr lang="en-GB" dirty="0"/>
+          </a:p>
+        </p:txBody>
+      </p:sp>
+      <p:sp>
+        <p:nvSpPr>
+          <p:cNvPr id="14" name="Rectangle 13">
+            <a:extLst>
+              <a:ext uri="{FF2B5EF4-FFF2-40B4-BE49-F238E27FC236}">
+                <a16:creationId xmlns:a16="http://schemas.microsoft.com/office/drawing/2014/main" id="{0CEFD97E-F84D-8C6C-CE22-D1E84A99736E}"/>
+              </a:ext>
+            </a:extLst>
+          </p:cNvPr>
+          <p:cNvSpPr/>
+          <p:nvPr/>
+        </p:nvSpPr>
+        <p:spPr>
+          <a:xfrm>
+            <a:off x="3870799" y="1748034"/>
+            <a:ext cx="4424553" cy="371333"/>
+          </a:xfrm>
+          <a:prstGeom prst="rect">
+            <a:avLst/>
+          </a:prstGeom>
+          <a:solidFill>
+            <a:schemeClr val="accent6"/>
+          </a:solidFill>
+          <a:ln>
+            <a:solidFill>
+              <a:schemeClr val="bg1"/>
+            </a:solidFill>
+          </a:ln>
+        </p:spPr>
+        <p:style>
+          <a:lnRef idx="2">
+            <a:schemeClr val="accent1">
+              <a:shade val="15000"/>
+            </a:schemeClr>
+          </a:lnRef>
+          <a:fillRef idx="1">
+            <a:schemeClr val="accent1"/>
+          </a:fillRef>
+          <a:effectRef idx="0">
+            <a:schemeClr val="accent1"/>
+          </a:effectRef>
+          <a:fontRef idx="minor">
+            <a:schemeClr val="lt1"/>
+          </a:fontRef>
+        </p:style>
+        <p:txBody>
+          <a:bodyPr wrap="none" rtlCol="0" anchor="t" anchorCtr="0"/>
+          <a:lstStyle/>
+          <a:p>
+            <a:r>
+              <a:rPr lang="en-GB" dirty="0" err="1"/>
+              <a:t>ConfidentialityStatement</a:t>
+            </a:r>
+            <a:endParaRPr lang="en-GB" dirty="0"/>
+          </a:p>
+        </p:txBody>
+      </p:sp>
+      <p:sp>
+        <p:nvSpPr>
+          <p:cNvPr id="5" name="Rectangle 4">
+            <a:extLst>
+              <a:ext uri="{FF2B5EF4-FFF2-40B4-BE49-F238E27FC236}">
+                <a16:creationId xmlns:a16="http://schemas.microsoft.com/office/drawing/2014/main" id="{9DCA96B9-4082-71BF-98E0-378930518641}"/>
+              </a:ext>
+            </a:extLst>
+          </p:cNvPr>
+          <p:cNvSpPr/>
+          <p:nvPr/>
+        </p:nvSpPr>
+        <p:spPr>
+          <a:xfrm>
+            <a:off x="3797248" y="3308153"/>
+            <a:ext cx="4970099" cy="1574767"/>
+          </a:xfrm>
+          <a:prstGeom prst="rect">
+            <a:avLst/>
+          </a:prstGeom>
+          <a:ln>
+            <a:solidFill>
+              <a:schemeClr val="bg1"/>
+            </a:solidFill>
+          </a:ln>
+        </p:spPr>
+        <p:style>
+          <a:lnRef idx="2">
+            <a:schemeClr val="accent1">
+              <a:shade val="15000"/>
+            </a:schemeClr>
+          </a:lnRef>
+          <a:fillRef idx="1">
+            <a:schemeClr val="accent1"/>
+          </a:fillRef>
+          <a:effectRef idx="0">
+            <a:schemeClr val="accent1"/>
+          </a:effectRef>
+          <a:fontRef idx="minor">
+            <a:schemeClr val="lt1"/>
+          </a:fontRef>
+        </p:style>
+        <p:txBody>
+          <a:bodyPr wrap="none" rtlCol="0" anchor="t" anchorCtr="0"/>
+          <a:lstStyle/>
+          <a:p>
+            <a:r>
+              <a:rPr lang="en-GB" dirty="0"/>
+              <a:t>M11_ProtocolAmendment </a:t>
+            </a:r>
+          </a:p>
+          <a:p>
+            <a:endParaRPr lang="en-GB" dirty="0"/>
+          </a:p>
+        </p:txBody>
+      </p:sp>
+      <p:sp>
+        <p:nvSpPr>
+          <p:cNvPr id="6" name="Rectangle 5">
+            <a:extLst>
+              <a:ext uri="{FF2B5EF4-FFF2-40B4-BE49-F238E27FC236}">
+                <a16:creationId xmlns:a16="http://schemas.microsoft.com/office/drawing/2014/main" id="{DAE8DE3D-306A-A739-ABA1-26B8DD6012B1}"/>
+              </a:ext>
+            </a:extLst>
+          </p:cNvPr>
+          <p:cNvSpPr/>
+          <p:nvPr/>
+        </p:nvSpPr>
+        <p:spPr>
+          <a:xfrm>
+            <a:off x="4170263" y="3672267"/>
+            <a:ext cx="4424553" cy="417024"/>
+          </a:xfrm>
+          <a:prstGeom prst="rect">
+            <a:avLst/>
+          </a:prstGeom>
+          <a:ln>
+            <a:solidFill>
+              <a:schemeClr val="bg1"/>
+            </a:solidFill>
+          </a:ln>
+        </p:spPr>
+        <p:style>
+          <a:lnRef idx="2">
+            <a:schemeClr val="accent1">
+              <a:shade val="15000"/>
+            </a:schemeClr>
+          </a:lnRef>
+          <a:fillRef idx="1">
+            <a:schemeClr val="accent1"/>
+          </a:fillRef>
+          <a:effectRef idx="0">
+            <a:schemeClr val="accent1"/>
+          </a:effectRef>
+          <a:fontRef idx="minor">
+            <a:schemeClr val="lt1"/>
+          </a:fontRef>
+        </p:style>
+        <p:txBody>
+          <a:bodyPr wrap="none" rtlCol="0" anchor="t" anchorCtr="0"/>
+          <a:lstStyle/>
+          <a:p>
+            <a:r>
+              <a:rPr lang="en-GB" dirty="0" err="1"/>
+              <a:t>ResearchStudyStudyAmendmentDetails</a:t>
+            </a:r>
+            <a:r>
+              <a:rPr lang="en-GB" dirty="0"/>
+              <a:t> </a:t>
+            </a:r>
+          </a:p>
+          <a:p>
+            <a:endParaRPr lang="en-GB" dirty="0"/>
+          </a:p>
+        </p:txBody>
+      </p:sp>
+      <p:sp>
+        <p:nvSpPr>
+          <p:cNvPr id="7" name="Rectangle 6">
+            <a:extLst>
+              <a:ext uri="{FF2B5EF4-FFF2-40B4-BE49-F238E27FC236}">
+                <a16:creationId xmlns:a16="http://schemas.microsoft.com/office/drawing/2014/main" id="{B0A967C7-B667-BBC7-DCEF-14B5C47C58E6}"/>
+              </a:ext>
+            </a:extLst>
+          </p:cNvPr>
+          <p:cNvSpPr/>
+          <p:nvPr/>
+        </p:nvSpPr>
+        <p:spPr>
+          <a:xfrm>
+            <a:off x="4170263" y="4137280"/>
+            <a:ext cx="4424553" cy="481193"/>
+          </a:xfrm>
+          <a:prstGeom prst="rect">
+            <a:avLst/>
+          </a:prstGeom>
+          <a:ln>
+            <a:solidFill>
+              <a:schemeClr val="bg1"/>
+            </a:solidFill>
+          </a:ln>
+        </p:spPr>
+        <p:style>
+          <a:lnRef idx="2">
+            <a:schemeClr val="accent1">
+              <a:shade val="15000"/>
+            </a:schemeClr>
+          </a:lnRef>
+          <a:fillRef idx="1">
+            <a:schemeClr val="accent1"/>
+          </a:fillRef>
+          <a:effectRef idx="0">
+            <a:schemeClr val="accent1"/>
+          </a:effectRef>
+          <a:fontRef idx="minor">
+            <a:schemeClr val="lt1"/>
+          </a:fontRef>
+        </p:style>
+        <p:txBody>
+          <a:bodyPr wrap="none" rtlCol="0" anchor="t" anchorCtr="0"/>
+          <a:lstStyle/>
+          <a:p>
+            <a:r>
+              <a:rPr lang="en-GB" dirty="0" err="1"/>
+              <a:t>ResearchStudyStudyAmendmentScopeImpact</a:t>
+            </a:r>
+            <a:endParaRPr lang="en-GB" dirty="0"/>
+          </a:p>
+          <a:p>
+            <a:r>
+              <a:rPr lang="en-GB" dirty="0"/>
+              <a:t> </a:t>
+            </a:r>
+          </a:p>
+          <a:p>
+            <a:endParaRPr lang="en-GB" dirty="0"/>
+          </a:p>
+        </p:txBody>
+      </p:sp>
+      <p:sp>
+        <p:nvSpPr>
+          <p:cNvPr id="15" name="Arrow: Right 14">
+            <a:extLst>
+              <a:ext uri="{FF2B5EF4-FFF2-40B4-BE49-F238E27FC236}">
+                <a16:creationId xmlns:a16="http://schemas.microsoft.com/office/drawing/2014/main" id="{65263392-286B-6026-A5FD-036B9CE9C10F}"/>
+              </a:ext>
+            </a:extLst>
+          </p:cNvPr>
+          <p:cNvSpPr/>
+          <p:nvPr/>
+        </p:nvSpPr>
+        <p:spPr>
+          <a:xfrm>
+            <a:off x="2122098" y="952338"/>
+            <a:ext cx="1817298" cy="471578"/>
+          </a:xfrm>
+          <a:prstGeom prst="rightArrow">
+            <a:avLst/>
+          </a:prstGeom>
+          <a:ln w="38100">
+            <a:solidFill>
+              <a:schemeClr val="bg1"/>
+            </a:solidFill>
+          </a:ln>
+        </p:spPr>
+        <p:style>
+          <a:lnRef idx="2">
+            <a:schemeClr val="accent1">
+              <a:shade val="15000"/>
+            </a:schemeClr>
+          </a:lnRef>
+          <a:fillRef idx="1">
+            <a:schemeClr val="accent1"/>
+          </a:fillRef>
+          <a:effectRef idx="0">
+            <a:schemeClr val="accent1"/>
+          </a:effectRef>
+          <a:fontRef idx="minor">
+            <a:schemeClr val="lt1"/>
+          </a:fontRef>
+        </p:style>
+        <p:txBody>
+          <a:bodyPr rtlCol="0" anchor="ctr"/>
+          <a:lstStyle/>
+          <a:p>
+            <a:pPr algn="ctr"/>
+            <a:endParaRPr lang="en-GB"/>
+          </a:p>
+        </p:txBody>
+      </p:sp>
+      <p:sp>
+        <p:nvSpPr>
+          <p:cNvPr id="16" name="Arrow: Right 15">
+            <a:extLst>
+              <a:ext uri="{FF2B5EF4-FFF2-40B4-BE49-F238E27FC236}">
+                <a16:creationId xmlns:a16="http://schemas.microsoft.com/office/drawing/2014/main" id="{6B908D84-1C15-3D9F-5161-A002DC1B58C3}"/>
+              </a:ext>
+            </a:extLst>
+          </p:cNvPr>
+          <p:cNvSpPr/>
+          <p:nvPr/>
+        </p:nvSpPr>
+        <p:spPr>
+          <a:xfrm>
+            <a:off x="2122098" y="1647789"/>
+            <a:ext cx="1817298" cy="471578"/>
+          </a:xfrm>
+          <a:prstGeom prst="rightArrow">
+            <a:avLst/>
+          </a:prstGeom>
+          <a:ln w="38100">
+            <a:solidFill>
+              <a:schemeClr val="bg1"/>
+            </a:solidFill>
+          </a:ln>
+        </p:spPr>
+        <p:style>
+          <a:lnRef idx="2">
+            <a:schemeClr val="accent1">
+              <a:shade val="15000"/>
+            </a:schemeClr>
+          </a:lnRef>
+          <a:fillRef idx="1">
+            <a:schemeClr val="accent1"/>
+          </a:fillRef>
+          <a:effectRef idx="0">
+            <a:schemeClr val="accent1"/>
+          </a:effectRef>
+          <a:fontRef idx="minor">
+            <a:schemeClr val="lt1"/>
+          </a:fontRef>
+        </p:style>
+        <p:txBody>
+          <a:bodyPr rtlCol="0" anchor="ctr"/>
+          <a:lstStyle/>
+          <a:p>
+            <a:pPr algn="ctr"/>
+            <a:endParaRPr lang="en-GB"/>
+          </a:p>
+        </p:txBody>
+      </p:sp>
+      <p:sp>
+        <p:nvSpPr>
+          <p:cNvPr id="17" name="Arrow: Right 16">
+            <a:extLst>
+              <a:ext uri="{FF2B5EF4-FFF2-40B4-BE49-F238E27FC236}">
+                <a16:creationId xmlns:a16="http://schemas.microsoft.com/office/drawing/2014/main" id="{76042DCC-6349-C1AB-84E6-3BA2B4A03061}"/>
+              </a:ext>
+            </a:extLst>
+          </p:cNvPr>
+          <p:cNvSpPr/>
+          <p:nvPr/>
+        </p:nvSpPr>
+        <p:spPr>
+          <a:xfrm>
+            <a:off x="2053501" y="3247307"/>
+            <a:ext cx="1817298" cy="471578"/>
+          </a:xfrm>
+          <a:prstGeom prst="rightArrow">
+            <a:avLst/>
+          </a:prstGeom>
+          <a:ln w="38100">
+            <a:solidFill>
+              <a:schemeClr val="bg1"/>
+            </a:solidFill>
+          </a:ln>
+        </p:spPr>
+        <p:style>
+          <a:lnRef idx="2">
+            <a:schemeClr val="accent1">
+              <a:shade val="15000"/>
+            </a:schemeClr>
+          </a:lnRef>
+          <a:fillRef idx="1">
+            <a:schemeClr val="accent1"/>
+          </a:fillRef>
+          <a:effectRef idx="0">
+            <a:schemeClr val="accent1"/>
+          </a:effectRef>
+          <a:fontRef idx="minor">
+            <a:schemeClr val="lt1"/>
+          </a:fontRef>
+        </p:style>
+        <p:txBody>
+          <a:bodyPr rtlCol="0" anchor="ctr"/>
+          <a:lstStyle/>
+          <a:p>
+            <a:pPr algn="ctr"/>
+            <a:endParaRPr lang="en-GB"/>
+          </a:p>
+        </p:txBody>
+      </p:sp>
+      <p:sp>
+        <p:nvSpPr>
+          <p:cNvPr id="18" name="Arrow: Right 17">
+            <a:extLst>
+              <a:ext uri="{FF2B5EF4-FFF2-40B4-BE49-F238E27FC236}">
+                <a16:creationId xmlns:a16="http://schemas.microsoft.com/office/drawing/2014/main" id="{CBB4949F-F982-8388-66B8-8E7A7BB67380}"/>
+              </a:ext>
+            </a:extLst>
+          </p:cNvPr>
+          <p:cNvSpPr/>
+          <p:nvPr/>
+        </p:nvSpPr>
+        <p:spPr>
+          <a:xfrm>
+            <a:off x="2106057" y="2531914"/>
+            <a:ext cx="1817298" cy="471578"/>
+          </a:xfrm>
+          <a:prstGeom prst="rightArrow">
+            <a:avLst/>
+          </a:prstGeom>
+          <a:ln w="38100">
+            <a:solidFill>
+              <a:schemeClr val="bg1"/>
+            </a:solidFill>
+          </a:ln>
+        </p:spPr>
+        <p:style>
+          <a:lnRef idx="2">
+            <a:schemeClr val="accent1">
+              <a:shade val="15000"/>
+            </a:schemeClr>
+          </a:lnRef>
+          <a:fillRef idx="1">
+            <a:schemeClr val="accent1"/>
+          </a:fillRef>
+          <a:effectRef idx="0">
+            <a:schemeClr val="accent1"/>
+          </a:effectRef>
+          <a:fontRef idx="minor">
+            <a:schemeClr val="lt1"/>
+          </a:fontRef>
+        </p:style>
+        <p:txBody>
+          <a:bodyPr rtlCol="0" anchor="ctr"/>
+          <a:lstStyle/>
+          <a:p>
+            <a:pPr algn="ctr"/>
+            <a:endParaRPr lang="en-GB"/>
+          </a:p>
+        </p:txBody>
+      </p:sp>
+      <p:sp>
+        <p:nvSpPr>
+          <p:cNvPr id="20" name="Rectangle 19">
+            <a:extLst>
+              <a:ext uri="{FF2B5EF4-FFF2-40B4-BE49-F238E27FC236}">
+                <a16:creationId xmlns:a16="http://schemas.microsoft.com/office/drawing/2014/main" id="{3D90CE56-A83D-C715-634A-98C585A86FA5}"/>
+              </a:ext>
+            </a:extLst>
+          </p:cNvPr>
+          <p:cNvSpPr/>
+          <p:nvPr/>
+        </p:nvSpPr>
+        <p:spPr>
+          <a:xfrm>
+            <a:off x="6815944" y="758072"/>
+            <a:ext cx="896901" cy="307777"/>
+          </a:xfrm>
+          <a:prstGeom prst="rect">
+            <a:avLst/>
+          </a:prstGeom>
+          <a:ln>
+            <a:solidFill>
+              <a:schemeClr val="bg1"/>
+            </a:solidFill>
+          </a:ln>
+        </p:spPr>
+        <p:style>
+          <a:lnRef idx="2">
+            <a:schemeClr val="accent1">
+              <a:shade val="15000"/>
+            </a:schemeClr>
+          </a:lnRef>
+          <a:fillRef idx="1">
+            <a:schemeClr val="accent1"/>
+          </a:fillRef>
+          <a:effectRef idx="0">
+            <a:schemeClr val="accent1"/>
+          </a:effectRef>
+          <a:fontRef idx="minor">
+            <a:schemeClr val="lt1"/>
+          </a:fontRef>
+        </p:style>
+        <p:txBody>
+          <a:bodyPr wrap="none" rtlCol="0" anchor="t" anchorCtr="0"/>
+          <a:lstStyle/>
+          <a:p>
+            <a:r>
+              <a:rPr lang="en-GB" sz="1400" dirty="0"/>
+              <a:t>Extension</a:t>
+            </a:r>
+          </a:p>
+        </p:txBody>
+      </p:sp>
+      <p:sp>
+        <p:nvSpPr>
+          <p:cNvPr id="21" name="Rectangle 20">
+            <a:extLst>
+              <a:ext uri="{FF2B5EF4-FFF2-40B4-BE49-F238E27FC236}">
+                <a16:creationId xmlns:a16="http://schemas.microsoft.com/office/drawing/2014/main" id="{B51F98FA-EDC2-F982-8DEF-277DB5DDE978}"/>
+              </a:ext>
+            </a:extLst>
+          </p:cNvPr>
+          <p:cNvSpPr/>
+          <p:nvPr/>
+        </p:nvSpPr>
+        <p:spPr>
+          <a:xfrm>
+            <a:off x="7869627" y="758072"/>
+            <a:ext cx="1384467" cy="304974"/>
+          </a:xfrm>
+          <a:prstGeom prst="rect">
+            <a:avLst/>
+          </a:prstGeom>
+          <a:solidFill>
+            <a:schemeClr val="accent2"/>
+          </a:solidFill>
+          <a:ln>
+            <a:solidFill>
+              <a:schemeClr val="bg1"/>
+            </a:solidFill>
+          </a:ln>
+        </p:spPr>
+        <p:style>
+          <a:lnRef idx="2">
+            <a:schemeClr val="accent1">
+              <a:shade val="15000"/>
+            </a:schemeClr>
+          </a:lnRef>
+          <a:fillRef idx="1">
+            <a:schemeClr val="accent1"/>
+          </a:fillRef>
+          <a:effectRef idx="0">
+            <a:schemeClr val="accent1"/>
+          </a:effectRef>
+          <a:fontRef idx="minor">
+            <a:schemeClr val="lt1"/>
+          </a:fontRef>
+        </p:style>
+        <p:txBody>
+          <a:bodyPr wrap="none" rtlCol="0" anchor="t" anchorCtr="0"/>
+          <a:lstStyle/>
+          <a:p>
+            <a:r>
+              <a:rPr lang="en-GB" sz="1400" dirty="0"/>
+              <a:t>Profile from UDP</a:t>
+            </a:r>
+          </a:p>
+        </p:txBody>
+      </p:sp>
+      <p:sp>
+        <p:nvSpPr>
+          <p:cNvPr id="22" name="Rectangle 21">
+            <a:extLst>
+              <a:ext uri="{FF2B5EF4-FFF2-40B4-BE49-F238E27FC236}">
+                <a16:creationId xmlns:a16="http://schemas.microsoft.com/office/drawing/2014/main" id="{53CEC505-B7D1-39BF-08F1-6F4FD6875FC2}"/>
+              </a:ext>
+            </a:extLst>
+          </p:cNvPr>
+          <p:cNvSpPr/>
+          <p:nvPr/>
+        </p:nvSpPr>
+        <p:spPr>
+          <a:xfrm>
+            <a:off x="9331123" y="758072"/>
+            <a:ext cx="1384467" cy="304973"/>
+          </a:xfrm>
+          <a:prstGeom prst="rect">
+            <a:avLst/>
+          </a:prstGeom>
+          <a:solidFill>
+            <a:schemeClr val="accent6"/>
+          </a:solidFill>
+          <a:ln>
+            <a:solidFill>
+              <a:schemeClr val="bg1"/>
+            </a:solidFill>
+          </a:ln>
+        </p:spPr>
+        <p:style>
+          <a:lnRef idx="2">
+            <a:schemeClr val="accent1">
+              <a:shade val="15000"/>
+            </a:schemeClr>
+          </a:lnRef>
+          <a:fillRef idx="1">
+            <a:schemeClr val="accent1"/>
+          </a:fillRef>
+          <a:effectRef idx="0">
+            <a:schemeClr val="accent1"/>
+          </a:effectRef>
+          <a:fontRef idx="minor">
+            <a:schemeClr val="lt1"/>
+          </a:fontRef>
+        </p:style>
+        <p:txBody>
+          <a:bodyPr wrap="none" rtlCol="0" anchor="t" anchorCtr="0"/>
+          <a:lstStyle/>
+          <a:p>
+            <a:r>
+              <a:rPr lang="en-GB" sz="1400" dirty="0"/>
+              <a:t>Profile from EBM</a:t>
+            </a:r>
+          </a:p>
+        </p:txBody>
+      </p:sp>
+      <p:sp>
+        <p:nvSpPr>
+          <p:cNvPr id="23" name="TextBox 22">
+            <a:extLst>
+              <a:ext uri="{FF2B5EF4-FFF2-40B4-BE49-F238E27FC236}">
+                <a16:creationId xmlns:a16="http://schemas.microsoft.com/office/drawing/2014/main" id="{CED629DB-E2C1-1914-C7D3-831719B294B0}"/>
+              </a:ext>
+            </a:extLst>
+          </p:cNvPr>
+          <p:cNvSpPr txBox="1"/>
+          <p:nvPr/>
+        </p:nvSpPr>
+        <p:spPr>
+          <a:xfrm>
+            <a:off x="6183094" y="732724"/>
+            <a:ext cx="492827" cy="307777"/>
+          </a:xfrm>
+          <a:prstGeom prst="rect">
+            <a:avLst/>
+          </a:prstGeom>
+          <a:noFill/>
+        </p:spPr>
+        <p:txBody>
+          <a:bodyPr wrap="none" rtlCol="0">
+            <a:spAutoFit/>
+          </a:bodyPr>
+          <a:lstStyle/>
+          <a:p>
+            <a:r>
+              <a:rPr lang="en-GB" sz="1400" dirty="0"/>
+              <a:t>Key:</a:t>
+            </a:r>
+          </a:p>
+        </p:txBody>
+      </p:sp>
+    </p:spTree>
+    <p:extLst>
+      <p:ext uri="{BB962C8B-B14F-4D97-AF65-F5344CB8AC3E}">
+        <p14:creationId xmlns:p14="http://schemas.microsoft.com/office/powerpoint/2010/main" val="160287417"/>
+      </p:ext>
+    </p:extLst>
+  </p:cSld>
+  <p:clrMapOvr>
+    <a:masterClrMapping/>
+  </p:clrMapOvr>
+</p:sld>
+</file>
+
+<file path=ppt/slides/slide12.xml><?xml version="1.0" encoding="utf-8"?>
+<p:sld xmlns:a="http://schemas.openxmlformats.org/drawingml/2006/main" xmlns:r="http://schemas.openxmlformats.org/officeDocument/2006/relationships" xmlns:p="http://schemas.openxmlformats.org/presentationml/2006/main">
+  <p:cSld>
+    <p:spTree>
+      <p:nvGrpSpPr>
+        <p:cNvPr id="1" name="">
+          <a:extLst>
+            <a:ext uri="{FF2B5EF4-FFF2-40B4-BE49-F238E27FC236}">
               <a16:creationId xmlns:a16="http://schemas.microsoft.com/office/drawing/2014/main" id="{F647A574-50C2-E8E8-ADDF-05EDDB31C00C}"/>
             </a:ext>
           </a:extLst>
@@ -21740,7 +23475,7 @@
 </p:sld>
 </file>
 
-<file path=ppt/slides/slide11.xml><?xml version="1.0" encoding="utf-8"?>
+<file path=ppt/slides/slide13.xml><?xml version="1.0" encoding="utf-8"?>
 <p:sld xmlns:a="http://schemas.openxmlformats.org/drawingml/2006/main" xmlns:r="http://schemas.openxmlformats.org/officeDocument/2006/relationships" xmlns:p="http://schemas.openxmlformats.org/presentationml/2006/main">
   <p:cSld>
     <p:spTree>
@@ -22441,6 +24176,368 @@
       </p:grpSpPr>
       <p:sp>
         <p:nvSpPr>
+          <p:cNvPr id="2" name="Rectangle 1">
+            <a:extLst>
+              <a:ext uri="{FF2B5EF4-FFF2-40B4-BE49-F238E27FC236}">
+                <a16:creationId xmlns:a16="http://schemas.microsoft.com/office/drawing/2014/main" id="{5C3CC415-CBA9-9B1F-46D5-1B9DD964084B}"/>
+              </a:ext>
+            </a:extLst>
+          </p:cNvPr>
+          <p:cNvSpPr/>
+          <p:nvPr/>
+        </p:nvSpPr>
+        <p:spPr>
+          <a:xfrm>
+            <a:off x="3595017" y="1193044"/>
+            <a:ext cx="2672862" cy="952921"/>
+          </a:xfrm>
+          <a:prstGeom prst="rect">
+            <a:avLst/>
+          </a:prstGeom>
+        </p:spPr>
+        <p:style>
+          <a:lnRef idx="2">
+            <a:schemeClr val="accent1">
+              <a:shade val="15000"/>
+            </a:schemeClr>
+          </a:lnRef>
+          <a:fillRef idx="1">
+            <a:schemeClr val="accent1"/>
+          </a:fillRef>
+          <a:effectRef idx="0">
+            <a:schemeClr val="accent1"/>
+          </a:effectRef>
+          <a:fontRef idx="minor">
+            <a:schemeClr val="lt1"/>
+          </a:fontRef>
+        </p:style>
+        <p:txBody>
+          <a:bodyPr rtlCol="0" anchor="ctr"/>
+          <a:lstStyle/>
+          <a:p>
+            <a:pPr algn="ctr"/>
+            <a:r>
+              <a:rPr lang="en-GB" dirty="0"/>
+              <a:t>FHIR Representation</a:t>
+            </a:r>
+            <a:br>
+              <a:rPr lang="en-GB" dirty="0"/>
+            </a:br>
+            <a:r>
+              <a:rPr lang="en-GB" dirty="0"/>
+              <a:t>in UDP</a:t>
+            </a:r>
+          </a:p>
+        </p:txBody>
+      </p:sp>
+      <p:sp>
+        <p:nvSpPr>
+          <p:cNvPr id="3" name="Rectangle: Rounded Corners 2">
+            <a:extLst>
+              <a:ext uri="{FF2B5EF4-FFF2-40B4-BE49-F238E27FC236}">
+                <a16:creationId xmlns:a16="http://schemas.microsoft.com/office/drawing/2014/main" id="{4E0A8945-7E85-B211-E3CA-26AE0311CB6E}"/>
+              </a:ext>
+            </a:extLst>
+          </p:cNvPr>
+          <p:cNvSpPr/>
+          <p:nvPr/>
+        </p:nvSpPr>
+        <p:spPr>
+          <a:xfrm>
+            <a:off x="3113649" y="3146475"/>
+            <a:ext cx="1688123" cy="900332"/>
+          </a:xfrm>
+          <a:prstGeom prst="roundRect">
+            <a:avLst/>
+          </a:prstGeom>
+          <a:gradFill flip="none" rotWithShape="1">
+            <a:gsLst>
+              <a:gs pos="0">
+                <a:schemeClr val="accent2">
+                  <a:lumMod val="67000"/>
+                </a:schemeClr>
+              </a:gs>
+              <a:gs pos="48000">
+                <a:schemeClr val="accent2">
+                  <a:lumMod val="97000"/>
+                  <a:lumOff val="3000"/>
+                </a:schemeClr>
+              </a:gs>
+              <a:gs pos="100000">
+                <a:schemeClr val="accent2">
+                  <a:lumMod val="60000"/>
+                  <a:lumOff val="40000"/>
+                </a:schemeClr>
+              </a:gs>
+            </a:gsLst>
+            <a:lin ang="5400000" scaled="1"/>
+            <a:tileRect/>
+          </a:gradFill>
+        </p:spPr>
+        <p:style>
+          <a:lnRef idx="2">
+            <a:schemeClr val="accent1">
+              <a:shade val="15000"/>
+            </a:schemeClr>
+          </a:lnRef>
+          <a:fillRef idx="1">
+            <a:schemeClr val="accent1"/>
+          </a:fillRef>
+          <a:effectRef idx="0">
+            <a:schemeClr val="accent1"/>
+          </a:effectRef>
+          <a:fontRef idx="minor">
+            <a:schemeClr val="lt1"/>
+          </a:fontRef>
+        </p:style>
+        <p:txBody>
+          <a:bodyPr rtlCol="0" anchor="ctr"/>
+          <a:lstStyle/>
+          <a:p>
+            <a:pPr algn="ctr"/>
+            <a:r>
+              <a:rPr lang="en-GB" dirty="0"/>
+              <a:t>Narrative Form</a:t>
+            </a:r>
+          </a:p>
+        </p:txBody>
+      </p:sp>
+      <p:sp>
+        <p:nvSpPr>
+          <p:cNvPr id="4" name="Rectangle: Rounded Corners 3">
+            <a:extLst>
+              <a:ext uri="{FF2B5EF4-FFF2-40B4-BE49-F238E27FC236}">
+                <a16:creationId xmlns:a16="http://schemas.microsoft.com/office/drawing/2014/main" id="{F62D0DEE-EB86-6EAA-6615-449AE14875C8}"/>
+              </a:ext>
+            </a:extLst>
+          </p:cNvPr>
+          <p:cNvSpPr/>
+          <p:nvPr/>
+        </p:nvSpPr>
+        <p:spPr>
+          <a:xfrm>
+            <a:off x="5327545" y="3146475"/>
+            <a:ext cx="1688123" cy="1002955"/>
+          </a:xfrm>
+          <a:prstGeom prst="roundRect">
+            <a:avLst/>
+          </a:prstGeom>
+          <a:gradFill flip="none" rotWithShape="1">
+            <a:gsLst>
+              <a:gs pos="0">
+                <a:schemeClr val="accent6">
+                  <a:lumMod val="67000"/>
+                </a:schemeClr>
+              </a:gs>
+              <a:gs pos="48000">
+                <a:schemeClr val="accent6">
+                  <a:lumMod val="97000"/>
+                  <a:lumOff val="3000"/>
+                </a:schemeClr>
+              </a:gs>
+              <a:gs pos="100000">
+                <a:schemeClr val="accent6">
+                  <a:lumMod val="60000"/>
+                  <a:lumOff val="40000"/>
+                </a:schemeClr>
+              </a:gs>
+            </a:gsLst>
+            <a:lin ang="5400000" scaled="1"/>
+            <a:tileRect/>
+          </a:gradFill>
+        </p:spPr>
+        <p:style>
+          <a:lnRef idx="2">
+            <a:schemeClr val="accent1">
+              <a:shade val="15000"/>
+            </a:schemeClr>
+          </a:lnRef>
+          <a:fillRef idx="1">
+            <a:schemeClr val="accent1"/>
+          </a:fillRef>
+          <a:effectRef idx="0">
+            <a:schemeClr val="accent1"/>
+          </a:effectRef>
+          <a:fontRef idx="minor">
+            <a:schemeClr val="lt1"/>
+          </a:fontRef>
+        </p:style>
+        <p:txBody>
+          <a:bodyPr rtlCol="0" anchor="ctr"/>
+          <a:lstStyle/>
+          <a:p>
+            <a:pPr algn="ctr"/>
+            <a:r>
+              <a:rPr lang="en-GB" dirty="0"/>
+              <a:t>Structured Form</a:t>
+            </a:r>
+          </a:p>
+        </p:txBody>
+      </p:sp>
+      <p:sp>
+        <p:nvSpPr>
+          <p:cNvPr id="5" name="Arrow: Down 4">
+            <a:extLst>
+              <a:ext uri="{FF2B5EF4-FFF2-40B4-BE49-F238E27FC236}">
+                <a16:creationId xmlns:a16="http://schemas.microsoft.com/office/drawing/2014/main" id="{FE5A51BC-65F6-794E-5DA5-012336DA6CE8}"/>
+              </a:ext>
+            </a:extLst>
+          </p:cNvPr>
+          <p:cNvSpPr/>
+          <p:nvPr/>
+        </p:nvSpPr>
+        <p:spPr>
+          <a:xfrm rot="1684902">
+            <a:off x="3935313" y="2340062"/>
+            <a:ext cx="480486" cy="751738"/>
+          </a:xfrm>
+          <a:prstGeom prst="downArrow">
+            <a:avLst/>
+          </a:prstGeom>
+          <a:gradFill>
+            <a:gsLst>
+              <a:gs pos="0">
+                <a:srgbClr val="0070C0"/>
+              </a:gs>
+              <a:gs pos="62000">
+                <a:schemeClr val="accent2">
+                  <a:lumMod val="97000"/>
+                  <a:lumOff val="3000"/>
+                </a:schemeClr>
+              </a:gs>
+              <a:gs pos="100000">
+                <a:schemeClr val="accent2">
+                  <a:lumMod val="60000"/>
+                  <a:lumOff val="40000"/>
+                </a:schemeClr>
+              </a:gs>
+            </a:gsLst>
+            <a:lin ang="5400000" scaled="1"/>
+          </a:gradFill>
+        </p:spPr>
+        <p:style>
+          <a:lnRef idx="2">
+            <a:schemeClr val="accent1">
+              <a:shade val="15000"/>
+            </a:schemeClr>
+          </a:lnRef>
+          <a:fillRef idx="1">
+            <a:schemeClr val="accent1"/>
+          </a:fillRef>
+          <a:effectRef idx="0">
+            <a:schemeClr val="accent1"/>
+          </a:effectRef>
+          <a:fontRef idx="minor">
+            <a:schemeClr val="lt1"/>
+          </a:fontRef>
+        </p:style>
+        <p:txBody>
+          <a:bodyPr rtlCol="0" anchor="ctr"/>
+          <a:lstStyle/>
+          <a:p>
+            <a:pPr algn="ctr"/>
+            <a:endParaRPr lang="en-GB"/>
+          </a:p>
+        </p:txBody>
+      </p:sp>
+      <p:sp>
+        <p:nvSpPr>
+          <p:cNvPr id="7" name="Arrow: Down 6">
+            <a:extLst>
+              <a:ext uri="{FF2B5EF4-FFF2-40B4-BE49-F238E27FC236}">
+                <a16:creationId xmlns:a16="http://schemas.microsoft.com/office/drawing/2014/main" id="{E8739C98-54BE-C342-A486-37C89452767D}"/>
+              </a:ext>
+            </a:extLst>
+          </p:cNvPr>
+          <p:cNvSpPr/>
+          <p:nvPr/>
+        </p:nvSpPr>
+        <p:spPr>
+          <a:xfrm rot="19476766">
+            <a:off x="5528669" y="2339218"/>
+            <a:ext cx="480486" cy="751738"/>
+          </a:xfrm>
+          <a:prstGeom prst="downArrow">
+            <a:avLst/>
+          </a:prstGeom>
+          <a:gradFill flip="none" rotWithShape="1">
+            <a:gsLst>
+              <a:gs pos="0">
+                <a:schemeClr val="accent6">
+                  <a:lumMod val="67000"/>
+                </a:schemeClr>
+              </a:gs>
+              <a:gs pos="32000">
+                <a:schemeClr val="accent6">
+                  <a:lumMod val="97000"/>
+                  <a:lumOff val="3000"/>
+                </a:schemeClr>
+              </a:gs>
+              <a:gs pos="100000">
+                <a:srgbClr val="0070C0"/>
+              </a:gs>
+            </a:gsLst>
+            <a:lin ang="16200000" scaled="1"/>
+            <a:tileRect/>
+          </a:gradFill>
+        </p:spPr>
+        <p:style>
+          <a:lnRef idx="2">
+            <a:schemeClr val="accent1">
+              <a:shade val="15000"/>
+            </a:schemeClr>
+          </a:lnRef>
+          <a:fillRef idx="1">
+            <a:schemeClr val="accent1"/>
+          </a:fillRef>
+          <a:effectRef idx="0">
+            <a:schemeClr val="accent1"/>
+          </a:effectRef>
+          <a:fontRef idx="minor">
+            <a:schemeClr val="lt1"/>
+          </a:fontRef>
+        </p:style>
+        <p:txBody>
+          <a:bodyPr rtlCol="0" anchor="ctr"/>
+          <a:lstStyle/>
+          <a:p>
+            <a:pPr algn="ctr"/>
+            <a:endParaRPr lang="en-GB"/>
+          </a:p>
+        </p:txBody>
+      </p:sp>
+    </p:spTree>
+    <p:extLst>
+      <p:ext uri="{BB962C8B-B14F-4D97-AF65-F5344CB8AC3E}">
+        <p14:creationId xmlns:p14="http://schemas.microsoft.com/office/powerpoint/2010/main" val="3092881865"/>
+      </p:ext>
+    </p:extLst>
+  </p:cSld>
+  <p:clrMapOvr>
+    <a:masterClrMapping/>
+  </p:clrMapOvr>
+</p:sld>
+</file>
+
+<file path=ppt/slides/slide6.xml><?xml version="1.0" encoding="utf-8"?>
+<p:sld xmlns:a="http://schemas.openxmlformats.org/drawingml/2006/main" xmlns:r="http://schemas.openxmlformats.org/officeDocument/2006/relationships" xmlns:p="http://schemas.openxmlformats.org/presentationml/2006/main">
+  <p:cSld>
+    <p:spTree>
+      <p:nvGrpSpPr>
+        <p:cNvPr id="1" name=""/>
+        <p:cNvGrpSpPr/>
+        <p:nvPr/>
+      </p:nvGrpSpPr>
+      <p:grpSpPr>
+        <a:xfrm>
+          <a:off x="0" y="0"/>
+          <a:ext cx="0" cy="0"/>
+          <a:chOff x="0" y="0"/>
+          <a:chExt cx="0" cy="0"/>
+        </a:xfrm>
+      </p:grpSpPr>
+      <p:sp>
+        <p:nvSpPr>
           <p:cNvPr id="2" name="Text Placeholder 1">
             <a:extLst>
               <a:ext uri="{FF2B5EF4-FFF2-40B4-BE49-F238E27FC236}">
@@ -22974,7 +25071,7 @@
 </p:sld>
 </file>
 
-<file path=ppt/slides/slide6.xml><?xml version="1.0" encoding="utf-8"?>
+<file path=ppt/slides/slide7.xml><?xml version="1.0" encoding="utf-8"?>
 <p:sld xmlns:a="http://schemas.openxmlformats.org/drawingml/2006/main" xmlns:r="http://schemas.openxmlformats.org/officeDocument/2006/relationships" xmlns:p="http://schemas.openxmlformats.org/presentationml/2006/main">
   <p:cSld>
     <p:spTree>
@@ -23574,7 +25671,7 @@
 </p:sld>
 </file>
 
-<file path=ppt/slides/slide7.xml><?xml version="1.0" encoding="utf-8"?>
+<file path=ppt/slides/slide8.xml><?xml version="1.0" encoding="utf-8"?>
 <p:sld xmlns:a="http://schemas.openxmlformats.org/drawingml/2006/main" xmlns:r="http://schemas.openxmlformats.org/officeDocument/2006/relationships" xmlns:p="http://schemas.openxmlformats.org/presentationml/2006/main">
   <p:cSld>
     <p:spTree>
@@ -23894,7 +25991,7 @@
 </p:sld>
 </file>
 
-<file path=ppt/slides/slide8.xml><?xml version="1.0" encoding="utf-8"?>
+<file path=ppt/slides/slide9.xml><?xml version="1.0" encoding="utf-8"?>
 <p:sld xmlns:a="http://schemas.openxmlformats.org/drawingml/2006/main" xmlns:r="http://schemas.openxmlformats.org/officeDocument/2006/relationships" xmlns:p="http://schemas.openxmlformats.org/presentationml/2006/main">
   <p:cSld>
     <p:spTree>
@@ -24826,1112 +26923,6 @@
     <p:extLst>
       <p:ext uri="{BB962C8B-B14F-4D97-AF65-F5344CB8AC3E}">
         <p14:creationId xmlns:p14="http://schemas.microsoft.com/office/powerpoint/2010/main" val="184038803"/>
-      </p:ext>
-    </p:extLst>
-  </p:cSld>
-  <p:clrMapOvr>
-    <a:masterClrMapping/>
-  </p:clrMapOvr>
-</p:sld>
-</file>
-
-<file path=ppt/slides/slide9.xml><?xml version="1.0" encoding="utf-8"?>
-<p:sld xmlns:a="http://schemas.openxmlformats.org/drawingml/2006/main" xmlns:r="http://schemas.openxmlformats.org/officeDocument/2006/relationships" xmlns:p="http://schemas.openxmlformats.org/presentationml/2006/main">
-  <p:cSld>
-    <p:spTree>
-      <p:nvGrpSpPr>
-        <p:cNvPr id="1" name=""/>
-        <p:cNvGrpSpPr/>
-        <p:nvPr/>
-      </p:nvGrpSpPr>
-      <p:grpSpPr>
-        <a:xfrm>
-          <a:off x="0" y="0"/>
-          <a:ext cx="0" cy="0"/>
-          <a:chOff x="0" y="0"/>
-          <a:chExt cx="0" cy="0"/>
-        </a:xfrm>
-      </p:grpSpPr>
-      <p:sp>
-        <p:nvSpPr>
-          <p:cNvPr id="2" name="Rectangle 1">
-            <a:extLst>
-              <a:ext uri="{FF2B5EF4-FFF2-40B4-BE49-F238E27FC236}">
-                <a16:creationId xmlns:a16="http://schemas.microsoft.com/office/drawing/2014/main" id="{A428D5B9-DFF1-3C84-B3E4-3F581C93F88C}"/>
-              </a:ext>
-            </a:extLst>
-          </p:cNvPr>
-          <p:cNvSpPr/>
-          <p:nvPr/>
-        </p:nvSpPr>
-        <p:spPr>
-          <a:xfrm>
-            <a:off x="156691" y="206326"/>
-            <a:ext cx="3219113" cy="4273660"/>
-          </a:xfrm>
-          <a:prstGeom prst="rect">
-            <a:avLst/>
-          </a:prstGeom>
-          <a:solidFill>
-            <a:schemeClr val="accent3"/>
-          </a:solidFill>
-          <a:ln>
-            <a:solidFill>
-              <a:schemeClr val="bg1"/>
-            </a:solidFill>
-          </a:ln>
-        </p:spPr>
-        <p:style>
-          <a:lnRef idx="2">
-            <a:schemeClr val="accent1">
-              <a:shade val="15000"/>
-            </a:schemeClr>
-          </a:lnRef>
-          <a:fillRef idx="1">
-            <a:schemeClr val="accent1"/>
-          </a:fillRef>
-          <a:effectRef idx="0">
-            <a:schemeClr val="accent1"/>
-          </a:effectRef>
-          <a:fontRef idx="minor">
-            <a:schemeClr val="lt1"/>
-          </a:fontRef>
-        </p:style>
-        <p:txBody>
-          <a:bodyPr wrap="none" rtlCol="0" anchor="t" anchorCtr="0"/>
-          <a:lstStyle/>
-          <a:p>
-            <a:r>
-              <a:rPr lang="en-GB" dirty="0" err="1"/>
-              <a:t>ResearchStudy</a:t>
-            </a:r>
-            <a:endParaRPr lang="en-GB" dirty="0"/>
-          </a:p>
-        </p:txBody>
-      </p:sp>
-      <p:sp>
-        <p:nvSpPr>
-          <p:cNvPr id="19" name="Rectangle 18">
-            <a:extLst>
-              <a:ext uri="{FF2B5EF4-FFF2-40B4-BE49-F238E27FC236}">
-                <a16:creationId xmlns:a16="http://schemas.microsoft.com/office/drawing/2014/main" id="{B7926905-7703-0C5E-9D04-9004D7806E73}"/>
-              </a:ext>
-            </a:extLst>
-          </p:cNvPr>
-          <p:cNvSpPr/>
-          <p:nvPr/>
-        </p:nvSpPr>
-        <p:spPr>
-          <a:xfrm>
-            <a:off x="288111" y="641116"/>
-            <a:ext cx="2961172" cy="3585827"/>
-          </a:xfrm>
-          <a:prstGeom prst="rect">
-            <a:avLst/>
-          </a:prstGeom>
-          <a:solidFill>
-            <a:schemeClr val="accent6"/>
-          </a:solidFill>
-          <a:ln w="38100">
-            <a:solidFill>
-              <a:schemeClr val="bg1"/>
-            </a:solidFill>
-          </a:ln>
-        </p:spPr>
-        <p:style>
-          <a:lnRef idx="2">
-            <a:schemeClr val="accent1">
-              <a:shade val="15000"/>
-            </a:schemeClr>
-          </a:lnRef>
-          <a:fillRef idx="1">
-            <a:schemeClr val="accent1"/>
-          </a:fillRef>
-          <a:effectRef idx="0">
-            <a:schemeClr val="accent1"/>
-          </a:effectRef>
-          <a:fontRef idx="minor">
-            <a:schemeClr val="lt1"/>
-          </a:fontRef>
-        </p:style>
-        <p:txBody>
-          <a:bodyPr wrap="none" rtlCol="0" anchor="t" anchorCtr="0"/>
-          <a:lstStyle/>
-          <a:p>
-            <a:r>
-              <a:rPr lang="en-GB" dirty="0" err="1"/>
-              <a:t>StudyDesign</a:t>
-            </a:r>
-            <a:endParaRPr lang="en-GB" dirty="0"/>
-          </a:p>
-        </p:txBody>
-      </p:sp>
-      <p:sp>
-        <p:nvSpPr>
-          <p:cNvPr id="4" name="Rectangle 3">
-            <a:extLst>
-              <a:ext uri="{FF2B5EF4-FFF2-40B4-BE49-F238E27FC236}">
-                <a16:creationId xmlns:a16="http://schemas.microsoft.com/office/drawing/2014/main" id="{9C9A7485-1BDC-2014-DE43-CD8CBA6152E1}"/>
-              </a:ext>
-            </a:extLst>
-          </p:cNvPr>
-          <p:cNvSpPr/>
-          <p:nvPr/>
-        </p:nvSpPr>
-        <p:spPr>
-          <a:xfrm>
-            <a:off x="3853378" y="2587951"/>
-            <a:ext cx="2537130" cy="426561"/>
-          </a:xfrm>
-          <a:prstGeom prst="rect">
-            <a:avLst/>
-          </a:prstGeom>
-          <a:ln>
-            <a:solidFill>
-              <a:schemeClr val="bg1"/>
-            </a:solidFill>
-          </a:ln>
-        </p:spPr>
-        <p:style>
-          <a:lnRef idx="2">
-            <a:schemeClr val="accent1">
-              <a:shade val="15000"/>
-            </a:schemeClr>
-          </a:lnRef>
-          <a:fillRef idx="1">
-            <a:schemeClr val="accent1"/>
-          </a:fillRef>
-          <a:effectRef idx="0">
-            <a:schemeClr val="accent1"/>
-          </a:effectRef>
-          <a:fontRef idx="minor">
-            <a:schemeClr val="lt1"/>
-          </a:fontRef>
-        </p:style>
-        <p:txBody>
-          <a:bodyPr wrap="none" rtlCol="0" anchor="t" anchorCtr="0"/>
-          <a:lstStyle/>
-          <a:p>
-            <a:r>
-              <a:rPr lang="en-GB" dirty="0" err="1"/>
-              <a:t>NarrativeElements</a:t>
-            </a:r>
-            <a:endParaRPr lang="en-GB" dirty="0"/>
-          </a:p>
-        </p:txBody>
-      </p:sp>
-      <p:sp>
-        <p:nvSpPr>
-          <p:cNvPr id="8" name="Rectangle 7">
-            <a:extLst>
-              <a:ext uri="{FF2B5EF4-FFF2-40B4-BE49-F238E27FC236}">
-                <a16:creationId xmlns:a16="http://schemas.microsoft.com/office/drawing/2014/main" id="{77F97369-C434-94ED-4CC3-AB8B48EEB014}"/>
-              </a:ext>
-            </a:extLst>
-          </p:cNvPr>
-          <p:cNvSpPr/>
-          <p:nvPr/>
-        </p:nvSpPr>
-        <p:spPr>
-          <a:xfrm>
-            <a:off x="7229180" y="2190853"/>
-            <a:ext cx="3651849" cy="903306"/>
-          </a:xfrm>
-          <a:prstGeom prst="rect">
-            <a:avLst/>
-          </a:prstGeom>
-        </p:spPr>
-        <p:style>
-          <a:lnRef idx="2">
-            <a:schemeClr val="accent1">
-              <a:shade val="15000"/>
-            </a:schemeClr>
-          </a:lnRef>
-          <a:fillRef idx="1">
-            <a:schemeClr val="accent1"/>
-          </a:fillRef>
-          <a:effectRef idx="0">
-            <a:schemeClr val="accent1"/>
-          </a:effectRef>
-          <a:fontRef idx="minor">
-            <a:schemeClr val="lt1"/>
-          </a:fontRef>
-        </p:style>
-        <p:txBody>
-          <a:bodyPr wrap="none" rtlCol="0" anchor="t" anchorCtr="0"/>
-          <a:lstStyle/>
-          <a:p>
-            <a:r>
-              <a:rPr lang="en-GB" dirty="0"/>
-              <a:t>Composition</a:t>
-            </a:r>
-          </a:p>
-        </p:txBody>
-      </p:sp>
-      <p:sp>
-        <p:nvSpPr>
-          <p:cNvPr id="10" name="Rectangle 9">
-            <a:extLst>
-              <a:ext uri="{FF2B5EF4-FFF2-40B4-BE49-F238E27FC236}">
-                <a16:creationId xmlns:a16="http://schemas.microsoft.com/office/drawing/2014/main" id="{EF2A7B39-A5E1-3CBB-0881-01B24B25A54A}"/>
-              </a:ext>
-            </a:extLst>
-          </p:cNvPr>
-          <p:cNvSpPr/>
-          <p:nvPr/>
-        </p:nvSpPr>
-        <p:spPr>
-          <a:xfrm>
-            <a:off x="7504827" y="2556365"/>
-            <a:ext cx="3115994" cy="422676"/>
-          </a:xfrm>
-          <a:prstGeom prst="rect">
-            <a:avLst/>
-          </a:prstGeom>
-          <a:solidFill>
-            <a:schemeClr val="accent2"/>
-          </a:solidFill>
-          <a:ln>
-            <a:solidFill>
-              <a:schemeClr val="bg1"/>
-            </a:solidFill>
-          </a:ln>
-        </p:spPr>
-        <p:style>
-          <a:lnRef idx="2">
-            <a:schemeClr val="accent1">
-              <a:shade val="15000"/>
-            </a:schemeClr>
-          </a:lnRef>
-          <a:fillRef idx="1">
-            <a:schemeClr val="accent1"/>
-          </a:fillRef>
-          <a:effectRef idx="0">
-            <a:schemeClr val="accent1"/>
-          </a:effectRef>
-          <a:fontRef idx="minor">
-            <a:schemeClr val="lt1"/>
-          </a:fontRef>
-        </p:style>
-        <p:txBody>
-          <a:bodyPr wrap="none" rtlCol="0" anchor="t" anchorCtr="0"/>
-          <a:lstStyle/>
-          <a:p>
-            <a:r>
-              <a:rPr lang="en-GB" dirty="0"/>
-              <a:t>M11ResearchStudyNarratives</a:t>
-            </a:r>
-          </a:p>
-        </p:txBody>
-      </p:sp>
-      <p:sp>
-        <p:nvSpPr>
-          <p:cNvPr id="11" name="Rectangle 10">
-            <a:extLst>
-              <a:ext uri="{FF2B5EF4-FFF2-40B4-BE49-F238E27FC236}">
-                <a16:creationId xmlns:a16="http://schemas.microsoft.com/office/drawing/2014/main" id="{9022BB3E-490F-6A15-2F03-F2316EFEA2F9}"/>
-              </a:ext>
-            </a:extLst>
-          </p:cNvPr>
-          <p:cNvSpPr/>
-          <p:nvPr/>
-        </p:nvSpPr>
-        <p:spPr>
-          <a:xfrm>
-            <a:off x="491423" y="2265872"/>
-            <a:ext cx="2628032" cy="1871408"/>
-          </a:xfrm>
-          <a:prstGeom prst="rect">
-            <a:avLst/>
-          </a:prstGeom>
-          <a:solidFill>
-            <a:schemeClr val="accent2"/>
-          </a:solidFill>
-          <a:ln>
-            <a:solidFill>
-              <a:schemeClr val="bg1"/>
-            </a:solidFill>
-          </a:ln>
-        </p:spPr>
-        <p:style>
-          <a:lnRef idx="2">
-            <a:schemeClr val="accent1">
-              <a:shade val="15000"/>
-            </a:schemeClr>
-          </a:lnRef>
-          <a:fillRef idx="1">
-            <a:schemeClr val="accent1"/>
-          </a:fillRef>
-          <a:effectRef idx="0">
-            <a:schemeClr val="accent1"/>
-          </a:effectRef>
-          <a:fontRef idx="minor">
-            <a:schemeClr val="lt1"/>
-          </a:fontRef>
-        </p:style>
-        <p:txBody>
-          <a:bodyPr wrap="none" rtlCol="0" anchor="t" anchorCtr="0"/>
-          <a:lstStyle/>
-          <a:p>
-            <a:r>
-              <a:rPr lang="en-GB" dirty="0"/>
-              <a:t>M11_ResearchStudyProfile</a:t>
-            </a:r>
-          </a:p>
-        </p:txBody>
-      </p:sp>
-      <p:sp>
-        <p:nvSpPr>
-          <p:cNvPr id="12" name="Arrow: Right 11">
-            <a:extLst>
-              <a:ext uri="{FF2B5EF4-FFF2-40B4-BE49-F238E27FC236}">
-                <a16:creationId xmlns:a16="http://schemas.microsoft.com/office/drawing/2014/main" id="{A967A5DE-4FAD-EC35-648A-C432FBBB0ADB}"/>
-              </a:ext>
-            </a:extLst>
-          </p:cNvPr>
-          <p:cNvSpPr/>
-          <p:nvPr/>
-        </p:nvSpPr>
-        <p:spPr>
-          <a:xfrm>
-            <a:off x="5762690" y="2542934"/>
-            <a:ext cx="1817298" cy="471578"/>
-          </a:xfrm>
-          <a:prstGeom prst="rightArrow">
-            <a:avLst/>
-          </a:prstGeom>
-          <a:ln w="38100">
-            <a:solidFill>
-              <a:schemeClr val="bg1"/>
-            </a:solidFill>
-          </a:ln>
-        </p:spPr>
-        <p:style>
-          <a:lnRef idx="2">
-            <a:schemeClr val="accent1">
-              <a:shade val="15000"/>
-            </a:schemeClr>
-          </a:lnRef>
-          <a:fillRef idx="1">
-            <a:schemeClr val="accent1"/>
-          </a:fillRef>
-          <a:effectRef idx="0">
-            <a:schemeClr val="accent1"/>
-          </a:effectRef>
-          <a:fontRef idx="minor">
-            <a:schemeClr val="lt1"/>
-          </a:fontRef>
-        </p:style>
-        <p:txBody>
-          <a:bodyPr rtlCol="0" anchor="ctr"/>
-          <a:lstStyle/>
-          <a:p>
-            <a:pPr algn="ctr"/>
-            <a:endParaRPr lang="en-GB"/>
-          </a:p>
-        </p:txBody>
-      </p:sp>
-      <p:sp>
-        <p:nvSpPr>
-          <p:cNvPr id="13" name="Rectangle 12">
-            <a:extLst>
-              <a:ext uri="{FF2B5EF4-FFF2-40B4-BE49-F238E27FC236}">
-                <a16:creationId xmlns:a16="http://schemas.microsoft.com/office/drawing/2014/main" id="{1EE56262-80C5-C2A4-E012-DF54B533FA7B}"/>
-              </a:ext>
-            </a:extLst>
-          </p:cNvPr>
-          <p:cNvSpPr/>
-          <p:nvPr/>
-        </p:nvSpPr>
-        <p:spPr>
-          <a:xfrm>
-            <a:off x="3870800" y="992354"/>
-            <a:ext cx="1817298" cy="371333"/>
-          </a:xfrm>
-          <a:prstGeom prst="rect">
-            <a:avLst/>
-          </a:prstGeom>
-          <a:solidFill>
-            <a:schemeClr val="accent6"/>
-          </a:solidFill>
-          <a:ln>
-            <a:solidFill>
-              <a:schemeClr val="bg1"/>
-            </a:solidFill>
-          </a:ln>
-        </p:spPr>
-        <p:style>
-          <a:lnRef idx="2">
-            <a:schemeClr val="accent1">
-              <a:shade val="15000"/>
-            </a:schemeClr>
-          </a:lnRef>
-          <a:fillRef idx="1">
-            <a:schemeClr val="accent1"/>
-          </a:fillRef>
-          <a:effectRef idx="0">
-            <a:schemeClr val="accent1"/>
-          </a:effectRef>
-          <a:fontRef idx="minor">
-            <a:schemeClr val="lt1"/>
-          </a:fontRef>
-        </p:style>
-        <p:txBody>
-          <a:bodyPr wrap="none" rtlCol="0" anchor="t" anchorCtr="0"/>
-          <a:lstStyle/>
-          <a:p>
-            <a:r>
-              <a:rPr lang="en-GB" dirty="0" err="1"/>
-              <a:t>SAEReporting</a:t>
-            </a:r>
-            <a:endParaRPr lang="en-GB" dirty="0"/>
-          </a:p>
-        </p:txBody>
-      </p:sp>
-      <p:sp>
-        <p:nvSpPr>
-          <p:cNvPr id="14" name="Rectangle 13">
-            <a:extLst>
-              <a:ext uri="{FF2B5EF4-FFF2-40B4-BE49-F238E27FC236}">
-                <a16:creationId xmlns:a16="http://schemas.microsoft.com/office/drawing/2014/main" id="{0CEFD97E-F84D-8C6C-CE22-D1E84A99736E}"/>
-              </a:ext>
-            </a:extLst>
-          </p:cNvPr>
-          <p:cNvSpPr/>
-          <p:nvPr/>
-        </p:nvSpPr>
-        <p:spPr>
-          <a:xfrm>
-            <a:off x="3870799" y="1748034"/>
-            <a:ext cx="4424553" cy="371333"/>
-          </a:xfrm>
-          <a:prstGeom prst="rect">
-            <a:avLst/>
-          </a:prstGeom>
-          <a:solidFill>
-            <a:schemeClr val="accent6"/>
-          </a:solidFill>
-          <a:ln>
-            <a:solidFill>
-              <a:schemeClr val="bg1"/>
-            </a:solidFill>
-          </a:ln>
-        </p:spPr>
-        <p:style>
-          <a:lnRef idx="2">
-            <a:schemeClr val="accent1">
-              <a:shade val="15000"/>
-            </a:schemeClr>
-          </a:lnRef>
-          <a:fillRef idx="1">
-            <a:schemeClr val="accent1"/>
-          </a:fillRef>
-          <a:effectRef idx="0">
-            <a:schemeClr val="accent1"/>
-          </a:effectRef>
-          <a:fontRef idx="minor">
-            <a:schemeClr val="lt1"/>
-          </a:fontRef>
-        </p:style>
-        <p:txBody>
-          <a:bodyPr wrap="none" rtlCol="0" anchor="t" anchorCtr="0"/>
-          <a:lstStyle/>
-          <a:p>
-            <a:r>
-              <a:rPr lang="en-GB" dirty="0" err="1"/>
-              <a:t>ConfidentialityStatement</a:t>
-            </a:r>
-            <a:endParaRPr lang="en-GB" dirty="0"/>
-          </a:p>
-        </p:txBody>
-      </p:sp>
-      <p:sp>
-        <p:nvSpPr>
-          <p:cNvPr id="5" name="Rectangle 4">
-            <a:extLst>
-              <a:ext uri="{FF2B5EF4-FFF2-40B4-BE49-F238E27FC236}">
-                <a16:creationId xmlns:a16="http://schemas.microsoft.com/office/drawing/2014/main" id="{9DCA96B9-4082-71BF-98E0-378930518641}"/>
-              </a:ext>
-            </a:extLst>
-          </p:cNvPr>
-          <p:cNvSpPr/>
-          <p:nvPr/>
-        </p:nvSpPr>
-        <p:spPr>
-          <a:xfrm>
-            <a:off x="3797248" y="3308153"/>
-            <a:ext cx="4970099" cy="1574767"/>
-          </a:xfrm>
-          <a:prstGeom prst="rect">
-            <a:avLst/>
-          </a:prstGeom>
-          <a:ln>
-            <a:solidFill>
-              <a:schemeClr val="bg1"/>
-            </a:solidFill>
-          </a:ln>
-        </p:spPr>
-        <p:style>
-          <a:lnRef idx="2">
-            <a:schemeClr val="accent1">
-              <a:shade val="15000"/>
-            </a:schemeClr>
-          </a:lnRef>
-          <a:fillRef idx="1">
-            <a:schemeClr val="accent1"/>
-          </a:fillRef>
-          <a:effectRef idx="0">
-            <a:schemeClr val="accent1"/>
-          </a:effectRef>
-          <a:fontRef idx="minor">
-            <a:schemeClr val="lt1"/>
-          </a:fontRef>
-        </p:style>
-        <p:txBody>
-          <a:bodyPr wrap="none" rtlCol="0" anchor="t" anchorCtr="0"/>
-          <a:lstStyle/>
-          <a:p>
-            <a:r>
-              <a:rPr lang="en-GB" dirty="0"/>
-              <a:t>M11_ProtocolAmendment </a:t>
-            </a:r>
-          </a:p>
-          <a:p>
-            <a:endParaRPr lang="en-GB" dirty="0"/>
-          </a:p>
-        </p:txBody>
-      </p:sp>
-      <p:sp>
-        <p:nvSpPr>
-          <p:cNvPr id="6" name="Rectangle 5">
-            <a:extLst>
-              <a:ext uri="{FF2B5EF4-FFF2-40B4-BE49-F238E27FC236}">
-                <a16:creationId xmlns:a16="http://schemas.microsoft.com/office/drawing/2014/main" id="{DAE8DE3D-306A-A739-ABA1-26B8DD6012B1}"/>
-              </a:ext>
-            </a:extLst>
-          </p:cNvPr>
-          <p:cNvSpPr/>
-          <p:nvPr/>
-        </p:nvSpPr>
-        <p:spPr>
-          <a:xfrm>
-            <a:off x="4170263" y="3672267"/>
-            <a:ext cx="4424553" cy="417024"/>
-          </a:xfrm>
-          <a:prstGeom prst="rect">
-            <a:avLst/>
-          </a:prstGeom>
-          <a:ln>
-            <a:solidFill>
-              <a:schemeClr val="bg1"/>
-            </a:solidFill>
-          </a:ln>
-        </p:spPr>
-        <p:style>
-          <a:lnRef idx="2">
-            <a:schemeClr val="accent1">
-              <a:shade val="15000"/>
-            </a:schemeClr>
-          </a:lnRef>
-          <a:fillRef idx="1">
-            <a:schemeClr val="accent1"/>
-          </a:fillRef>
-          <a:effectRef idx="0">
-            <a:schemeClr val="accent1"/>
-          </a:effectRef>
-          <a:fontRef idx="minor">
-            <a:schemeClr val="lt1"/>
-          </a:fontRef>
-        </p:style>
-        <p:txBody>
-          <a:bodyPr wrap="none" rtlCol="0" anchor="t" anchorCtr="0"/>
-          <a:lstStyle/>
-          <a:p>
-            <a:r>
-              <a:rPr lang="en-GB" dirty="0" err="1"/>
-              <a:t>ResearchStudyStudyAmendmentDetails</a:t>
-            </a:r>
-            <a:r>
-              <a:rPr lang="en-GB" dirty="0"/>
-              <a:t> </a:t>
-            </a:r>
-          </a:p>
-          <a:p>
-            <a:endParaRPr lang="en-GB" dirty="0"/>
-          </a:p>
-        </p:txBody>
-      </p:sp>
-      <p:sp>
-        <p:nvSpPr>
-          <p:cNvPr id="7" name="Rectangle 6">
-            <a:extLst>
-              <a:ext uri="{FF2B5EF4-FFF2-40B4-BE49-F238E27FC236}">
-                <a16:creationId xmlns:a16="http://schemas.microsoft.com/office/drawing/2014/main" id="{B0A967C7-B667-BBC7-DCEF-14B5C47C58E6}"/>
-              </a:ext>
-            </a:extLst>
-          </p:cNvPr>
-          <p:cNvSpPr/>
-          <p:nvPr/>
-        </p:nvSpPr>
-        <p:spPr>
-          <a:xfrm>
-            <a:off x="4170263" y="4137280"/>
-            <a:ext cx="4424553" cy="481193"/>
-          </a:xfrm>
-          <a:prstGeom prst="rect">
-            <a:avLst/>
-          </a:prstGeom>
-          <a:ln>
-            <a:solidFill>
-              <a:schemeClr val="bg1"/>
-            </a:solidFill>
-          </a:ln>
-        </p:spPr>
-        <p:style>
-          <a:lnRef idx="2">
-            <a:schemeClr val="accent1">
-              <a:shade val="15000"/>
-            </a:schemeClr>
-          </a:lnRef>
-          <a:fillRef idx="1">
-            <a:schemeClr val="accent1"/>
-          </a:fillRef>
-          <a:effectRef idx="0">
-            <a:schemeClr val="accent1"/>
-          </a:effectRef>
-          <a:fontRef idx="minor">
-            <a:schemeClr val="lt1"/>
-          </a:fontRef>
-        </p:style>
-        <p:txBody>
-          <a:bodyPr wrap="none" rtlCol="0" anchor="t" anchorCtr="0"/>
-          <a:lstStyle/>
-          <a:p>
-            <a:r>
-              <a:rPr lang="en-GB" dirty="0" err="1"/>
-              <a:t>ResearchStudyStudyAmendmentScopeImpact</a:t>
-            </a:r>
-            <a:endParaRPr lang="en-GB" dirty="0"/>
-          </a:p>
-          <a:p>
-            <a:r>
-              <a:rPr lang="en-GB" dirty="0"/>
-              <a:t> </a:t>
-            </a:r>
-          </a:p>
-          <a:p>
-            <a:endParaRPr lang="en-GB" dirty="0"/>
-          </a:p>
-        </p:txBody>
-      </p:sp>
-      <p:sp>
-        <p:nvSpPr>
-          <p:cNvPr id="15" name="Arrow: Right 14">
-            <a:extLst>
-              <a:ext uri="{FF2B5EF4-FFF2-40B4-BE49-F238E27FC236}">
-                <a16:creationId xmlns:a16="http://schemas.microsoft.com/office/drawing/2014/main" id="{65263392-286B-6026-A5FD-036B9CE9C10F}"/>
-              </a:ext>
-            </a:extLst>
-          </p:cNvPr>
-          <p:cNvSpPr/>
-          <p:nvPr/>
-        </p:nvSpPr>
-        <p:spPr>
-          <a:xfrm>
-            <a:off x="2122098" y="952338"/>
-            <a:ext cx="1817298" cy="471578"/>
-          </a:xfrm>
-          <a:prstGeom prst="rightArrow">
-            <a:avLst/>
-          </a:prstGeom>
-          <a:ln w="38100">
-            <a:solidFill>
-              <a:schemeClr val="bg1"/>
-            </a:solidFill>
-          </a:ln>
-        </p:spPr>
-        <p:style>
-          <a:lnRef idx="2">
-            <a:schemeClr val="accent1">
-              <a:shade val="15000"/>
-            </a:schemeClr>
-          </a:lnRef>
-          <a:fillRef idx="1">
-            <a:schemeClr val="accent1"/>
-          </a:fillRef>
-          <a:effectRef idx="0">
-            <a:schemeClr val="accent1"/>
-          </a:effectRef>
-          <a:fontRef idx="minor">
-            <a:schemeClr val="lt1"/>
-          </a:fontRef>
-        </p:style>
-        <p:txBody>
-          <a:bodyPr rtlCol="0" anchor="ctr"/>
-          <a:lstStyle/>
-          <a:p>
-            <a:pPr algn="ctr"/>
-            <a:endParaRPr lang="en-GB"/>
-          </a:p>
-        </p:txBody>
-      </p:sp>
-      <p:sp>
-        <p:nvSpPr>
-          <p:cNvPr id="16" name="Arrow: Right 15">
-            <a:extLst>
-              <a:ext uri="{FF2B5EF4-FFF2-40B4-BE49-F238E27FC236}">
-                <a16:creationId xmlns:a16="http://schemas.microsoft.com/office/drawing/2014/main" id="{6B908D84-1C15-3D9F-5161-A002DC1B58C3}"/>
-              </a:ext>
-            </a:extLst>
-          </p:cNvPr>
-          <p:cNvSpPr/>
-          <p:nvPr/>
-        </p:nvSpPr>
-        <p:spPr>
-          <a:xfrm>
-            <a:off x="2122098" y="1647789"/>
-            <a:ext cx="1817298" cy="471578"/>
-          </a:xfrm>
-          <a:prstGeom prst="rightArrow">
-            <a:avLst/>
-          </a:prstGeom>
-          <a:ln w="38100">
-            <a:solidFill>
-              <a:schemeClr val="bg1"/>
-            </a:solidFill>
-          </a:ln>
-        </p:spPr>
-        <p:style>
-          <a:lnRef idx="2">
-            <a:schemeClr val="accent1">
-              <a:shade val="15000"/>
-            </a:schemeClr>
-          </a:lnRef>
-          <a:fillRef idx="1">
-            <a:schemeClr val="accent1"/>
-          </a:fillRef>
-          <a:effectRef idx="0">
-            <a:schemeClr val="accent1"/>
-          </a:effectRef>
-          <a:fontRef idx="minor">
-            <a:schemeClr val="lt1"/>
-          </a:fontRef>
-        </p:style>
-        <p:txBody>
-          <a:bodyPr rtlCol="0" anchor="ctr"/>
-          <a:lstStyle/>
-          <a:p>
-            <a:pPr algn="ctr"/>
-            <a:endParaRPr lang="en-GB"/>
-          </a:p>
-        </p:txBody>
-      </p:sp>
-      <p:sp>
-        <p:nvSpPr>
-          <p:cNvPr id="17" name="Arrow: Right 16">
-            <a:extLst>
-              <a:ext uri="{FF2B5EF4-FFF2-40B4-BE49-F238E27FC236}">
-                <a16:creationId xmlns:a16="http://schemas.microsoft.com/office/drawing/2014/main" id="{76042DCC-6349-C1AB-84E6-3BA2B4A03061}"/>
-              </a:ext>
-            </a:extLst>
-          </p:cNvPr>
-          <p:cNvSpPr/>
-          <p:nvPr/>
-        </p:nvSpPr>
-        <p:spPr>
-          <a:xfrm>
-            <a:off x="2053501" y="3247307"/>
-            <a:ext cx="1817298" cy="471578"/>
-          </a:xfrm>
-          <a:prstGeom prst="rightArrow">
-            <a:avLst/>
-          </a:prstGeom>
-          <a:ln w="38100">
-            <a:solidFill>
-              <a:schemeClr val="bg1"/>
-            </a:solidFill>
-          </a:ln>
-        </p:spPr>
-        <p:style>
-          <a:lnRef idx="2">
-            <a:schemeClr val="accent1">
-              <a:shade val="15000"/>
-            </a:schemeClr>
-          </a:lnRef>
-          <a:fillRef idx="1">
-            <a:schemeClr val="accent1"/>
-          </a:fillRef>
-          <a:effectRef idx="0">
-            <a:schemeClr val="accent1"/>
-          </a:effectRef>
-          <a:fontRef idx="minor">
-            <a:schemeClr val="lt1"/>
-          </a:fontRef>
-        </p:style>
-        <p:txBody>
-          <a:bodyPr rtlCol="0" anchor="ctr"/>
-          <a:lstStyle/>
-          <a:p>
-            <a:pPr algn="ctr"/>
-            <a:endParaRPr lang="en-GB"/>
-          </a:p>
-        </p:txBody>
-      </p:sp>
-      <p:sp>
-        <p:nvSpPr>
-          <p:cNvPr id="18" name="Arrow: Right 17">
-            <a:extLst>
-              <a:ext uri="{FF2B5EF4-FFF2-40B4-BE49-F238E27FC236}">
-                <a16:creationId xmlns:a16="http://schemas.microsoft.com/office/drawing/2014/main" id="{CBB4949F-F982-8388-66B8-8E7A7BB67380}"/>
-              </a:ext>
-            </a:extLst>
-          </p:cNvPr>
-          <p:cNvSpPr/>
-          <p:nvPr/>
-        </p:nvSpPr>
-        <p:spPr>
-          <a:xfrm>
-            <a:off x="2106057" y="2531914"/>
-            <a:ext cx="1817298" cy="471578"/>
-          </a:xfrm>
-          <a:prstGeom prst="rightArrow">
-            <a:avLst/>
-          </a:prstGeom>
-          <a:ln w="38100">
-            <a:solidFill>
-              <a:schemeClr val="bg1"/>
-            </a:solidFill>
-          </a:ln>
-        </p:spPr>
-        <p:style>
-          <a:lnRef idx="2">
-            <a:schemeClr val="accent1">
-              <a:shade val="15000"/>
-            </a:schemeClr>
-          </a:lnRef>
-          <a:fillRef idx="1">
-            <a:schemeClr val="accent1"/>
-          </a:fillRef>
-          <a:effectRef idx="0">
-            <a:schemeClr val="accent1"/>
-          </a:effectRef>
-          <a:fontRef idx="minor">
-            <a:schemeClr val="lt1"/>
-          </a:fontRef>
-        </p:style>
-        <p:txBody>
-          <a:bodyPr rtlCol="0" anchor="ctr"/>
-          <a:lstStyle/>
-          <a:p>
-            <a:pPr algn="ctr"/>
-            <a:endParaRPr lang="en-GB"/>
-          </a:p>
-        </p:txBody>
-      </p:sp>
-      <p:sp>
-        <p:nvSpPr>
-          <p:cNvPr id="20" name="Rectangle 19">
-            <a:extLst>
-              <a:ext uri="{FF2B5EF4-FFF2-40B4-BE49-F238E27FC236}">
-                <a16:creationId xmlns:a16="http://schemas.microsoft.com/office/drawing/2014/main" id="{3D90CE56-A83D-C715-634A-98C585A86FA5}"/>
-              </a:ext>
-            </a:extLst>
-          </p:cNvPr>
-          <p:cNvSpPr/>
-          <p:nvPr/>
-        </p:nvSpPr>
-        <p:spPr>
-          <a:xfrm>
-            <a:off x="6815944" y="758072"/>
-            <a:ext cx="896901" cy="307777"/>
-          </a:xfrm>
-          <a:prstGeom prst="rect">
-            <a:avLst/>
-          </a:prstGeom>
-          <a:ln>
-            <a:solidFill>
-              <a:schemeClr val="bg1"/>
-            </a:solidFill>
-          </a:ln>
-        </p:spPr>
-        <p:style>
-          <a:lnRef idx="2">
-            <a:schemeClr val="accent1">
-              <a:shade val="15000"/>
-            </a:schemeClr>
-          </a:lnRef>
-          <a:fillRef idx="1">
-            <a:schemeClr val="accent1"/>
-          </a:fillRef>
-          <a:effectRef idx="0">
-            <a:schemeClr val="accent1"/>
-          </a:effectRef>
-          <a:fontRef idx="minor">
-            <a:schemeClr val="lt1"/>
-          </a:fontRef>
-        </p:style>
-        <p:txBody>
-          <a:bodyPr wrap="none" rtlCol="0" anchor="t" anchorCtr="0"/>
-          <a:lstStyle/>
-          <a:p>
-            <a:r>
-              <a:rPr lang="en-GB" sz="1400" dirty="0"/>
-              <a:t>Extension</a:t>
-            </a:r>
-          </a:p>
-        </p:txBody>
-      </p:sp>
-      <p:sp>
-        <p:nvSpPr>
-          <p:cNvPr id="21" name="Rectangle 20">
-            <a:extLst>
-              <a:ext uri="{FF2B5EF4-FFF2-40B4-BE49-F238E27FC236}">
-                <a16:creationId xmlns:a16="http://schemas.microsoft.com/office/drawing/2014/main" id="{B51F98FA-EDC2-F982-8DEF-277DB5DDE978}"/>
-              </a:ext>
-            </a:extLst>
-          </p:cNvPr>
-          <p:cNvSpPr/>
-          <p:nvPr/>
-        </p:nvSpPr>
-        <p:spPr>
-          <a:xfrm>
-            <a:off x="7869627" y="758072"/>
-            <a:ext cx="1384467" cy="304974"/>
-          </a:xfrm>
-          <a:prstGeom prst="rect">
-            <a:avLst/>
-          </a:prstGeom>
-          <a:solidFill>
-            <a:schemeClr val="accent2"/>
-          </a:solidFill>
-          <a:ln>
-            <a:solidFill>
-              <a:schemeClr val="bg1"/>
-            </a:solidFill>
-          </a:ln>
-        </p:spPr>
-        <p:style>
-          <a:lnRef idx="2">
-            <a:schemeClr val="accent1">
-              <a:shade val="15000"/>
-            </a:schemeClr>
-          </a:lnRef>
-          <a:fillRef idx="1">
-            <a:schemeClr val="accent1"/>
-          </a:fillRef>
-          <a:effectRef idx="0">
-            <a:schemeClr val="accent1"/>
-          </a:effectRef>
-          <a:fontRef idx="minor">
-            <a:schemeClr val="lt1"/>
-          </a:fontRef>
-        </p:style>
-        <p:txBody>
-          <a:bodyPr wrap="none" rtlCol="0" anchor="t" anchorCtr="0"/>
-          <a:lstStyle/>
-          <a:p>
-            <a:r>
-              <a:rPr lang="en-GB" sz="1400" dirty="0"/>
-              <a:t>Profile from UDP</a:t>
-            </a:r>
-          </a:p>
-        </p:txBody>
-      </p:sp>
-      <p:sp>
-        <p:nvSpPr>
-          <p:cNvPr id="22" name="Rectangle 21">
-            <a:extLst>
-              <a:ext uri="{FF2B5EF4-FFF2-40B4-BE49-F238E27FC236}">
-                <a16:creationId xmlns:a16="http://schemas.microsoft.com/office/drawing/2014/main" id="{53CEC505-B7D1-39BF-08F1-6F4FD6875FC2}"/>
-              </a:ext>
-            </a:extLst>
-          </p:cNvPr>
-          <p:cNvSpPr/>
-          <p:nvPr/>
-        </p:nvSpPr>
-        <p:spPr>
-          <a:xfrm>
-            <a:off x="9331123" y="758072"/>
-            <a:ext cx="1384467" cy="304973"/>
-          </a:xfrm>
-          <a:prstGeom prst="rect">
-            <a:avLst/>
-          </a:prstGeom>
-          <a:solidFill>
-            <a:schemeClr val="accent6"/>
-          </a:solidFill>
-          <a:ln>
-            <a:solidFill>
-              <a:schemeClr val="bg1"/>
-            </a:solidFill>
-          </a:ln>
-        </p:spPr>
-        <p:style>
-          <a:lnRef idx="2">
-            <a:schemeClr val="accent1">
-              <a:shade val="15000"/>
-            </a:schemeClr>
-          </a:lnRef>
-          <a:fillRef idx="1">
-            <a:schemeClr val="accent1"/>
-          </a:fillRef>
-          <a:effectRef idx="0">
-            <a:schemeClr val="accent1"/>
-          </a:effectRef>
-          <a:fontRef idx="minor">
-            <a:schemeClr val="lt1"/>
-          </a:fontRef>
-        </p:style>
-        <p:txBody>
-          <a:bodyPr wrap="none" rtlCol="0" anchor="t" anchorCtr="0"/>
-          <a:lstStyle/>
-          <a:p>
-            <a:r>
-              <a:rPr lang="en-GB" sz="1400" dirty="0"/>
-              <a:t>Profile from EBM</a:t>
-            </a:r>
-          </a:p>
-        </p:txBody>
-      </p:sp>
-      <p:sp>
-        <p:nvSpPr>
-          <p:cNvPr id="23" name="TextBox 22">
-            <a:extLst>
-              <a:ext uri="{FF2B5EF4-FFF2-40B4-BE49-F238E27FC236}">
-                <a16:creationId xmlns:a16="http://schemas.microsoft.com/office/drawing/2014/main" id="{CED629DB-E2C1-1914-C7D3-831719B294B0}"/>
-              </a:ext>
-            </a:extLst>
-          </p:cNvPr>
-          <p:cNvSpPr txBox="1"/>
-          <p:nvPr/>
-        </p:nvSpPr>
-        <p:spPr>
-          <a:xfrm>
-            <a:off x="6183094" y="732724"/>
-            <a:ext cx="492827" cy="307777"/>
-          </a:xfrm>
-          <a:prstGeom prst="rect">
-            <a:avLst/>
-          </a:prstGeom>
-          <a:noFill/>
-        </p:spPr>
-        <p:txBody>
-          <a:bodyPr wrap="none" rtlCol="0">
-            <a:spAutoFit/>
-          </a:bodyPr>
-          <a:lstStyle/>
-          <a:p>
-            <a:r>
-              <a:rPr lang="en-GB" sz="1400" dirty="0"/>
-              <a:t>Key:</a:t>
-            </a:r>
-          </a:p>
-        </p:txBody>
-      </p:sp>
-    </p:spTree>
-    <p:extLst>
-      <p:ext uri="{BB962C8B-B14F-4D97-AF65-F5344CB8AC3E}">
-        <p14:creationId xmlns:p14="http://schemas.microsoft.com/office/powerpoint/2010/main" val="160287417"/>
       </p:ext>
     </p:extLst>
   </p:cSld>

</xml_diff>